<commit_message>
adding visuals and slides
</commit_message>
<xml_diff>
--- a/Scyne Advisory Interview/Scyne Advisory Presentation.pptx
+++ b/Scyne Advisory Interview/Scyne Advisory Presentation.pptx
@@ -5,18 +5,21 @@
     <p:sldMasterId id="2147483744" r:id="rId4"/>
   </p:sldMasterIdLst>
   <p:notesMasterIdLst>
-    <p:notesMasterId r:id="rId11"/>
+    <p:notesMasterId r:id="rId14"/>
   </p:notesMasterIdLst>
   <p:handoutMasterIdLst>
-    <p:handoutMasterId r:id="rId12"/>
+    <p:handoutMasterId r:id="rId15"/>
   </p:handoutMasterIdLst>
   <p:sldIdLst>
     <p:sldId id="256" r:id="rId5"/>
-    <p:sldId id="279" r:id="rId6"/>
-    <p:sldId id="269" r:id="rId7"/>
-    <p:sldId id="280" r:id="rId8"/>
-    <p:sldId id="281" r:id="rId9"/>
-    <p:sldId id="274" r:id="rId10"/>
+    <p:sldId id="269" r:id="rId6"/>
+    <p:sldId id="280" r:id="rId7"/>
+    <p:sldId id="281" r:id="rId8"/>
+    <p:sldId id="282" r:id="rId9"/>
+    <p:sldId id="283" r:id="rId10"/>
+    <p:sldId id="284" r:id="rId11"/>
+    <p:sldId id="285" r:id="rId12"/>
+    <p:sldId id="274" r:id="rId13"/>
   </p:sldIdLst>
   <p:sldSz cx="12192000" cy="6858000"/>
   <p:notesSz cx="6858000" cy="9144000"/>
@@ -13102,587 +13105,6 @@
     </p:bg>
     <p:spTree>
       <p:nvGrpSpPr>
-        <p:cNvPr id="1" name="">
-          <a:extLst>
-            <a:ext uri="{FF2B5EF4-FFF2-40B4-BE49-F238E27FC236}">
-              <a16:creationId xmlns:a16="http://schemas.microsoft.com/office/drawing/2014/main" id="{9F2C73FA-C38A-0E61-A04C-0CEB4072D42D}"/>
-            </a:ext>
-          </a:extLst>
-        </p:cNvPr>
-        <p:cNvGrpSpPr/>
-        <p:nvPr/>
-      </p:nvGrpSpPr>
-      <p:grpSpPr>
-        <a:xfrm>
-          <a:off x="0" y="0"/>
-          <a:ext cx="0" cy="0"/>
-          <a:chOff x="0" y="0"/>
-          <a:chExt cx="0" cy="0"/>
-        </a:xfrm>
-      </p:grpSpPr>
-      <p:sp>
-        <p:nvSpPr>
-          <p:cNvPr id="13" name="Title 2">
-            <a:extLst>
-              <a:ext uri="{FF2B5EF4-FFF2-40B4-BE49-F238E27FC236}">
-                <a16:creationId xmlns:a16="http://schemas.microsoft.com/office/drawing/2014/main" id="{5CC8D417-FCD7-647E-E35B-302C6361FB81}"/>
-              </a:ext>
-            </a:extLst>
-          </p:cNvPr>
-          <p:cNvSpPr>
-            <a:spLocks noGrp="1"/>
-          </p:cNvSpPr>
-          <p:nvPr>
-            <p:ph type="title"/>
-          </p:nvPr>
-        </p:nvSpPr>
-        <p:spPr>
-          <a:xfrm>
-            <a:off x="172530" y="2508268"/>
-            <a:ext cx="6587721" cy="1841463"/>
-          </a:xfrm>
-        </p:spPr>
-        <p:txBody>
-          <a:bodyPr anchor="b"/>
-          <a:lstStyle/>
-          <a:p>
-            <a:pPr algn="ctr"/>
-            <a:r>
-              <a:rPr lang="en-US" b="1" dirty="0">
-                <a:latin typeface="Amasis MT Pro Black" panose="02040A04050005020304" pitchFamily="18" charset="0"/>
-              </a:rPr>
-              <a:t>Australian</a:t>
-            </a:r>
-            <a:br>
-              <a:rPr lang="en-US" b="1" dirty="0">
-                <a:latin typeface="Amasis MT Pro Black" panose="02040A04050005020304" pitchFamily="18" charset="0"/>
-              </a:rPr>
-            </a:br>
-            <a:r>
-              <a:rPr lang="en-US" b="1" dirty="0">
-                <a:latin typeface="Amasis MT Pro Black" panose="02040A04050005020304" pitchFamily="18" charset="0"/>
-              </a:rPr>
-              <a:t>Road Fatalities</a:t>
-            </a:r>
-          </a:p>
-        </p:txBody>
-      </p:sp>
-      <p:pic>
-        <p:nvPicPr>
-          <p:cNvPr id="11" name="Picture Placeholder 10" descr="Traffic light trails at night">
-            <a:extLst>
-              <a:ext uri="{FF2B5EF4-FFF2-40B4-BE49-F238E27FC236}">
-                <a16:creationId xmlns:a16="http://schemas.microsoft.com/office/drawing/2014/main" id="{3BEA1FC7-B720-41E2-79CC-FAA1E753B86E}"/>
-              </a:ext>
-            </a:extLst>
-          </p:cNvPr>
-          <p:cNvPicPr>
-            <a:picLocks noGrp="1" noChangeAspect="1"/>
-          </p:cNvPicPr>
-          <p:nvPr>
-            <p:ph type="pic" sz="quarter" idx="21"/>
-          </p:nvPr>
-        </p:nvPicPr>
-        <p:blipFill>
-          <a:blip r:embed="rId2"/>
-          <a:srcRect l="25577" r="25577"/>
-          <a:stretch/>
-        </p:blipFill>
-        <p:spPr/>
-      </p:pic>
-      <p:grpSp>
-        <p:nvGrpSpPr>
-          <p:cNvPr id="12" name="Group 11">
-            <a:extLst>
-              <a:ext uri="{FF2B5EF4-FFF2-40B4-BE49-F238E27FC236}">
-                <a16:creationId xmlns:a16="http://schemas.microsoft.com/office/drawing/2014/main" id="{2702B5F6-26E1-6F3F-E4E8-648904EEB158}"/>
-              </a:ext>
-            </a:extLst>
-          </p:cNvPr>
-          <p:cNvGrpSpPr/>
-          <p:nvPr/>
-        </p:nvGrpSpPr>
-        <p:grpSpPr>
-          <a:xfrm>
-            <a:off x="0" y="0"/>
-            <a:ext cx="7107095" cy="6857999"/>
-            <a:chOff x="0" y="0"/>
-            <a:chExt cx="7107095" cy="6857999"/>
-          </a:xfrm>
-        </p:grpSpPr>
-        <p:pic>
-          <p:nvPicPr>
-            <p:cNvPr id="10" name="Picture 9">
-              <a:extLst>
-                <a:ext uri="{FF2B5EF4-FFF2-40B4-BE49-F238E27FC236}">
-                  <a16:creationId xmlns:a16="http://schemas.microsoft.com/office/drawing/2014/main" id="{1583EE14-2A4D-0515-C98E-F47504EAB179}"/>
-                </a:ext>
-              </a:extLst>
-            </p:cNvPr>
-            <p:cNvPicPr>
-              <a:picLocks noChangeAspect="1"/>
-            </p:cNvPicPr>
-            <p:nvPr/>
-          </p:nvPicPr>
-          <p:blipFill>
-            <a:blip r:embed="rId3"/>
-            <a:stretch>
-              <a:fillRect/>
-            </a:stretch>
-          </p:blipFill>
-          <p:spPr>
-            <a:xfrm>
-              <a:off x="0" y="0"/>
-              <a:ext cx="6407106" cy="6857999"/>
-            </a:xfrm>
-            <a:prstGeom prst="rect">
-              <a:avLst/>
-            </a:prstGeom>
-          </p:spPr>
-        </p:pic>
-        <p:pic>
-          <p:nvPicPr>
-            <p:cNvPr id="7" name="Picture 6">
-              <a:extLst>
-                <a:ext uri="{FF2B5EF4-FFF2-40B4-BE49-F238E27FC236}">
-                  <a16:creationId xmlns:a16="http://schemas.microsoft.com/office/drawing/2014/main" id="{4CEA5360-1172-7858-2E80-C5D897D34DFA}"/>
-                </a:ext>
-              </a:extLst>
-            </p:cNvPr>
-            <p:cNvPicPr>
-              <a:picLocks noChangeAspect="1"/>
-            </p:cNvPicPr>
-            <p:nvPr/>
-          </p:nvPicPr>
-          <p:blipFill>
-            <a:blip r:embed="rId3"/>
-            <a:stretch>
-              <a:fillRect/>
-            </a:stretch>
-          </p:blipFill>
-          <p:spPr>
-            <a:xfrm>
-              <a:off x="4661338" y="3428999"/>
-              <a:ext cx="2295757" cy="2457318"/>
-            </a:xfrm>
-            <a:prstGeom prst="rect">
-              <a:avLst/>
-            </a:prstGeom>
-          </p:spPr>
-        </p:pic>
-        <p:pic>
-          <p:nvPicPr>
-            <p:cNvPr id="9" name="Picture 8">
-              <a:extLst>
-                <a:ext uri="{FF2B5EF4-FFF2-40B4-BE49-F238E27FC236}">
-                  <a16:creationId xmlns:a16="http://schemas.microsoft.com/office/drawing/2014/main" id="{6B5F3C86-1D29-C4EE-821F-3A8C176BDF52}"/>
-                </a:ext>
-              </a:extLst>
-            </p:cNvPr>
-            <p:cNvPicPr>
-              <a:picLocks noChangeAspect="1"/>
-            </p:cNvPicPr>
-            <p:nvPr/>
-          </p:nvPicPr>
-          <p:blipFill>
-            <a:blip r:embed="rId3"/>
-            <a:stretch>
-              <a:fillRect/>
-            </a:stretch>
-          </p:blipFill>
-          <p:spPr>
-            <a:xfrm>
-              <a:off x="4730706" y="3802644"/>
-              <a:ext cx="2376389" cy="1799062"/>
-            </a:xfrm>
-            <a:prstGeom prst="rect">
-              <a:avLst/>
-            </a:prstGeom>
-          </p:spPr>
-        </p:pic>
-      </p:grpSp>
-      <p:sp>
-        <p:nvSpPr>
-          <p:cNvPr id="14" name="Title 2">
-            <a:extLst>
-              <a:ext uri="{FF2B5EF4-FFF2-40B4-BE49-F238E27FC236}">
-                <a16:creationId xmlns:a16="http://schemas.microsoft.com/office/drawing/2014/main" id="{E2765362-60A2-AAF3-2299-FD6F570A0D2C}"/>
-              </a:ext>
-            </a:extLst>
-          </p:cNvPr>
-          <p:cNvSpPr txBox="1">
-            <a:spLocks/>
-          </p:cNvSpPr>
-          <p:nvPr/>
-        </p:nvSpPr>
-        <p:spPr>
-          <a:xfrm>
-            <a:off x="172529" y="4498678"/>
-            <a:ext cx="6587721" cy="468262"/>
-          </a:xfrm>
-          <a:prstGeom prst="rect">
-            <a:avLst/>
-          </a:prstGeom>
-          <a:effectLst/>
-        </p:spPr>
-        <p:txBody>
-          <a:bodyPr vert="horz" lIns="91440" tIns="45720" rIns="91440" bIns="45720" rtlCol="0" anchor="b">
-            <a:noAutofit/>
-          </a:bodyPr>
-          <a:lstStyle>
-            <a:lvl1pPr algn="l" defTabSz="457200" rtl="0" eaLnBrk="1" latinLnBrk="0" hangingPunct="1">
-              <a:spcBef>
-                <a:spcPct val="0"/>
-              </a:spcBef>
-              <a:buNone/>
-              <a:defRPr sz="5400" b="0" kern="1200" cap="all">
-                <a:ln w="3175" cmpd="sng">
-                  <a:noFill/>
-                </a:ln>
-                <a:solidFill>
-                  <a:schemeClr val="accent6">
-                    <a:lumMod val="20000"/>
-                    <a:lumOff val="80000"/>
-                  </a:schemeClr>
-                </a:solidFill>
-                <a:effectLst/>
-                <a:latin typeface="+mj-lt"/>
-                <a:ea typeface="+mj-ea"/>
-                <a:cs typeface="+mj-cs"/>
-              </a:defRPr>
-            </a:lvl1pPr>
-            <a:lvl2pPr eaLnBrk="1" hangingPunct="1">
-              <a:defRPr>
-                <a:solidFill>
-                  <a:schemeClr val="tx2"/>
-                </a:solidFill>
-              </a:defRPr>
-            </a:lvl2pPr>
-            <a:lvl3pPr eaLnBrk="1" hangingPunct="1">
-              <a:defRPr>
-                <a:solidFill>
-                  <a:schemeClr val="tx2"/>
-                </a:solidFill>
-              </a:defRPr>
-            </a:lvl3pPr>
-            <a:lvl4pPr eaLnBrk="1" hangingPunct="1">
-              <a:defRPr>
-                <a:solidFill>
-                  <a:schemeClr val="tx2"/>
-                </a:solidFill>
-              </a:defRPr>
-            </a:lvl4pPr>
-            <a:lvl5pPr eaLnBrk="1" hangingPunct="1">
-              <a:defRPr>
-                <a:solidFill>
-                  <a:schemeClr val="tx2"/>
-                </a:solidFill>
-              </a:defRPr>
-            </a:lvl5pPr>
-            <a:lvl6pPr eaLnBrk="1" hangingPunct="1">
-              <a:defRPr>
-                <a:solidFill>
-                  <a:schemeClr val="tx2"/>
-                </a:solidFill>
-              </a:defRPr>
-            </a:lvl6pPr>
-            <a:lvl7pPr eaLnBrk="1" hangingPunct="1">
-              <a:defRPr>
-                <a:solidFill>
-                  <a:schemeClr val="tx2"/>
-                </a:solidFill>
-              </a:defRPr>
-            </a:lvl7pPr>
-            <a:lvl8pPr eaLnBrk="1" hangingPunct="1">
-              <a:defRPr>
-                <a:solidFill>
-                  <a:schemeClr val="tx2"/>
-                </a:solidFill>
-              </a:defRPr>
-            </a:lvl8pPr>
-            <a:lvl9pPr eaLnBrk="1" hangingPunct="1">
-              <a:defRPr>
-                <a:solidFill>
-                  <a:schemeClr val="tx2"/>
-                </a:solidFill>
-              </a:defRPr>
-            </a:lvl9pPr>
-          </a:lstStyle>
-          <a:p>
-            <a:pPr algn="ctr"/>
-            <a:r>
-              <a:rPr lang="en-US" sz="2400" b="1" dirty="0">
-                <a:latin typeface="Amasis MT Pro Black" panose="02040A04050005020304" pitchFamily="18" charset="0"/>
-              </a:rPr>
-              <a:t>Data Insights &amp; Recommendations</a:t>
-            </a:r>
-          </a:p>
-        </p:txBody>
-      </p:sp>
-      <p:sp>
-        <p:nvSpPr>
-          <p:cNvPr id="15" name="Title 2">
-            <a:extLst>
-              <a:ext uri="{FF2B5EF4-FFF2-40B4-BE49-F238E27FC236}">
-                <a16:creationId xmlns:a16="http://schemas.microsoft.com/office/drawing/2014/main" id="{417A8915-FEDB-CDF0-327E-4B3FD8ADFC97}"/>
-              </a:ext>
-            </a:extLst>
-          </p:cNvPr>
-          <p:cNvSpPr txBox="1">
-            <a:spLocks/>
-          </p:cNvSpPr>
-          <p:nvPr/>
-        </p:nvSpPr>
-        <p:spPr>
-          <a:xfrm>
-            <a:off x="172532" y="1046778"/>
-            <a:ext cx="6587721" cy="468262"/>
-          </a:xfrm>
-          <a:prstGeom prst="rect">
-            <a:avLst/>
-          </a:prstGeom>
-          <a:effectLst/>
-        </p:spPr>
-        <p:txBody>
-          <a:bodyPr vert="horz" lIns="91440" tIns="45720" rIns="91440" bIns="45720" rtlCol="0" anchor="b">
-            <a:noAutofit/>
-          </a:bodyPr>
-          <a:lstStyle>
-            <a:lvl1pPr algn="l" defTabSz="457200" rtl="0" eaLnBrk="1" latinLnBrk="0" hangingPunct="1">
-              <a:spcBef>
-                <a:spcPct val="0"/>
-              </a:spcBef>
-              <a:buNone/>
-              <a:defRPr sz="5400" b="0" kern="1200" cap="all">
-                <a:ln w="3175" cmpd="sng">
-                  <a:noFill/>
-                </a:ln>
-                <a:solidFill>
-                  <a:schemeClr val="accent6">
-                    <a:lumMod val="20000"/>
-                    <a:lumOff val="80000"/>
-                  </a:schemeClr>
-                </a:solidFill>
-                <a:effectLst/>
-                <a:latin typeface="+mj-lt"/>
-                <a:ea typeface="+mj-ea"/>
-                <a:cs typeface="+mj-cs"/>
-              </a:defRPr>
-            </a:lvl1pPr>
-            <a:lvl2pPr eaLnBrk="1" hangingPunct="1">
-              <a:defRPr>
-                <a:solidFill>
-                  <a:schemeClr val="tx2"/>
-                </a:solidFill>
-              </a:defRPr>
-            </a:lvl2pPr>
-            <a:lvl3pPr eaLnBrk="1" hangingPunct="1">
-              <a:defRPr>
-                <a:solidFill>
-                  <a:schemeClr val="tx2"/>
-                </a:solidFill>
-              </a:defRPr>
-            </a:lvl3pPr>
-            <a:lvl4pPr eaLnBrk="1" hangingPunct="1">
-              <a:defRPr>
-                <a:solidFill>
-                  <a:schemeClr val="tx2"/>
-                </a:solidFill>
-              </a:defRPr>
-            </a:lvl4pPr>
-            <a:lvl5pPr eaLnBrk="1" hangingPunct="1">
-              <a:defRPr>
-                <a:solidFill>
-                  <a:schemeClr val="tx2"/>
-                </a:solidFill>
-              </a:defRPr>
-            </a:lvl5pPr>
-            <a:lvl6pPr eaLnBrk="1" hangingPunct="1">
-              <a:defRPr>
-                <a:solidFill>
-                  <a:schemeClr val="tx2"/>
-                </a:solidFill>
-              </a:defRPr>
-            </a:lvl6pPr>
-            <a:lvl7pPr eaLnBrk="1" hangingPunct="1">
-              <a:defRPr>
-                <a:solidFill>
-                  <a:schemeClr val="tx2"/>
-                </a:solidFill>
-              </a:defRPr>
-            </a:lvl7pPr>
-            <a:lvl8pPr eaLnBrk="1" hangingPunct="1">
-              <a:defRPr>
-                <a:solidFill>
-                  <a:schemeClr val="tx2"/>
-                </a:solidFill>
-              </a:defRPr>
-            </a:lvl8pPr>
-            <a:lvl9pPr eaLnBrk="1" hangingPunct="1">
-              <a:defRPr>
-                <a:solidFill>
-                  <a:schemeClr val="tx2"/>
-                </a:solidFill>
-              </a:defRPr>
-            </a:lvl9pPr>
-          </a:lstStyle>
-          <a:p>
-            <a:pPr algn="ctr"/>
-            <a:r>
-              <a:rPr lang="en-US" sz="2400" b="1" dirty="0">
-                <a:latin typeface="Amasis MT Pro Black" panose="02040A04050005020304" pitchFamily="18" charset="0"/>
-              </a:rPr>
-              <a:t>Scyne advisory</a:t>
-            </a:r>
-          </a:p>
-        </p:txBody>
-      </p:sp>
-      <p:sp>
-        <p:nvSpPr>
-          <p:cNvPr id="16" name="Title 2">
-            <a:extLst>
-              <a:ext uri="{FF2B5EF4-FFF2-40B4-BE49-F238E27FC236}">
-                <a16:creationId xmlns:a16="http://schemas.microsoft.com/office/drawing/2014/main" id="{B0E587F3-49E7-2F13-FB02-97ED5FE241EF}"/>
-              </a:ext>
-            </a:extLst>
-          </p:cNvPr>
-          <p:cNvSpPr txBox="1">
-            <a:spLocks/>
-          </p:cNvSpPr>
-          <p:nvPr/>
-        </p:nvSpPr>
-        <p:spPr>
-          <a:xfrm>
-            <a:off x="172531" y="6113069"/>
-            <a:ext cx="6587721" cy="468262"/>
-          </a:xfrm>
-          <a:prstGeom prst="rect">
-            <a:avLst/>
-          </a:prstGeom>
-          <a:effectLst/>
-        </p:spPr>
-        <p:txBody>
-          <a:bodyPr vert="horz" lIns="91440" tIns="45720" rIns="91440" bIns="45720" rtlCol="0" anchor="b">
-            <a:noAutofit/>
-          </a:bodyPr>
-          <a:lstStyle>
-            <a:lvl1pPr algn="l" defTabSz="457200" rtl="0" eaLnBrk="1" latinLnBrk="0" hangingPunct="1">
-              <a:spcBef>
-                <a:spcPct val="0"/>
-              </a:spcBef>
-              <a:buNone/>
-              <a:defRPr sz="5400" b="0" kern="1200" cap="all">
-                <a:ln w="3175" cmpd="sng">
-                  <a:noFill/>
-                </a:ln>
-                <a:solidFill>
-                  <a:schemeClr val="accent6">
-                    <a:lumMod val="20000"/>
-                    <a:lumOff val="80000"/>
-                  </a:schemeClr>
-                </a:solidFill>
-                <a:effectLst/>
-                <a:latin typeface="+mj-lt"/>
-                <a:ea typeface="+mj-ea"/>
-                <a:cs typeface="+mj-cs"/>
-              </a:defRPr>
-            </a:lvl1pPr>
-            <a:lvl2pPr eaLnBrk="1" hangingPunct="1">
-              <a:defRPr>
-                <a:solidFill>
-                  <a:schemeClr val="tx2"/>
-                </a:solidFill>
-              </a:defRPr>
-            </a:lvl2pPr>
-            <a:lvl3pPr eaLnBrk="1" hangingPunct="1">
-              <a:defRPr>
-                <a:solidFill>
-                  <a:schemeClr val="tx2"/>
-                </a:solidFill>
-              </a:defRPr>
-            </a:lvl3pPr>
-            <a:lvl4pPr eaLnBrk="1" hangingPunct="1">
-              <a:defRPr>
-                <a:solidFill>
-                  <a:schemeClr val="tx2"/>
-                </a:solidFill>
-              </a:defRPr>
-            </a:lvl4pPr>
-            <a:lvl5pPr eaLnBrk="1" hangingPunct="1">
-              <a:defRPr>
-                <a:solidFill>
-                  <a:schemeClr val="tx2"/>
-                </a:solidFill>
-              </a:defRPr>
-            </a:lvl5pPr>
-            <a:lvl6pPr eaLnBrk="1" hangingPunct="1">
-              <a:defRPr>
-                <a:solidFill>
-                  <a:schemeClr val="tx2"/>
-                </a:solidFill>
-              </a:defRPr>
-            </a:lvl6pPr>
-            <a:lvl7pPr eaLnBrk="1" hangingPunct="1">
-              <a:defRPr>
-                <a:solidFill>
-                  <a:schemeClr val="tx2"/>
-                </a:solidFill>
-              </a:defRPr>
-            </a:lvl7pPr>
-            <a:lvl8pPr eaLnBrk="1" hangingPunct="1">
-              <a:defRPr>
-                <a:solidFill>
-                  <a:schemeClr val="tx2"/>
-                </a:solidFill>
-              </a:defRPr>
-            </a:lvl8pPr>
-            <a:lvl9pPr eaLnBrk="1" hangingPunct="1">
-              <a:defRPr>
-                <a:solidFill>
-                  <a:schemeClr val="tx2"/>
-                </a:solidFill>
-              </a:defRPr>
-            </a:lvl9pPr>
-          </a:lstStyle>
-          <a:p>
-            <a:pPr algn="ctr"/>
-            <a:r>
-              <a:rPr lang="en-US" sz="2400" b="1" dirty="0">
-                <a:latin typeface="Amasis MT Pro Black" panose="02040A04050005020304" pitchFamily="18" charset="0"/>
-              </a:rPr>
-              <a:t>Noorullah khan</a:t>
-            </a:r>
-          </a:p>
-        </p:txBody>
-      </p:sp>
-    </p:spTree>
-    <p:extLst>
-      <p:ext uri="{BB962C8B-B14F-4D97-AF65-F5344CB8AC3E}">
-        <p14:creationId xmlns:p14="http://schemas.microsoft.com/office/powerpoint/2010/main" val="4239347050"/>
-      </p:ext>
-    </p:extLst>
-  </p:cSld>
-  <p:clrMapOvr>
-    <a:masterClrMapping/>
-  </p:clrMapOvr>
-</p:sld>
-</file>
-
-<file path=ppt/slides/slide3.xml><?xml version="1.0" encoding="utf-8"?>
-<p:sld xmlns:a="http://schemas.openxmlformats.org/drawingml/2006/main" xmlns:r="http://schemas.openxmlformats.org/officeDocument/2006/relationships" xmlns:p="http://schemas.openxmlformats.org/presentationml/2006/main">
-  <p:cSld>
-    <p:bg>
-      <p:bgPr>
-        <a:solidFill>
-          <a:schemeClr val="accent1">
-            <a:lumMod val="50000"/>
-          </a:schemeClr>
-        </a:solidFill>
-        <a:effectLst/>
-      </p:bgPr>
-    </p:bg>
-    <p:spTree>
-      <p:nvGrpSpPr>
         <p:cNvPr id="1" name=""/>
         <p:cNvGrpSpPr/>
         <p:nvPr/>
@@ -13695,40 +13117,6 @@
           <a:chExt cx="0" cy="0"/>
         </a:xfrm>
       </p:grpSpPr>
-      <p:sp>
-        <p:nvSpPr>
-          <p:cNvPr id="2" name="Title 1">
-            <a:extLst>
-              <a:ext uri="{FF2B5EF4-FFF2-40B4-BE49-F238E27FC236}">
-                <a16:creationId xmlns:a16="http://schemas.microsoft.com/office/drawing/2014/main" id="{43C2181D-911C-1343-7267-E35AC86CCA0E}"/>
-              </a:ext>
-            </a:extLst>
-          </p:cNvPr>
-          <p:cNvSpPr>
-            <a:spLocks noGrp="1"/>
-          </p:cNvSpPr>
-          <p:nvPr>
-            <p:ph type="title"/>
-          </p:nvPr>
-        </p:nvSpPr>
-        <p:spPr>
-          <a:noFill/>
-        </p:spPr>
-        <p:txBody>
-          <a:bodyPr anchor="t">
-            <a:noAutofit/>
-          </a:bodyPr>
-          <a:lstStyle/>
-          <a:p>
-            <a:r>
-              <a:rPr lang="en-US" dirty="0">
-                <a:latin typeface="Amasis MT Pro Black" panose="02040A04050005020304" pitchFamily="18" charset="0"/>
-              </a:rPr>
-              <a:t>Executive SUMMARY</a:t>
-            </a:r>
-          </a:p>
-        </p:txBody>
-      </p:sp>
       <p:sp>
         <p:nvSpPr>
           <p:cNvPr id="4" name="Slide Number Placeholder 3">
@@ -13753,7 +13141,7 @@
             <a:fld id="{CBD12358-51D2-46B3-9BDE-DF29528B9454}" type="slidenum">
               <a:rPr lang="en-US" smtClean="0"/>
               <a:pPr/>
-              <a:t>3</a:t>
+              <a:t>2</a:t>
             </a:fld>
             <a:endParaRPr lang="en-US" dirty="0"/>
           </a:p>
@@ -13930,6 +13318,45 @@
           </a:p>
         </p:txBody>
       </p:sp>
+      <p:sp>
+        <p:nvSpPr>
+          <p:cNvPr id="6" name="Title 1">
+            <a:extLst>
+              <a:ext uri="{FF2B5EF4-FFF2-40B4-BE49-F238E27FC236}">
+                <a16:creationId xmlns:a16="http://schemas.microsoft.com/office/drawing/2014/main" id="{05F0BC8F-2142-E9A9-94EC-7C61FF0D19E7}"/>
+              </a:ext>
+            </a:extLst>
+          </p:cNvPr>
+          <p:cNvSpPr>
+            <a:spLocks noGrp="1"/>
+          </p:cNvSpPr>
+          <p:nvPr>
+            <p:ph type="title"/>
+          </p:nvPr>
+        </p:nvSpPr>
+        <p:spPr>
+          <a:xfrm>
+            <a:off x="0" y="609601"/>
+            <a:ext cx="12191999" cy="756370"/>
+          </a:xfrm>
+          <a:noFill/>
+        </p:spPr>
+        <p:txBody>
+          <a:bodyPr anchor="t">
+            <a:noAutofit/>
+          </a:bodyPr>
+          <a:lstStyle/>
+          <a:p>
+            <a:pPr algn="ctr"/>
+            <a:r>
+              <a:rPr lang="en-US" dirty="0">
+                <a:latin typeface="Amasis MT Pro Black" panose="02040A04050005020304" pitchFamily="18" charset="0"/>
+              </a:rPr>
+              <a:t>EXECUTIVE SUMMARY</a:t>
+            </a:r>
+          </a:p>
+        </p:txBody>
+      </p:sp>
     </p:spTree>
     <p:extLst>
       <p:ext uri="{BB962C8B-B14F-4D97-AF65-F5344CB8AC3E}">
@@ -13943,7 +13370,7 @@
 </p:sld>
 </file>
 
-<file path=ppt/slides/slide4.xml><?xml version="1.0" encoding="utf-8"?>
+<file path=ppt/slides/slide3.xml><?xml version="1.0" encoding="utf-8"?>
 <p:sld xmlns:a="http://schemas.openxmlformats.org/drawingml/2006/main" xmlns:r="http://schemas.openxmlformats.org/officeDocument/2006/relationships" xmlns:p="http://schemas.openxmlformats.org/presentationml/2006/main">
   <p:cSld>
     <p:bg>
@@ -13993,6 +13420,10 @@
           </p:nvPr>
         </p:nvSpPr>
         <p:spPr>
+          <a:xfrm>
+            <a:off x="0" y="609601"/>
+            <a:ext cx="12191999" cy="756370"/>
+          </a:xfrm>
           <a:noFill/>
         </p:spPr>
         <p:txBody>
@@ -14001,51 +13432,58 @@
           </a:bodyPr>
           <a:lstStyle/>
           <a:p>
+            <a:pPr algn="ctr"/>
             <a:r>
               <a:rPr lang="en-US" dirty="0">
                 <a:latin typeface="Amasis MT Pro Black" panose="02040A04050005020304" pitchFamily="18" charset="0"/>
               </a:rPr>
-              <a:t>Executive SUMMARY</a:t>
+              <a:t>Aim &amp; Hypotheses</a:t>
             </a:r>
           </a:p>
         </p:txBody>
       </p:sp>
-      <p:sp>
-        <p:nvSpPr>
-          <p:cNvPr id="4" name="Slide Number Placeholder 3">
+      <p:pic>
+        <p:nvPicPr>
+          <p:cNvPr id="7" name="Picture 6" descr="A blue circle with a clock on it&#10;&#10;AI-generated content may be incorrect.">
             <a:extLst>
               <a:ext uri="{FF2B5EF4-FFF2-40B4-BE49-F238E27FC236}">
-                <a16:creationId xmlns:a16="http://schemas.microsoft.com/office/drawing/2014/main" id="{7B134D71-1710-E3A2-25A3-69F78FC49955}"/>
+                <a16:creationId xmlns:a16="http://schemas.microsoft.com/office/drawing/2014/main" id="{D37C7413-82EE-1E5B-5C7A-E2A102EC0205}"/>
               </a:ext>
             </a:extLst>
           </p:cNvPr>
-          <p:cNvSpPr>
-            <a:spLocks noGrp="1"/>
-          </p:cNvSpPr>
-          <p:nvPr>
-            <p:ph type="sldNum" sz="quarter" idx="12"/>
-          </p:nvPr>
-        </p:nvSpPr>
-        <p:spPr/>
-        <p:txBody>
-          <a:bodyPr/>
-          <a:lstStyle/>
-          <a:p>
-            <a:fld id="{CBD12358-51D2-46B3-9BDE-DF29528B9454}" type="slidenum">
-              <a:rPr lang="en-US" smtClean="0"/>
-              <a:pPr/>
-              <a:t>4</a:t>
-            </a:fld>
-            <a:endParaRPr lang="en-US" dirty="0"/>
-          </a:p>
-        </p:txBody>
-      </p:sp>
+          <p:cNvPicPr>
+            <a:picLocks noChangeAspect="1"/>
+          </p:cNvPicPr>
+          <p:nvPr/>
+        </p:nvPicPr>
+        <p:blipFill>
+          <a:blip r:embed="rId2">
+            <a:extLst>
+              <a:ext uri="{837473B0-CC2E-450A-ABE3-18F120FF3D39}">
+                <a1611:picAttrSrcUrl xmlns:a1611="http://schemas.microsoft.com/office/drawing/2016/11/main" r:id="rId3"/>
+              </a:ext>
+            </a:extLst>
+          </a:blip>
+          <a:stretch>
+            <a:fillRect/>
+          </a:stretch>
+        </p:blipFill>
+        <p:spPr>
+          <a:xfrm>
+            <a:off x="685801" y="1751607"/>
+            <a:ext cx="628519" cy="628519"/>
+          </a:xfrm>
+          <a:prstGeom prst="rect">
+            <a:avLst/>
+          </a:prstGeom>
+        </p:spPr>
+      </p:pic>
       <p:sp>
         <p:nvSpPr>
-          <p:cNvPr id="9" name="TextBox 8">
+          <p:cNvPr id="11" name="TextBox 10">
             <a:extLst>
               <a:ext uri="{FF2B5EF4-FFF2-40B4-BE49-F238E27FC236}">
-                <a16:creationId xmlns:a16="http://schemas.microsoft.com/office/drawing/2014/main" id="{649C5C41-9E8B-8402-21EC-D5B14119F3A8}"/>
+                <a16:creationId xmlns:a16="http://schemas.microsoft.com/office/drawing/2014/main" id="{1991B747-1E2F-3620-3E8C-F219D8276569}"/>
               </a:ext>
             </a:extLst>
           </p:cNvPr>
@@ -14054,8 +13492,8 @@
         </p:nvSpPr>
         <p:spPr>
           <a:xfrm>
-            <a:off x="685801" y="1948618"/>
-            <a:ext cx="10411547" cy="2862322"/>
+            <a:off x="1658271" y="1846360"/>
+            <a:ext cx="7262981" cy="369332"/>
           </a:xfrm>
           <a:prstGeom prst="rect">
             <a:avLst/>
@@ -14068,146 +13506,240 @@
           </a:bodyPr>
           <a:lstStyle/>
           <a:p>
-            <a:pPr marL="285750" lvl="0" indent="-285750" defTabSz="914400" eaLnBrk="0" fontAlgn="base" hangingPunct="0">
-              <a:spcBef>
-                <a:spcPct val="0"/>
-              </a:spcBef>
-              <a:spcAft>
-                <a:spcPct val="0"/>
-              </a:spcAft>
-              <a:buFont typeface="Arial" panose="020B0604020202020204" pitchFamily="34" charset="0"/>
-              <a:buChar char="•"/>
-            </a:pPr>
             <a:r>
-              <a:rPr lang="en-US" altLang="en-US" dirty="0">
+              <a:rPr lang="en-US" dirty="0">
                 <a:latin typeface="Amasis MT Pro" panose="02040504050005020304" pitchFamily="18" charset="0"/>
               </a:rPr>
-              <a:t>Fatal crashes have declined long-term but plateaued in recent years.</a:t>
+              <a:t>Fatal crashes are more likely during weekends and late-night hours</a:t>
             </a:r>
-          </a:p>
-          <a:p>
-            <a:pPr lvl="0" defTabSz="914400" eaLnBrk="0" fontAlgn="base" hangingPunct="0">
-              <a:spcBef>
-                <a:spcPct val="0"/>
-              </a:spcBef>
-              <a:spcAft>
-                <a:spcPct val="0"/>
-              </a:spcAft>
-            </a:pPr>
-            <a:endParaRPr lang="en-US" altLang="en-US" dirty="0">
+            <a:endParaRPr lang="en-AU" dirty="0">
               <a:latin typeface="Amasis MT Pro" panose="02040504050005020304" pitchFamily="18" charset="0"/>
             </a:endParaRPr>
           </a:p>
-          <a:p>
-            <a:pPr marL="285750" lvl="0" indent="-285750" defTabSz="914400" eaLnBrk="0" fontAlgn="base" hangingPunct="0">
-              <a:spcBef>
-                <a:spcPct val="0"/>
-              </a:spcBef>
-              <a:spcAft>
-                <a:spcPct val="0"/>
-              </a:spcAft>
-              <a:buFont typeface="Arial" panose="020B0604020202020204" pitchFamily="34" charset="0"/>
-              <a:buChar char="•"/>
-            </a:pPr>
+        </p:txBody>
+      </p:sp>
+      <p:pic>
+        <p:nvPicPr>
+          <p:cNvPr id="12" name="Picture 11" descr="Users with solid fill">
+            <a:extLst>
+              <a:ext uri="{FF2B5EF4-FFF2-40B4-BE49-F238E27FC236}">
+                <a16:creationId xmlns:a16="http://schemas.microsoft.com/office/drawing/2014/main" id="{386DEEFE-60FC-3261-C8D0-842069122161}"/>
+              </a:ext>
+            </a:extLst>
+          </p:cNvPr>
+          <p:cNvPicPr>
+            <a:picLocks noChangeAspect="1"/>
+          </p:cNvPicPr>
+          <p:nvPr/>
+        </p:nvPicPr>
+        <p:blipFill>
+          <a:blip r:embed="rId4">
+            <a:extLst>
+              <a:ext uri="{96DAC541-7B7A-43D3-8B79-37D633B846F1}">
+                <asvg:svgBlip xmlns:asvg="http://schemas.microsoft.com/office/drawing/2016/SVG/main" r:embed="rId5"/>
+              </a:ext>
+            </a:extLst>
+          </a:blip>
+          <a:srcRect/>
+          <a:stretch/>
+        </p:blipFill>
+        <p:spPr>
+          <a:xfrm>
+            <a:off x="685801" y="2876257"/>
+            <a:ext cx="628519" cy="628519"/>
+          </a:xfrm>
+          <a:prstGeom prst="rect">
+            <a:avLst/>
+          </a:prstGeom>
+        </p:spPr>
+      </p:pic>
+      <p:sp>
+        <p:nvSpPr>
+          <p:cNvPr id="13" name="TextBox 12">
+            <a:extLst>
+              <a:ext uri="{FF2B5EF4-FFF2-40B4-BE49-F238E27FC236}">
+                <a16:creationId xmlns:a16="http://schemas.microsoft.com/office/drawing/2014/main" id="{2EE11A4F-8A0A-CD28-CE5B-7DCA283700EC}"/>
+              </a:ext>
+            </a:extLst>
+          </p:cNvPr>
+          <p:cNvSpPr txBox="1"/>
+          <p:nvPr/>
+        </p:nvSpPr>
+        <p:spPr>
+          <a:xfrm>
+            <a:off x="1658271" y="2854284"/>
+            <a:ext cx="7262981" cy="646331"/>
+          </a:xfrm>
+          <a:prstGeom prst="rect">
+            <a:avLst/>
+          </a:prstGeom>
+          <a:noFill/>
+        </p:spPr>
+        <p:txBody>
+          <a:bodyPr wrap="square" rtlCol="0">
+            <a:spAutoFit/>
+          </a:bodyPr>
+          <a:lstStyle/>
+          <a:p>
             <a:r>
-              <a:rPr lang="en-US" altLang="en-US" dirty="0">
+              <a:rPr lang="en-US" dirty="0">
                 <a:latin typeface="Amasis MT Pro" panose="02040504050005020304" pitchFamily="18" charset="0"/>
               </a:rPr>
-              <a:t>Weekends and late-night hours remain the highest-risk windows.</a:t>
+              <a:t>Young male drivers are disproportionately involved in single-vehicle crashes. </a:t>
             </a:r>
-          </a:p>
-          <a:p>
-            <a:pPr lvl="0" defTabSz="914400" eaLnBrk="0" fontAlgn="base" hangingPunct="0">
-              <a:spcBef>
-                <a:spcPct val="0"/>
-              </a:spcBef>
-              <a:spcAft>
-                <a:spcPct val="0"/>
-              </a:spcAft>
-            </a:pPr>
-            <a:endParaRPr lang="en-US" altLang="en-US" dirty="0">
+            <a:endParaRPr lang="en-AU" dirty="0">
               <a:latin typeface="Amasis MT Pro" panose="02040504050005020304" pitchFamily="18" charset="0"/>
             </a:endParaRPr>
           </a:p>
-          <a:p>
-            <a:pPr marL="285750" lvl="0" indent="-285750" defTabSz="914400" eaLnBrk="0" fontAlgn="base" hangingPunct="0">
-              <a:spcBef>
-                <a:spcPct val="0"/>
-              </a:spcBef>
-              <a:spcAft>
-                <a:spcPct val="0"/>
-              </a:spcAft>
-              <a:buFont typeface="Arial" panose="020B0604020202020204" pitchFamily="34" charset="0"/>
-              <a:buChar char="•"/>
-            </a:pPr>
+        </p:txBody>
+      </p:sp>
+      <p:pic>
+        <p:nvPicPr>
+          <p:cNvPr id="14" name="Picture 13" descr="Road with solid fill">
+            <a:extLst>
+              <a:ext uri="{FF2B5EF4-FFF2-40B4-BE49-F238E27FC236}">
+                <a16:creationId xmlns:a16="http://schemas.microsoft.com/office/drawing/2014/main" id="{039A4C35-FAB4-75A0-64CD-F164CA769DD2}"/>
+              </a:ext>
+            </a:extLst>
+          </p:cNvPr>
+          <p:cNvPicPr>
+            <a:picLocks noChangeAspect="1"/>
+          </p:cNvPicPr>
+          <p:nvPr/>
+        </p:nvPicPr>
+        <p:blipFill>
+          <a:blip r:embed="rId6">
+            <a:extLst>
+              <a:ext uri="{96DAC541-7B7A-43D3-8B79-37D633B846F1}">
+                <asvg:svgBlip xmlns:asvg="http://schemas.microsoft.com/office/drawing/2016/SVG/main" r:embed="rId7"/>
+              </a:ext>
+            </a:extLst>
+          </a:blip>
+          <a:srcRect/>
+          <a:stretch/>
+        </p:blipFill>
+        <p:spPr>
+          <a:xfrm>
+            <a:off x="685801" y="3998817"/>
+            <a:ext cx="628519" cy="628519"/>
+          </a:xfrm>
+          <a:prstGeom prst="rect">
+            <a:avLst/>
+          </a:prstGeom>
+        </p:spPr>
+      </p:pic>
+      <p:sp>
+        <p:nvSpPr>
+          <p:cNvPr id="15" name="TextBox 14">
+            <a:extLst>
+              <a:ext uri="{FF2B5EF4-FFF2-40B4-BE49-F238E27FC236}">
+                <a16:creationId xmlns:a16="http://schemas.microsoft.com/office/drawing/2014/main" id="{2E25ADA6-6CEB-DF86-4B86-1B3ECFD2FA2E}"/>
+              </a:ext>
+            </a:extLst>
+          </p:cNvPr>
+          <p:cNvSpPr txBox="1"/>
+          <p:nvPr/>
+        </p:nvSpPr>
+        <p:spPr>
+          <a:xfrm>
+            <a:off x="1658271" y="3981005"/>
+            <a:ext cx="7262981" cy="646331"/>
+          </a:xfrm>
+          <a:prstGeom prst="rect">
+            <a:avLst/>
+          </a:prstGeom>
+          <a:noFill/>
+        </p:spPr>
+        <p:txBody>
+          <a:bodyPr wrap="square" rtlCol="0">
+            <a:spAutoFit/>
+          </a:bodyPr>
+          <a:lstStyle/>
+          <a:p>
             <a:r>
-              <a:rPr lang="en-US" altLang="en-US" dirty="0">
+              <a:rPr lang="en-US" dirty="0">
                 <a:latin typeface="Amasis MT Pro" panose="02040504050005020304" pitchFamily="18" charset="0"/>
               </a:rPr>
-              <a:t>Young male drivers are disproportionately involved in fatal crashes.</a:t>
+              <a:t>High-speed roads see more single-vehicle crashes; multi-vehicle crashes cluster in commuting hours.</a:t>
             </a:r>
-          </a:p>
-          <a:p>
-            <a:pPr lvl="0" defTabSz="914400" eaLnBrk="0" fontAlgn="base" hangingPunct="0">
-              <a:spcBef>
-                <a:spcPct val="0"/>
-              </a:spcBef>
-              <a:spcAft>
-                <a:spcPct val="0"/>
-              </a:spcAft>
-            </a:pPr>
-            <a:endParaRPr lang="en-US" altLang="en-US" dirty="0">
+            <a:endParaRPr lang="en-AU" dirty="0">
               <a:latin typeface="Amasis MT Pro" panose="02040504050005020304" pitchFamily="18" charset="0"/>
             </a:endParaRPr>
           </a:p>
-          <a:p>
-            <a:pPr marL="285750" lvl="0" indent="-285750" defTabSz="914400" eaLnBrk="0" fontAlgn="base" hangingPunct="0">
-              <a:spcBef>
-                <a:spcPct val="0"/>
-              </a:spcBef>
-              <a:spcAft>
-                <a:spcPct val="0"/>
-              </a:spcAft>
-              <a:buFont typeface="Arial" panose="020B0604020202020204" pitchFamily="34" charset="0"/>
-              <a:buChar char="•"/>
-            </a:pPr>
+        </p:txBody>
+      </p:sp>
+      <p:pic>
+        <p:nvPicPr>
+          <p:cNvPr id="16" name="Picture 15" descr="Fireworks with solid fill">
+            <a:extLst>
+              <a:ext uri="{FF2B5EF4-FFF2-40B4-BE49-F238E27FC236}">
+                <a16:creationId xmlns:a16="http://schemas.microsoft.com/office/drawing/2014/main" id="{B11255B5-D313-CF26-D8A2-356860EAB8E9}"/>
+              </a:ext>
+            </a:extLst>
+          </p:cNvPr>
+          <p:cNvPicPr>
+            <a:picLocks noChangeAspect="1"/>
+          </p:cNvPicPr>
+          <p:nvPr/>
+        </p:nvPicPr>
+        <p:blipFill>
+          <a:blip r:embed="rId8">
+            <a:extLst>
+              <a:ext uri="{96DAC541-7B7A-43D3-8B79-37D633B846F1}">
+                <asvg:svgBlip xmlns:asvg="http://schemas.microsoft.com/office/drawing/2016/SVG/main" r:embed="rId9"/>
+              </a:ext>
+            </a:extLst>
+          </a:blip>
+          <a:srcRect/>
+          <a:stretch/>
+        </p:blipFill>
+        <p:spPr>
+          <a:xfrm>
+            <a:off x="727054" y="5121377"/>
+            <a:ext cx="628519" cy="628519"/>
+          </a:xfrm>
+          <a:prstGeom prst="rect">
+            <a:avLst/>
+          </a:prstGeom>
+        </p:spPr>
+      </p:pic>
+      <p:sp>
+        <p:nvSpPr>
+          <p:cNvPr id="17" name="TextBox 16">
+            <a:extLst>
+              <a:ext uri="{FF2B5EF4-FFF2-40B4-BE49-F238E27FC236}">
+                <a16:creationId xmlns:a16="http://schemas.microsoft.com/office/drawing/2014/main" id="{AFBF986D-C3BD-47E1-A4C9-05987492B310}"/>
+              </a:ext>
+            </a:extLst>
+          </p:cNvPr>
+          <p:cNvSpPr txBox="1"/>
+          <p:nvPr/>
+        </p:nvSpPr>
+        <p:spPr>
+          <a:xfrm>
+            <a:off x="1658271" y="5103565"/>
+            <a:ext cx="7262981" cy="646331"/>
+          </a:xfrm>
+          <a:prstGeom prst="rect">
+            <a:avLst/>
+          </a:prstGeom>
+          <a:noFill/>
+        </p:spPr>
+        <p:txBody>
+          <a:bodyPr wrap="square" rtlCol="0">
+            <a:spAutoFit/>
+          </a:bodyPr>
+          <a:lstStyle/>
+          <a:p>
             <a:r>
-              <a:rPr lang="en-US" altLang="en-US" dirty="0">
+              <a:rPr lang="en-US" dirty="0">
                 <a:latin typeface="Amasis MT Pro" panose="02040504050005020304" pitchFamily="18" charset="0"/>
               </a:rPr>
-              <a:t>Risks differ across environments: single-vehicle crashes dominate at high speed/night; multi-vehicle crashes peak in commuting hours.</a:t>
+              <a:t>Holiday periods amplify existing late-night risks but do not introduce unique new patterns.</a:t>
             </a:r>
-          </a:p>
-          <a:p>
-            <a:pPr lvl="0" defTabSz="914400" eaLnBrk="0" fontAlgn="base" hangingPunct="0">
-              <a:spcBef>
-                <a:spcPct val="0"/>
-              </a:spcBef>
-              <a:spcAft>
-                <a:spcPct val="0"/>
-              </a:spcAft>
-            </a:pPr>
-            <a:endParaRPr lang="en-US" altLang="en-US" dirty="0">
+            <a:endParaRPr lang="en-AU" dirty="0">
               <a:latin typeface="Amasis MT Pro" panose="02040504050005020304" pitchFamily="18" charset="0"/>
             </a:endParaRPr>
-          </a:p>
-          <a:p>
-            <a:pPr marL="285750" lvl="0" indent="-285750" defTabSz="914400" eaLnBrk="0" fontAlgn="base" hangingPunct="0">
-              <a:spcBef>
-                <a:spcPct val="0"/>
-              </a:spcBef>
-              <a:spcAft>
-                <a:spcPct val="0"/>
-              </a:spcAft>
-              <a:buFont typeface="Arial" panose="020B0604020202020204" pitchFamily="34" charset="0"/>
-              <a:buChar char="•"/>
-            </a:pPr>
-            <a:r>
-              <a:rPr lang="en-US" altLang="en-US" dirty="0">
-                <a:latin typeface="Amasis MT Pro" panose="02040504050005020304" pitchFamily="18" charset="0"/>
-              </a:rPr>
-              <a:t>Holiday periods mirror these risks, especially late-night driving, without adding new patterns.</a:t>
-            </a:r>
           </a:p>
         </p:txBody>
       </p:sp>
@@ -14224,7 +13756,7 @@
 </p:sld>
 </file>
 
-<file path=ppt/slides/slide5.xml><?xml version="1.0" encoding="utf-8"?>
+<file path=ppt/slides/slide4.xml><?xml version="1.0" encoding="utf-8"?>
 <p:sld xmlns:a="http://schemas.openxmlformats.org/drawingml/2006/main" xmlns:r="http://schemas.openxmlformats.org/officeDocument/2006/relationships" xmlns:p="http://schemas.openxmlformats.org/presentationml/2006/main">
   <p:cSld>
     <p:bg>
@@ -14274,6 +13806,10 @@
           </p:nvPr>
         </p:nvSpPr>
         <p:spPr>
+          <a:xfrm>
+            <a:off x="0" y="0"/>
+            <a:ext cx="12192000" cy="777766"/>
+          </a:xfrm>
           <a:noFill/>
         </p:spPr>
         <p:txBody>
@@ -14282,11 +13818,12 @@
           </a:bodyPr>
           <a:lstStyle/>
           <a:p>
+            <a:pPr algn="ctr"/>
             <a:r>
               <a:rPr lang="en-US" dirty="0">
                 <a:latin typeface="Amasis MT Pro Black" panose="02040A04050005020304" pitchFamily="18" charset="0"/>
               </a:rPr>
-              <a:t>Executive SUMMARY</a:t>
+              <a:t>Dataset overview</a:t>
             </a:r>
           </a:p>
         </p:txBody>
@@ -14315,183 +13852,117 @@
             <a:fld id="{CBD12358-51D2-46B3-9BDE-DF29528B9454}" type="slidenum">
               <a:rPr lang="en-US" smtClean="0"/>
               <a:pPr/>
-              <a:t>5</a:t>
+              <a:t>4</a:t>
             </a:fld>
             <a:endParaRPr lang="en-US" dirty="0"/>
           </a:p>
         </p:txBody>
       </p:sp>
-      <p:sp>
-        <p:nvSpPr>
-          <p:cNvPr id="9" name="TextBox 8">
+      <p:pic>
+        <p:nvPicPr>
+          <p:cNvPr id="10" name="Picture 9" descr="A purple rectangle with white text&#10;&#10;AI-generated content may be incorrect.">
             <a:extLst>
               <a:ext uri="{FF2B5EF4-FFF2-40B4-BE49-F238E27FC236}">
-                <a16:creationId xmlns:a16="http://schemas.microsoft.com/office/drawing/2014/main" id="{11B8C947-600D-44A5-6761-BAF038BE52BB}"/>
+                <a16:creationId xmlns:a16="http://schemas.microsoft.com/office/drawing/2014/main" id="{702D0DC4-B231-78E3-EB05-902AE07708FC}"/>
               </a:ext>
             </a:extLst>
           </p:cNvPr>
-          <p:cNvSpPr txBox="1"/>
+          <p:cNvPicPr>
+            <a:picLocks noChangeAspect="1"/>
+          </p:cNvPicPr>
           <p:nvPr/>
-        </p:nvSpPr>
+        </p:nvPicPr>
+        <p:blipFill>
+          <a:blip r:embed="rId2"/>
+          <a:srcRect l="13398" t="19764" r="13111" b="22204"/>
+          <a:stretch>
+            <a:fillRect/>
+          </a:stretch>
+        </p:blipFill>
         <p:spPr>
           <a:xfrm>
-            <a:off x="685801" y="1948618"/>
-            <a:ext cx="10411547" cy="2862322"/>
+            <a:off x="3945582" y="1108316"/>
+            <a:ext cx="4300833" cy="1740513"/>
+          </a:xfrm>
+          <a:prstGeom prst="rect">
+            <a:avLst/>
+          </a:prstGeom>
+        </p:spPr>
+      </p:pic>
+      <p:pic>
+        <p:nvPicPr>
+          <p:cNvPr id="1026" name="Picture 2" descr="Purple map of Australia with clear state borders. High-detail design,  perfect for infographics, education, and graphic projects. Includes major  territories, isolated on a white background. 55572955 Vector Art at Vecteezy">
+            <a:extLst>
+              <a:ext uri="{FF2B5EF4-FFF2-40B4-BE49-F238E27FC236}">
+                <a16:creationId xmlns:a16="http://schemas.microsoft.com/office/drawing/2014/main" id="{A9CDA70E-F4BD-2672-2E9A-4748EE7D30E3}"/>
+              </a:ext>
+            </a:extLst>
+          </p:cNvPr>
+          <p:cNvPicPr>
+            <a:picLocks noChangeAspect="1" noChangeArrowheads="1"/>
+          </p:cNvPicPr>
+          <p:nvPr/>
+        </p:nvPicPr>
+        <p:blipFill rotWithShape="1">
+          <a:blip r:embed="rId3">
+            <a:extLst>
+              <a:ext uri="{BEBA8EAE-BF5A-486C-A8C5-ECC9F3942E4B}">
+                <a14:imgProps xmlns:a14="http://schemas.microsoft.com/office/drawing/2010/main">
+                  <a14:imgLayer r:embed="rId4">
+                    <a14:imgEffect>
+                      <a14:backgroundRemoval t="10000" b="90000" l="9184" r="90714">
+                        <a14:foregroundMark x1="58673" y1="67347" x2="59286" y2="67551"/>
+                        <a14:foregroundMark x1="44592" y1="18163" x2="44490" y2="18163"/>
+                        <a14:foregroundMark x1="56939" y1="23265" x2="56939" y2="23367"/>
+                        <a14:foregroundMark x1="62143" y1="28673" x2="62959" y2="28673"/>
+                        <a14:foregroundMark x1="90204" y1="45714" x2="90510" y2="46939"/>
+                        <a14:foregroundMark x1="90816" y1="52041" x2="90816" y2="53980"/>
+                        <a14:foregroundMark x1="79694" y1="75714" x2="80510" y2="76735"/>
+                        <a14:foregroundMark x1="76811" y1="78027" x2="80204" y2="78469"/>
+                        <a14:foregroundMark x1="73163" y1="77551" x2="75263" y2="77825"/>
+                        <a14:foregroundMark x1="80204" y1="78469" x2="75646" y2="80320"/>
+                        <a14:foregroundMark x1="74787" y1="81714" x2="76939" y2="82857"/>
+                        <a14:foregroundMark x1="72245" y1="75408" x2="71224" y2="75714"/>
+                        <a14:foregroundMark x1="9184" y1="47041" x2="10306" y2="48367"/>
+                        <a14:backgroundMark x1="73469" y1="80816" x2="74082" y2="82041"/>
+                        <a14:backgroundMark x1="75306" y1="77755" x2="77041" y2="77653"/>
+                        <a14:backgroundMark x1="76939" y1="78061" x2="76939" y2="78061"/>
+                        <a14:backgroundMark x1="76837" y1="77959" x2="76837" y2="77959"/>
+                      </a14:backgroundRemoval>
+                    </a14:imgEffect>
+                  </a14:imgLayer>
+                </a14:imgProps>
+              </a:ext>
+              <a:ext uri="{28A0092B-C50C-407E-A947-70E740481C1C}">
+                <a14:useLocalDpi xmlns:a14="http://schemas.microsoft.com/office/drawing/2010/main" val="0"/>
+              </a:ext>
+            </a:extLst>
+          </a:blip>
+          <a:srcRect l="7366" t="14536" r="7650" b="13561"/>
+          <a:stretch>
+            <a:fillRect/>
+          </a:stretch>
+        </p:blipFill>
+        <p:spPr bwMode="auto">
+          <a:xfrm>
+            <a:off x="3945582" y="2952626"/>
+            <a:ext cx="4300833" cy="3638851"/>
           </a:xfrm>
           <a:prstGeom prst="rect">
             <a:avLst/>
           </a:prstGeom>
           <a:noFill/>
+          <a:extLst>
+            <a:ext uri="{909E8E84-426E-40DD-AFC4-6F175D3DCCD1}">
+              <a14:hiddenFill xmlns:a14="http://schemas.microsoft.com/office/drawing/2010/main">
+                <a:solidFill>
+                  <a:srgbClr val="FFFFFF"/>
+                </a:solidFill>
+              </a14:hiddenFill>
+            </a:ext>
+          </a:extLst>
         </p:spPr>
-        <p:txBody>
-          <a:bodyPr wrap="square" rtlCol="0">
-            <a:spAutoFit/>
-          </a:bodyPr>
-          <a:lstStyle/>
-          <a:p>
-            <a:pPr marL="285750" lvl="0" indent="-285750" defTabSz="914400" eaLnBrk="0" fontAlgn="base" hangingPunct="0">
-              <a:spcBef>
-                <a:spcPct val="0"/>
-              </a:spcBef>
-              <a:spcAft>
-                <a:spcPct val="0"/>
-              </a:spcAft>
-              <a:buFont typeface="Arial" panose="020B0604020202020204" pitchFamily="34" charset="0"/>
-              <a:buChar char="•"/>
-            </a:pPr>
-            <a:r>
-              <a:rPr lang="en-US" altLang="en-US" dirty="0">
-                <a:latin typeface="Amasis MT Pro" panose="02040504050005020304" pitchFamily="18" charset="0"/>
-              </a:rPr>
-              <a:t>Fatal crashes have declined long-term but plateaued in recent years.</a:t>
-            </a:r>
-          </a:p>
-          <a:p>
-            <a:pPr lvl="0" defTabSz="914400" eaLnBrk="0" fontAlgn="base" hangingPunct="0">
-              <a:spcBef>
-                <a:spcPct val="0"/>
-              </a:spcBef>
-              <a:spcAft>
-                <a:spcPct val="0"/>
-              </a:spcAft>
-            </a:pPr>
-            <a:endParaRPr lang="en-US" altLang="en-US" dirty="0">
-              <a:latin typeface="Amasis MT Pro" panose="02040504050005020304" pitchFamily="18" charset="0"/>
-            </a:endParaRPr>
-          </a:p>
-          <a:p>
-            <a:pPr marL="285750" lvl="0" indent="-285750" defTabSz="914400" eaLnBrk="0" fontAlgn="base" hangingPunct="0">
-              <a:spcBef>
-                <a:spcPct val="0"/>
-              </a:spcBef>
-              <a:spcAft>
-                <a:spcPct val="0"/>
-              </a:spcAft>
-              <a:buFont typeface="Arial" panose="020B0604020202020204" pitchFamily="34" charset="0"/>
-              <a:buChar char="•"/>
-            </a:pPr>
-            <a:r>
-              <a:rPr lang="en-US" altLang="en-US" dirty="0">
-                <a:latin typeface="Amasis MT Pro" panose="02040504050005020304" pitchFamily="18" charset="0"/>
-              </a:rPr>
-              <a:t>Weekends and late-night hours remain the highest-risk windows.</a:t>
-            </a:r>
-          </a:p>
-          <a:p>
-            <a:pPr lvl="0" defTabSz="914400" eaLnBrk="0" fontAlgn="base" hangingPunct="0">
-              <a:spcBef>
-                <a:spcPct val="0"/>
-              </a:spcBef>
-              <a:spcAft>
-                <a:spcPct val="0"/>
-              </a:spcAft>
-            </a:pPr>
-            <a:endParaRPr lang="en-US" altLang="en-US" dirty="0">
-              <a:latin typeface="Amasis MT Pro" panose="02040504050005020304" pitchFamily="18" charset="0"/>
-            </a:endParaRPr>
-          </a:p>
-          <a:p>
-            <a:pPr marL="285750" lvl="0" indent="-285750" defTabSz="914400" eaLnBrk="0" fontAlgn="base" hangingPunct="0">
-              <a:spcBef>
-                <a:spcPct val="0"/>
-              </a:spcBef>
-              <a:spcAft>
-                <a:spcPct val="0"/>
-              </a:spcAft>
-              <a:buFont typeface="Arial" panose="020B0604020202020204" pitchFamily="34" charset="0"/>
-              <a:buChar char="•"/>
-            </a:pPr>
-            <a:r>
-              <a:rPr lang="en-US" altLang="en-US" dirty="0">
-                <a:latin typeface="Amasis MT Pro" panose="02040504050005020304" pitchFamily="18" charset="0"/>
-              </a:rPr>
-              <a:t>Young male drivers are disproportionately involved in fatal crashes.</a:t>
-            </a:r>
-          </a:p>
-          <a:p>
-            <a:pPr lvl="0" defTabSz="914400" eaLnBrk="0" fontAlgn="base" hangingPunct="0">
-              <a:spcBef>
-                <a:spcPct val="0"/>
-              </a:spcBef>
-              <a:spcAft>
-                <a:spcPct val="0"/>
-              </a:spcAft>
-            </a:pPr>
-            <a:endParaRPr lang="en-US" altLang="en-US" dirty="0">
-              <a:latin typeface="Amasis MT Pro" panose="02040504050005020304" pitchFamily="18" charset="0"/>
-            </a:endParaRPr>
-          </a:p>
-          <a:p>
-            <a:pPr marL="285750" lvl="0" indent="-285750" defTabSz="914400" eaLnBrk="0" fontAlgn="base" hangingPunct="0">
-              <a:spcBef>
-                <a:spcPct val="0"/>
-              </a:spcBef>
-              <a:spcAft>
-                <a:spcPct val="0"/>
-              </a:spcAft>
-              <a:buFont typeface="Arial" panose="020B0604020202020204" pitchFamily="34" charset="0"/>
-              <a:buChar char="•"/>
-            </a:pPr>
-            <a:r>
-              <a:rPr lang="en-US" altLang="en-US" dirty="0">
-                <a:latin typeface="Amasis MT Pro" panose="02040504050005020304" pitchFamily="18" charset="0"/>
-              </a:rPr>
-              <a:t>Risks differ across environments: single-vehicle crashes dominate at high speed/night; multi-vehicle crashes peak in commuting hours.</a:t>
-            </a:r>
-          </a:p>
-          <a:p>
-            <a:pPr lvl="0" defTabSz="914400" eaLnBrk="0" fontAlgn="base" hangingPunct="0">
-              <a:spcBef>
-                <a:spcPct val="0"/>
-              </a:spcBef>
-              <a:spcAft>
-                <a:spcPct val="0"/>
-              </a:spcAft>
-            </a:pPr>
-            <a:endParaRPr lang="en-US" altLang="en-US" dirty="0">
-              <a:latin typeface="Amasis MT Pro" panose="02040504050005020304" pitchFamily="18" charset="0"/>
-            </a:endParaRPr>
-          </a:p>
-          <a:p>
-            <a:pPr marL="285750" lvl="0" indent="-285750" defTabSz="914400" eaLnBrk="0" fontAlgn="base" hangingPunct="0">
-              <a:spcBef>
-                <a:spcPct val="0"/>
-              </a:spcBef>
-              <a:spcAft>
-                <a:spcPct val="0"/>
-              </a:spcAft>
-              <a:buFont typeface="Arial" panose="020B0604020202020204" pitchFamily="34" charset="0"/>
-              <a:buChar char="•"/>
-            </a:pPr>
-            <a:r>
-              <a:rPr lang="en-US" altLang="en-US" dirty="0">
-                <a:latin typeface="Amasis MT Pro" panose="02040504050005020304" pitchFamily="18" charset="0"/>
-              </a:rPr>
-              <a:t>Holiday periods mirror these risks, especially late-night driving, without adding new patterns.</a:t>
-            </a:r>
-          </a:p>
-        </p:txBody>
-      </p:sp>
+      </p:pic>
     </p:spTree>
     <p:extLst>
       <p:ext uri="{BB962C8B-B14F-4D97-AF65-F5344CB8AC3E}">
@@ -14505,7 +13976,1167 @@
 </p:sld>
 </file>
 
+<file path=ppt/slides/slide5.xml><?xml version="1.0" encoding="utf-8"?>
+<p:sld xmlns:a="http://schemas.openxmlformats.org/drawingml/2006/main" xmlns:r="http://schemas.openxmlformats.org/officeDocument/2006/relationships" xmlns:p="http://schemas.openxmlformats.org/presentationml/2006/main">
+  <p:cSld>
+    <p:bg>
+      <p:bgPr>
+        <a:solidFill>
+          <a:schemeClr val="accent1">
+            <a:lumMod val="50000"/>
+          </a:schemeClr>
+        </a:solidFill>
+        <a:effectLst/>
+      </p:bgPr>
+    </p:bg>
+    <p:spTree>
+      <p:nvGrpSpPr>
+        <p:cNvPr id="1" name="">
+          <a:extLst>
+            <a:ext uri="{FF2B5EF4-FFF2-40B4-BE49-F238E27FC236}">
+              <a16:creationId xmlns:a16="http://schemas.microsoft.com/office/drawing/2014/main" id="{07086A42-50A2-30D3-69C9-7A00E076F3EB}"/>
+            </a:ext>
+          </a:extLst>
+        </p:cNvPr>
+        <p:cNvGrpSpPr/>
+        <p:nvPr/>
+      </p:nvGrpSpPr>
+      <p:grpSpPr>
+        <a:xfrm>
+          <a:off x="0" y="0"/>
+          <a:ext cx="0" cy="0"/>
+          <a:chOff x="0" y="0"/>
+          <a:chExt cx="0" cy="0"/>
+        </a:xfrm>
+      </p:grpSpPr>
+      <p:sp>
+        <p:nvSpPr>
+          <p:cNvPr id="2" name="Title 1">
+            <a:extLst>
+              <a:ext uri="{FF2B5EF4-FFF2-40B4-BE49-F238E27FC236}">
+                <a16:creationId xmlns:a16="http://schemas.microsoft.com/office/drawing/2014/main" id="{9B9A26F2-6E99-0DFA-051C-44AC903E851F}"/>
+              </a:ext>
+            </a:extLst>
+          </p:cNvPr>
+          <p:cNvSpPr>
+            <a:spLocks noGrp="1"/>
+          </p:cNvSpPr>
+          <p:nvPr>
+            <p:ph type="title"/>
+          </p:nvPr>
+        </p:nvSpPr>
+        <p:spPr>
+          <a:xfrm>
+            <a:off x="0" y="0"/>
+            <a:ext cx="12192000" cy="655846"/>
+          </a:xfrm>
+          <a:noFill/>
+        </p:spPr>
+        <p:txBody>
+          <a:bodyPr anchor="t">
+            <a:noAutofit/>
+          </a:bodyPr>
+          <a:lstStyle/>
+          <a:p>
+            <a:pPr algn="ctr"/>
+            <a:r>
+              <a:rPr lang="en-US" dirty="0">
+                <a:latin typeface="Amasis MT Pro Black" panose="02040A04050005020304" pitchFamily="18" charset="0"/>
+              </a:rPr>
+              <a:t>CRASH TRENDS OVER TIME</a:t>
+            </a:r>
+          </a:p>
+        </p:txBody>
+      </p:sp>
+      <p:pic>
+        <p:nvPicPr>
+          <p:cNvPr id="5" name="Picture 4">
+            <a:extLst>
+              <a:ext uri="{FF2B5EF4-FFF2-40B4-BE49-F238E27FC236}">
+                <a16:creationId xmlns:a16="http://schemas.microsoft.com/office/drawing/2014/main" id="{66F0245A-E6E5-B591-5E13-E4D550FEA6CC}"/>
+              </a:ext>
+            </a:extLst>
+          </p:cNvPr>
+          <p:cNvPicPr>
+            <a:picLocks noChangeAspect="1"/>
+          </p:cNvPicPr>
+          <p:nvPr/>
+        </p:nvPicPr>
+        <p:blipFill>
+          <a:blip r:embed="rId2"/>
+          <a:stretch>
+            <a:fillRect/>
+          </a:stretch>
+        </p:blipFill>
+        <p:spPr>
+          <a:xfrm>
+            <a:off x="0" y="918552"/>
+            <a:ext cx="9389942" cy="5363303"/>
+          </a:xfrm>
+          <a:prstGeom prst="rect">
+            <a:avLst/>
+          </a:prstGeom>
+        </p:spPr>
+      </p:pic>
+      <p:sp>
+        <p:nvSpPr>
+          <p:cNvPr id="12" name="TextBox 11">
+            <a:extLst>
+              <a:ext uri="{FF2B5EF4-FFF2-40B4-BE49-F238E27FC236}">
+                <a16:creationId xmlns:a16="http://schemas.microsoft.com/office/drawing/2014/main" id="{9152614F-6B1B-9B65-09E0-876008445FF9}"/>
+              </a:ext>
+            </a:extLst>
+          </p:cNvPr>
+          <p:cNvSpPr txBox="1"/>
+          <p:nvPr/>
+        </p:nvSpPr>
+        <p:spPr>
+          <a:xfrm>
+            <a:off x="9324777" y="889843"/>
+            <a:ext cx="2795752" cy="5078313"/>
+          </a:xfrm>
+          <a:prstGeom prst="rect">
+            <a:avLst/>
+          </a:prstGeom>
+          <a:noFill/>
+        </p:spPr>
+        <p:txBody>
+          <a:bodyPr wrap="square">
+            <a:spAutoFit/>
+          </a:bodyPr>
+          <a:lstStyle/>
+          <a:p>
+            <a:pPr marL="285750" indent="-285750">
+              <a:buFont typeface="Arial" panose="020B0604020202020204" pitchFamily="34" charset="0"/>
+              <a:buChar char="•"/>
+            </a:pPr>
+            <a:r>
+              <a:rPr lang="en-US" dirty="0">
+                <a:latin typeface="Amasis MT Pro" panose="02040504050005020304" pitchFamily="18" charset="0"/>
+              </a:rPr>
+              <a:t>Fatal crashes declined sharply from late 1980s → mid-2010s.</a:t>
+            </a:r>
+          </a:p>
+          <a:p>
+            <a:pPr marL="285750" indent="-285750">
+              <a:buFont typeface="Arial" panose="020B0604020202020204" pitchFamily="34" charset="0"/>
+              <a:buChar char="•"/>
+            </a:pPr>
+            <a:endParaRPr lang="en-US" dirty="0">
+              <a:latin typeface="Amasis MT Pro" panose="02040504050005020304" pitchFamily="18" charset="0"/>
+            </a:endParaRPr>
+          </a:p>
+          <a:p>
+            <a:pPr marL="285750" indent="-285750">
+              <a:buFont typeface="Arial" panose="020B0604020202020204" pitchFamily="34" charset="0"/>
+              <a:buChar char="•"/>
+            </a:pPr>
+            <a:r>
+              <a:rPr lang="en-US" dirty="0">
+                <a:latin typeface="Amasis MT Pro" panose="02040504050005020304" pitchFamily="18" charset="0"/>
+              </a:rPr>
+              <a:t>Decline is remarkable given higher car ownership, more roads, and greater traffic volumes today.</a:t>
+            </a:r>
+          </a:p>
+          <a:p>
+            <a:pPr marL="285750" indent="-285750">
+              <a:buFont typeface="Arial" panose="020B0604020202020204" pitchFamily="34" charset="0"/>
+              <a:buChar char="•"/>
+            </a:pPr>
+            <a:endParaRPr lang="en-US" dirty="0">
+              <a:latin typeface="Amasis MT Pro" panose="02040504050005020304" pitchFamily="18" charset="0"/>
+            </a:endParaRPr>
+          </a:p>
+          <a:p>
+            <a:pPr marL="285750" indent="-285750">
+              <a:buFont typeface="Arial" panose="020B0604020202020204" pitchFamily="34" charset="0"/>
+              <a:buChar char="•"/>
+            </a:pPr>
+            <a:endParaRPr lang="en-US" dirty="0">
+              <a:latin typeface="Amasis MT Pro" panose="02040504050005020304" pitchFamily="18" charset="0"/>
+            </a:endParaRPr>
+          </a:p>
+          <a:p>
+            <a:pPr marL="285750" indent="-285750">
+              <a:buFont typeface="Arial" panose="020B0604020202020204" pitchFamily="34" charset="0"/>
+              <a:buChar char="•"/>
+            </a:pPr>
+            <a:r>
+              <a:rPr lang="en-US" dirty="0">
+                <a:latin typeface="Amasis MT Pro" panose="02040504050005020304" pitchFamily="18" charset="0"/>
+              </a:rPr>
+              <a:t>Plateau since ~2020, with slight upward drift.</a:t>
+            </a:r>
+          </a:p>
+          <a:p>
+            <a:pPr marL="285750" indent="-285750">
+              <a:buFont typeface="Arial" panose="020B0604020202020204" pitchFamily="34" charset="0"/>
+              <a:buChar char="•"/>
+            </a:pPr>
+            <a:endParaRPr lang="en-US" dirty="0">
+              <a:latin typeface="Amasis MT Pro" panose="02040504050005020304" pitchFamily="18" charset="0"/>
+            </a:endParaRPr>
+          </a:p>
+          <a:p>
+            <a:pPr marL="285750" indent="-285750">
+              <a:buFont typeface="Arial" panose="020B0604020202020204" pitchFamily="34" charset="0"/>
+              <a:buChar char="•"/>
+            </a:pPr>
+            <a:endParaRPr lang="en-US" dirty="0">
+              <a:latin typeface="Amasis MT Pro" panose="02040504050005020304" pitchFamily="18" charset="0"/>
+            </a:endParaRPr>
+          </a:p>
+          <a:p>
+            <a:pPr marL="285750" indent="-285750">
+              <a:buFont typeface="Arial" panose="020B0604020202020204" pitchFamily="34" charset="0"/>
+              <a:buChar char="•"/>
+            </a:pPr>
+            <a:r>
+              <a:rPr lang="en-US" dirty="0">
+                <a:latin typeface="Amasis MT Pro" panose="02040504050005020304" pitchFamily="18" charset="0"/>
+              </a:rPr>
+              <a:t>2025 dip is incomplete year effect (data still incoming).</a:t>
+            </a:r>
+            <a:endParaRPr lang="en-AU" dirty="0">
+              <a:latin typeface="Amasis MT Pro" panose="02040504050005020304" pitchFamily="18" charset="0"/>
+            </a:endParaRPr>
+          </a:p>
+        </p:txBody>
+      </p:sp>
+    </p:spTree>
+    <p:extLst>
+      <p:ext uri="{BB962C8B-B14F-4D97-AF65-F5344CB8AC3E}">
+        <p14:creationId xmlns:p14="http://schemas.microsoft.com/office/powerpoint/2010/main" val="3135042552"/>
+      </p:ext>
+    </p:extLst>
+  </p:cSld>
+  <p:clrMapOvr>
+    <a:masterClrMapping/>
+  </p:clrMapOvr>
+</p:sld>
+</file>
+
 <file path=ppt/slides/slide6.xml><?xml version="1.0" encoding="utf-8"?>
+<p:sld xmlns:a="http://schemas.openxmlformats.org/drawingml/2006/main" xmlns:r="http://schemas.openxmlformats.org/officeDocument/2006/relationships" xmlns:p="http://schemas.openxmlformats.org/presentationml/2006/main">
+  <p:cSld>
+    <p:bg>
+      <p:bgPr>
+        <a:solidFill>
+          <a:schemeClr val="accent1">
+            <a:lumMod val="50000"/>
+          </a:schemeClr>
+        </a:solidFill>
+        <a:effectLst/>
+      </p:bgPr>
+    </p:bg>
+    <p:spTree>
+      <p:nvGrpSpPr>
+        <p:cNvPr id="1" name="">
+          <a:extLst>
+            <a:ext uri="{FF2B5EF4-FFF2-40B4-BE49-F238E27FC236}">
+              <a16:creationId xmlns:a16="http://schemas.microsoft.com/office/drawing/2014/main" id="{450B3EBA-0E85-5419-7990-FDB719037684}"/>
+            </a:ext>
+          </a:extLst>
+        </p:cNvPr>
+        <p:cNvGrpSpPr/>
+        <p:nvPr/>
+      </p:nvGrpSpPr>
+      <p:grpSpPr>
+        <a:xfrm>
+          <a:off x="0" y="0"/>
+          <a:ext cx="0" cy="0"/>
+          <a:chOff x="0" y="0"/>
+          <a:chExt cx="0" cy="0"/>
+        </a:xfrm>
+      </p:grpSpPr>
+      <p:sp>
+        <p:nvSpPr>
+          <p:cNvPr id="2" name="Title 1">
+            <a:extLst>
+              <a:ext uri="{FF2B5EF4-FFF2-40B4-BE49-F238E27FC236}">
+                <a16:creationId xmlns:a16="http://schemas.microsoft.com/office/drawing/2014/main" id="{B7C22F86-580C-03F2-4249-3980CD92E849}"/>
+              </a:ext>
+            </a:extLst>
+          </p:cNvPr>
+          <p:cNvSpPr>
+            <a:spLocks noGrp="1"/>
+          </p:cNvSpPr>
+          <p:nvPr>
+            <p:ph type="title"/>
+          </p:nvPr>
+        </p:nvSpPr>
+        <p:spPr>
+          <a:xfrm>
+            <a:off x="0" y="0"/>
+            <a:ext cx="12192000" cy="655846"/>
+          </a:xfrm>
+          <a:noFill/>
+        </p:spPr>
+        <p:txBody>
+          <a:bodyPr anchor="t">
+            <a:noAutofit/>
+          </a:bodyPr>
+          <a:lstStyle/>
+          <a:p>
+            <a:pPr algn="ctr"/>
+            <a:r>
+              <a:rPr lang="en-US" dirty="0">
+                <a:latin typeface="Amasis MT Pro Black" panose="02040A04050005020304" pitchFamily="18" charset="0"/>
+              </a:rPr>
+              <a:t>Fatal CRASH Demographics</a:t>
+            </a:r>
+          </a:p>
+        </p:txBody>
+      </p:sp>
+      <p:sp>
+        <p:nvSpPr>
+          <p:cNvPr id="7" name="TextBox 6">
+            <a:extLst>
+              <a:ext uri="{FF2B5EF4-FFF2-40B4-BE49-F238E27FC236}">
+                <a16:creationId xmlns:a16="http://schemas.microsoft.com/office/drawing/2014/main" id="{D0428219-1C01-0A51-C185-45B6B9276EC6}"/>
+              </a:ext>
+            </a:extLst>
+          </p:cNvPr>
+          <p:cNvSpPr txBox="1"/>
+          <p:nvPr/>
+        </p:nvSpPr>
+        <p:spPr>
+          <a:xfrm>
+            <a:off x="136634" y="4807169"/>
+            <a:ext cx="6482781" cy="2031325"/>
+          </a:xfrm>
+          <a:prstGeom prst="rect">
+            <a:avLst/>
+          </a:prstGeom>
+          <a:noFill/>
+        </p:spPr>
+        <p:txBody>
+          <a:bodyPr wrap="square">
+            <a:spAutoFit/>
+          </a:bodyPr>
+          <a:lstStyle/>
+          <a:p>
+            <a:pPr marL="285750" indent="-285750">
+              <a:buFont typeface="Arial" panose="020B0604020202020204" pitchFamily="34" charset="0"/>
+              <a:buChar char="•"/>
+            </a:pPr>
+            <a:r>
+              <a:rPr lang="en-US" dirty="0">
+                <a:latin typeface="Amasis MT Pro" panose="02040504050005020304" pitchFamily="18" charset="0"/>
+              </a:rPr>
+              <a:t>Young adults (18–25) are heavily overrepresented given their share of the population.</a:t>
+            </a:r>
+          </a:p>
+          <a:p>
+            <a:pPr marL="285750" indent="-285750">
+              <a:buFont typeface="Arial" panose="020B0604020202020204" pitchFamily="34" charset="0"/>
+              <a:buChar char="•"/>
+            </a:pPr>
+            <a:endParaRPr lang="en-US" dirty="0">
+              <a:latin typeface="Amasis MT Pro" panose="02040504050005020304" pitchFamily="18" charset="0"/>
+            </a:endParaRPr>
+          </a:p>
+          <a:p>
+            <a:pPr marL="285750" indent="-285750">
+              <a:buFont typeface="Arial" panose="020B0604020202020204" pitchFamily="34" charset="0"/>
+              <a:buChar char="•"/>
+            </a:pPr>
+            <a:endParaRPr lang="en-US" dirty="0">
+              <a:latin typeface="Amasis MT Pro" panose="02040504050005020304" pitchFamily="18" charset="0"/>
+            </a:endParaRPr>
+          </a:p>
+          <a:p>
+            <a:pPr marL="285750" indent="-285750">
+              <a:buFont typeface="Arial" panose="020B0604020202020204" pitchFamily="34" charset="0"/>
+              <a:buChar char="•"/>
+            </a:pPr>
+            <a:r>
+              <a:rPr lang="en-US" dirty="0">
+                <a:latin typeface="Amasis MT Pro" panose="02040504050005020304" pitchFamily="18" charset="0"/>
+              </a:rPr>
+              <a:t>Middle-aged drivers (26–40, 41–60) still contribute significantly, showing crashes aren’t only a “young driver problem.”</a:t>
+            </a:r>
+          </a:p>
+        </p:txBody>
+      </p:sp>
+      <p:pic>
+        <p:nvPicPr>
+          <p:cNvPr id="4" name="Picture 3">
+            <a:extLst>
+              <a:ext uri="{FF2B5EF4-FFF2-40B4-BE49-F238E27FC236}">
+                <a16:creationId xmlns:a16="http://schemas.microsoft.com/office/drawing/2014/main" id="{F9059107-CA04-B50B-D391-D775CCF5A6D2}"/>
+              </a:ext>
+            </a:extLst>
+          </p:cNvPr>
+          <p:cNvPicPr>
+            <a:picLocks noChangeAspect="1"/>
+          </p:cNvPicPr>
+          <p:nvPr/>
+        </p:nvPicPr>
+        <p:blipFill>
+          <a:blip r:embed="rId2"/>
+          <a:stretch>
+            <a:fillRect/>
+          </a:stretch>
+        </p:blipFill>
+        <p:spPr>
+          <a:xfrm>
+            <a:off x="1" y="925107"/>
+            <a:ext cx="7617898" cy="3734402"/>
+          </a:xfrm>
+          <a:prstGeom prst="rect">
+            <a:avLst/>
+          </a:prstGeom>
+        </p:spPr>
+      </p:pic>
+      <p:pic>
+        <p:nvPicPr>
+          <p:cNvPr id="8" name="Picture 7">
+            <a:extLst>
+              <a:ext uri="{FF2B5EF4-FFF2-40B4-BE49-F238E27FC236}">
+                <a16:creationId xmlns:a16="http://schemas.microsoft.com/office/drawing/2014/main" id="{67FC4A8B-9EA4-F6C4-F155-04757C38EA19}"/>
+              </a:ext>
+            </a:extLst>
+          </p:cNvPr>
+          <p:cNvPicPr>
+            <a:picLocks noChangeAspect="1"/>
+          </p:cNvPicPr>
+          <p:nvPr/>
+        </p:nvPicPr>
+        <p:blipFill>
+          <a:blip r:embed="rId3"/>
+          <a:stretch>
+            <a:fillRect/>
+          </a:stretch>
+        </p:blipFill>
+        <p:spPr>
+          <a:xfrm>
+            <a:off x="7505309" y="925107"/>
+            <a:ext cx="4686691" cy="3533381"/>
+          </a:xfrm>
+          <a:prstGeom prst="rect">
+            <a:avLst/>
+          </a:prstGeom>
+        </p:spPr>
+      </p:pic>
+      <p:sp>
+        <p:nvSpPr>
+          <p:cNvPr id="10" name="TextBox 9">
+            <a:extLst>
+              <a:ext uri="{FF2B5EF4-FFF2-40B4-BE49-F238E27FC236}">
+                <a16:creationId xmlns:a16="http://schemas.microsoft.com/office/drawing/2014/main" id="{6C248970-A7D1-58EC-45D1-5432FFE8E056}"/>
+              </a:ext>
+            </a:extLst>
+          </p:cNvPr>
+          <p:cNvSpPr txBox="1"/>
+          <p:nvPr/>
+        </p:nvSpPr>
+        <p:spPr>
+          <a:xfrm>
+            <a:off x="6701396" y="4754813"/>
+            <a:ext cx="5490604" cy="2031325"/>
+          </a:xfrm>
+          <a:prstGeom prst="rect">
+            <a:avLst/>
+          </a:prstGeom>
+          <a:noFill/>
+        </p:spPr>
+        <p:txBody>
+          <a:bodyPr wrap="square">
+            <a:spAutoFit/>
+          </a:bodyPr>
+          <a:lstStyle/>
+          <a:p>
+            <a:pPr marL="285750" indent="-285750">
+              <a:buFont typeface="Arial" panose="020B0604020202020204" pitchFamily="34" charset="0"/>
+              <a:buChar char="•"/>
+            </a:pPr>
+            <a:r>
+              <a:rPr lang="en-US" dirty="0">
+                <a:latin typeface="Amasis MT Pro" panose="02040504050005020304" pitchFamily="18" charset="0"/>
+              </a:rPr>
+              <a:t>Gender imbalance: ~72% of fatal crashes involve male drivers vs ~28% female.</a:t>
+            </a:r>
+          </a:p>
+          <a:p>
+            <a:pPr marL="285750" indent="-285750">
+              <a:buFont typeface="Arial" panose="020B0604020202020204" pitchFamily="34" charset="0"/>
+              <a:buChar char="•"/>
+            </a:pPr>
+            <a:endParaRPr lang="en-US" dirty="0">
+              <a:latin typeface="Amasis MT Pro" panose="02040504050005020304" pitchFamily="18" charset="0"/>
+            </a:endParaRPr>
+          </a:p>
+          <a:p>
+            <a:pPr marL="285750" indent="-285750">
+              <a:buFont typeface="Arial" panose="020B0604020202020204" pitchFamily="34" charset="0"/>
+              <a:buChar char="•"/>
+            </a:pPr>
+            <a:endParaRPr lang="en-US" dirty="0">
+              <a:latin typeface="Amasis MT Pro" panose="02040504050005020304" pitchFamily="18" charset="0"/>
+            </a:endParaRPr>
+          </a:p>
+          <a:p>
+            <a:pPr marL="285750" indent="-285750">
+              <a:buFont typeface="Arial" panose="020B0604020202020204" pitchFamily="34" charset="0"/>
+              <a:buChar char="•"/>
+            </a:pPr>
+            <a:r>
+              <a:rPr lang="en-US" dirty="0">
+                <a:latin typeface="Amasis MT Pro" panose="02040504050005020304" pitchFamily="18" charset="0"/>
+              </a:rPr>
+              <a:t>Elderly drivers (60+) show a increase, potentially due to fragility and slower reaction times.</a:t>
+            </a:r>
+          </a:p>
+          <a:p>
+            <a:pPr marL="285750" indent="-285750">
+              <a:buFont typeface="Arial" panose="020B0604020202020204" pitchFamily="34" charset="0"/>
+              <a:buChar char="•"/>
+            </a:pPr>
+            <a:endParaRPr lang="en-US" dirty="0">
+              <a:latin typeface="Amasis MT Pro" panose="02040504050005020304" pitchFamily="18" charset="0"/>
+            </a:endParaRPr>
+          </a:p>
+        </p:txBody>
+      </p:sp>
+    </p:spTree>
+    <p:extLst>
+      <p:ext uri="{BB962C8B-B14F-4D97-AF65-F5344CB8AC3E}">
+        <p14:creationId xmlns:p14="http://schemas.microsoft.com/office/powerpoint/2010/main" val="183639272"/>
+      </p:ext>
+    </p:extLst>
+  </p:cSld>
+  <p:clrMapOvr>
+    <a:masterClrMapping/>
+  </p:clrMapOvr>
+</p:sld>
+</file>
+
+<file path=ppt/slides/slide7.xml><?xml version="1.0" encoding="utf-8"?>
+<p:sld xmlns:a="http://schemas.openxmlformats.org/drawingml/2006/main" xmlns:r="http://schemas.openxmlformats.org/officeDocument/2006/relationships" xmlns:p="http://schemas.openxmlformats.org/presentationml/2006/main">
+  <p:cSld>
+    <p:bg>
+      <p:bgPr>
+        <a:solidFill>
+          <a:schemeClr val="accent1">
+            <a:lumMod val="50000"/>
+          </a:schemeClr>
+        </a:solidFill>
+        <a:effectLst/>
+      </p:bgPr>
+    </p:bg>
+    <p:spTree>
+      <p:nvGrpSpPr>
+        <p:cNvPr id="1" name="">
+          <a:extLst>
+            <a:ext uri="{FF2B5EF4-FFF2-40B4-BE49-F238E27FC236}">
+              <a16:creationId xmlns:a16="http://schemas.microsoft.com/office/drawing/2014/main" id="{A56C9889-C472-0227-98D2-CD04B865FECE}"/>
+            </a:ext>
+          </a:extLst>
+        </p:cNvPr>
+        <p:cNvGrpSpPr/>
+        <p:nvPr/>
+      </p:nvGrpSpPr>
+      <p:grpSpPr>
+        <a:xfrm>
+          <a:off x="0" y="0"/>
+          <a:ext cx="0" cy="0"/>
+          <a:chOff x="0" y="0"/>
+          <a:chExt cx="0" cy="0"/>
+        </a:xfrm>
+      </p:grpSpPr>
+      <p:sp>
+        <p:nvSpPr>
+          <p:cNvPr id="2" name="Title 1">
+            <a:extLst>
+              <a:ext uri="{FF2B5EF4-FFF2-40B4-BE49-F238E27FC236}">
+                <a16:creationId xmlns:a16="http://schemas.microsoft.com/office/drawing/2014/main" id="{B0EDCEC9-20DE-CDC2-70F4-C27D7AD4F352}"/>
+              </a:ext>
+            </a:extLst>
+          </p:cNvPr>
+          <p:cNvSpPr>
+            <a:spLocks noGrp="1"/>
+          </p:cNvSpPr>
+          <p:nvPr>
+            <p:ph type="title"/>
+          </p:nvPr>
+        </p:nvSpPr>
+        <p:spPr>
+          <a:xfrm>
+            <a:off x="0" y="0"/>
+            <a:ext cx="12192000" cy="655846"/>
+          </a:xfrm>
+          <a:noFill/>
+        </p:spPr>
+        <p:txBody>
+          <a:bodyPr anchor="t">
+            <a:noAutofit/>
+          </a:bodyPr>
+          <a:lstStyle/>
+          <a:p>
+            <a:pPr algn="ctr"/>
+            <a:r>
+              <a:rPr lang="en-US" dirty="0">
+                <a:latin typeface="Amasis MT Pro Black" panose="02040A04050005020304" pitchFamily="18" charset="0"/>
+              </a:rPr>
+              <a:t>Fatal CRASH Demographics</a:t>
+            </a:r>
+          </a:p>
+        </p:txBody>
+      </p:sp>
+      <p:sp>
+        <p:nvSpPr>
+          <p:cNvPr id="7" name="TextBox 6">
+            <a:extLst>
+              <a:ext uri="{FF2B5EF4-FFF2-40B4-BE49-F238E27FC236}">
+                <a16:creationId xmlns:a16="http://schemas.microsoft.com/office/drawing/2014/main" id="{A75D2491-774B-6AD0-DD67-F5BF65EBE687}"/>
+              </a:ext>
+            </a:extLst>
+          </p:cNvPr>
+          <p:cNvSpPr txBox="1"/>
+          <p:nvPr/>
+        </p:nvSpPr>
+        <p:spPr>
+          <a:xfrm>
+            <a:off x="136635" y="4807169"/>
+            <a:ext cx="6251552" cy="1477328"/>
+          </a:xfrm>
+          <a:prstGeom prst="rect">
+            <a:avLst/>
+          </a:prstGeom>
+          <a:noFill/>
+        </p:spPr>
+        <p:txBody>
+          <a:bodyPr wrap="square">
+            <a:spAutoFit/>
+          </a:bodyPr>
+          <a:lstStyle/>
+          <a:p>
+            <a:pPr marL="285750" indent="-285750">
+              <a:buFont typeface="Arial" panose="020B0604020202020204" pitchFamily="34" charset="0"/>
+              <a:buChar char="•"/>
+            </a:pPr>
+            <a:r>
+              <a:rPr lang="en-US" dirty="0">
+                <a:latin typeface="Amasis MT Pro" panose="02040504050005020304" pitchFamily="18" charset="0"/>
+              </a:rPr>
+              <a:t>Almost half of all fatal crashes (46%) occur on high-speed roads (100+).</a:t>
+            </a:r>
+          </a:p>
+          <a:p>
+            <a:pPr marL="285750" indent="-285750">
+              <a:buFont typeface="Arial" panose="020B0604020202020204" pitchFamily="34" charset="0"/>
+              <a:buChar char="•"/>
+            </a:pPr>
+            <a:endParaRPr lang="en-US" dirty="0">
+              <a:latin typeface="Amasis MT Pro" panose="02040504050005020304" pitchFamily="18" charset="0"/>
+            </a:endParaRPr>
+          </a:p>
+          <a:p>
+            <a:pPr marL="285750" indent="-285750">
+              <a:buFont typeface="Arial" panose="020B0604020202020204" pitchFamily="34" charset="0"/>
+              <a:buChar char="•"/>
+            </a:pPr>
+            <a:r>
+              <a:rPr lang="en-US" dirty="0">
+                <a:latin typeface="Amasis MT Pro" panose="02040504050005020304" pitchFamily="18" charset="0"/>
+              </a:rPr>
+              <a:t>Urban/commuter zones (≤60 km/h) still account for a large share (~32%), likely due to traffic density.</a:t>
+            </a:r>
+          </a:p>
+        </p:txBody>
+      </p:sp>
+      <p:sp>
+        <p:nvSpPr>
+          <p:cNvPr id="10" name="TextBox 9">
+            <a:extLst>
+              <a:ext uri="{FF2B5EF4-FFF2-40B4-BE49-F238E27FC236}">
+                <a16:creationId xmlns:a16="http://schemas.microsoft.com/office/drawing/2014/main" id="{8738DBBF-620F-6BA0-C229-1DC789F41A81}"/>
+              </a:ext>
+            </a:extLst>
+          </p:cNvPr>
+          <p:cNvSpPr txBox="1"/>
+          <p:nvPr/>
+        </p:nvSpPr>
+        <p:spPr>
+          <a:xfrm>
+            <a:off x="6560560" y="4754813"/>
+            <a:ext cx="5631440" cy="1477328"/>
+          </a:xfrm>
+          <a:prstGeom prst="rect">
+            <a:avLst/>
+          </a:prstGeom>
+          <a:noFill/>
+        </p:spPr>
+        <p:txBody>
+          <a:bodyPr wrap="square">
+            <a:spAutoFit/>
+          </a:bodyPr>
+          <a:lstStyle/>
+          <a:p>
+            <a:pPr marL="285750" indent="-285750">
+              <a:buFont typeface="Arial" panose="020B0604020202020204" pitchFamily="34" charset="0"/>
+              <a:buChar char="•"/>
+            </a:pPr>
+            <a:r>
+              <a:rPr lang="en-US" dirty="0">
+                <a:latin typeface="Amasis MT Pro" panose="02040504050005020304" pitchFamily="18" charset="0"/>
+              </a:rPr>
+              <a:t>Single-vehicle crashes dominate (55%) → especially in high-speed or rural contexts.</a:t>
+            </a:r>
+          </a:p>
+          <a:p>
+            <a:pPr marL="285750" indent="-285750">
+              <a:buFont typeface="Arial" panose="020B0604020202020204" pitchFamily="34" charset="0"/>
+              <a:buChar char="•"/>
+            </a:pPr>
+            <a:endParaRPr lang="en-US" dirty="0">
+              <a:latin typeface="Amasis MT Pro" panose="02040504050005020304" pitchFamily="18" charset="0"/>
+            </a:endParaRPr>
+          </a:p>
+          <a:p>
+            <a:pPr marL="285750" indent="-285750">
+              <a:buFont typeface="Arial" panose="020B0604020202020204" pitchFamily="34" charset="0"/>
+              <a:buChar char="•"/>
+            </a:pPr>
+            <a:r>
+              <a:rPr lang="en-US" dirty="0">
+                <a:latin typeface="Amasis MT Pro" panose="02040504050005020304" pitchFamily="18" charset="0"/>
+              </a:rPr>
+              <a:t>Multi-vehicle crashes (45%) are still significant, concentrated in commuting/urban settings</a:t>
+            </a:r>
+          </a:p>
+        </p:txBody>
+      </p:sp>
+      <p:cxnSp>
+        <p:nvCxnSpPr>
+          <p:cNvPr id="5" name="Straight Connector 4">
+            <a:extLst>
+              <a:ext uri="{FF2B5EF4-FFF2-40B4-BE49-F238E27FC236}">
+                <a16:creationId xmlns:a16="http://schemas.microsoft.com/office/drawing/2014/main" id="{5D323216-36FC-6937-4EDD-2D4CA7F0F4C8}"/>
+              </a:ext>
+            </a:extLst>
+          </p:cNvPr>
+          <p:cNvCxnSpPr>
+            <a:cxnSpLocks/>
+          </p:cNvCxnSpPr>
+          <p:nvPr/>
+        </p:nvCxnSpPr>
+        <p:spPr>
+          <a:xfrm>
+            <a:off x="6474373" y="703609"/>
+            <a:ext cx="0" cy="5671966"/>
+          </a:xfrm>
+          <a:prstGeom prst="line">
+            <a:avLst/>
+          </a:prstGeom>
+          <a:ln>
+            <a:solidFill>
+              <a:schemeClr val="tx1"/>
+            </a:solidFill>
+          </a:ln>
+        </p:spPr>
+        <p:style>
+          <a:lnRef idx="2">
+            <a:schemeClr val="accent6"/>
+          </a:lnRef>
+          <a:fillRef idx="0">
+            <a:schemeClr val="accent6"/>
+          </a:fillRef>
+          <a:effectRef idx="1">
+            <a:schemeClr val="accent6"/>
+          </a:effectRef>
+          <a:fontRef idx="minor">
+            <a:schemeClr val="tx1"/>
+          </a:fontRef>
+        </p:style>
+      </p:cxnSp>
+      <p:pic>
+        <p:nvPicPr>
+          <p:cNvPr id="11" name="Picture 10">
+            <a:extLst>
+              <a:ext uri="{FF2B5EF4-FFF2-40B4-BE49-F238E27FC236}">
+                <a16:creationId xmlns:a16="http://schemas.microsoft.com/office/drawing/2014/main" id="{68A56C28-2E2F-97B6-F8FD-61B6F301E31A}"/>
+              </a:ext>
+            </a:extLst>
+          </p:cNvPr>
+          <p:cNvPicPr>
+            <a:picLocks noChangeAspect="1"/>
+          </p:cNvPicPr>
+          <p:nvPr/>
+        </p:nvPicPr>
+        <p:blipFill>
+          <a:blip r:embed="rId2"/>
+          <a:stretch>
+            <a:fillRect/>
+          </a:stretch>
+        </p:blipFill>
+        <p:spPr>
+          <a:xfrm>
+            <a:off x="0" y="703609"/>
+            <a:ext cx="6388186" cy="3710703"/>
+          </a:xfrm>
+          <a:prstGeom prst="rect">
+            <a:avLst/>
+          </a:prstGeom>
+        </p:spPr>
+      </p:pic>
+      <p:pic>
+        <p:nvPicPr>
+          <p:cNvPr id="15" name="Picture 14">
+            <a:extLst>
+              <a:ext uri="{FF2B5EF4-FFF2-40B4-BE49-F238E27FC236}">
+                <a16:creationId xmlns:a16="http://schemas.microsoft.com/office/drawing/2014/main" id="{3C9060DA-101C-71B5-946C-5CA19F0BEB7B}"/>
+              </a:ext>
+            </a:extLst>
+          </p:cNvPr>
+          <p:cNvPicPr>
+            <a:picLocks noChangeAspect="1"/>
+          </p:cNvPicPr>
+          <p:nvPr/>
+        </p:nvPicPr>
+        <p:blipFill>
+          <a:blip r:embed="rId3"/>
+          <a:stretch>
+            <a:fillRect/>
+          </a:stretch>
+        </p:blipFill>
+        <p:spPr>
+          <a:xfrm>
+            <a:off x="6560560" y="703610"/>
+            <a:ext cx="5509517" cy="3644770"/>
+          </a:xfrm>
+          <a:prstGeom prst="rect">
+            <a:avLst/>
+          </a:prstGeom>
+        </p:spPr>
+      </p:pic>
+    </p:spTree>
+    <p:extLst>
+      <p:ext uri="{BB962C8B-B14F-4D97-AF65-F5344CB8AC3E}">
+        <p14:creationId xmlns:p14="http://schemas.microsoft.com/office/powerpoint/2010/main" val="1466234984"/>
+      </p:ext>
+    </p:extLst>
+  </p:cSld>
+  <p:clrMapOvr>
+    <a:masterClrMapping/>
+  </p:clrMapOvr>
+</p:sld>
+</file>
+
+<file path=ppt/slides/slide8.xml><?xml version="1.0" encoding="utf-8"?>
+<p:sld xmlns:a="http://schemas.openxmlformats.org/drawingml/2006/main" xmlns:r="http://schemas.openxmlformats.org/officeDocument/2006/relationships" xmlns:p="http://schemas.openxmlformats.org/presentationml/2006/main">
+  <p:cSld>
+    <p:bg>
+      <p:bgPr>
+        <a:solidFill>
+          <a:schemeClr val="accent1">
+            <a:lumMod val="50000"/>
+          </a:schemeClr>
+        </a:solidFill>
+        <a:effectLst/>
+      </p:bgPr>
+    </p:bg>
+    <p:spTree>
+      <p:nvGrpSpPr>
+        <p:cNvPr id="1" name="">
+          <a:extLst>
+            <a:ext uri="{FF2B5EF4-FFF2-40B4-BE49-F238E27FC236}">
+              <a16:creationId xmlns:a16="http://schemas.microsoft.com/office/drawing/2014/main" id="{339F3968-7130-734C-7D37-81151F75D4BD}"/>
+            </a:ext>
+          </a:extLst>
+        </p:cNvPr>
+        <p:cNvGrpSpPr/>
+        <p:nvPr/>
+      </p:nvGrpSpPr>
+      <p:grpSpPr>
+        <a:xfrm>
+          <a:off x="0" y="0"/>
+          <a:ext cx="0" cy="0"/>
+          <a:chOff x="0" y="0"/>
+          <a:chExt cx="0" cy="0"/>
+        </a:xfrm>
+      </p:grpSpPr>
+      <p:sp>
+        <p:nvSpPr>
+          <p:cNvPr id="2" name="Title 1">
+            <a:extLst>
+              <a:ext uri="{FF2B5EF4-FFF2-40B4-BE49-F238E27FC236}">
+                <a16:creationId xmlns:a16="http://schemas.microsoft.com/office/drawing/2014/main" id="{C161C75F-6B5A-D57B-5DE1-8403A245BF2D}"/>
+              </a:ext>
+            </a:extLst>
+          </p:cNvPr>
+          <p:cNvSpPr>
+            <a:spLocks noGrp="1"/>
+          </p:cNvSpPr>
+          <p:nvPr>
+            <p:ph type="title"/>
+          </p:nvPr>
+        </p:nvSpPr>
+        <p:spPr>
+          <a:xfrm>
+            <a:off x="0" y="0"/>
+            <a:ext cx="12192000" cy="655846"/>
+          </a:xfrm>
+          <a:noFill/>
+        </p:spPr>
+        <p:txBody>
+          <a:bodyPr anchor="t">
+            <a:noAutofit/>
+          </a:bodyPr>
+          <a:lstStyle/>
+          <a:p>
+            <a:pPr algn="ctr"/>
+            <a:r>
+              <a:rPr lang="en-US" dirty="0">
+                <a:latin typeface="Amasis MT Pro Black" panose="02040A04050005020304" pitchFamily="18" charset="0"/>
+              </a:rPr>
+              <a:t>Fatal CRASH Demographics</a:t>
+            </a:r>
+          </a:p>
+        </p:txBody>
+      </p:sp>
+      <p:sp>
+        <p:nvSpPr>
+          <p:cNvPr id="7" name="TextBox 6">
+            <a:extLst>
+              <a:ext uri="{FF2B5EF4-FFF2-40B4-BE49-F238E27FC236}">
+                <a16:creationId xmlns:a16="http://schemas.microsoft.com/office/drawing/2014/main" id="{40333DA9-B57D-1E6A-04EA-C47CF42D76D2}"/>
+              </a:ext>
+            </a:extLst>
+          </p:cNvPr>
+          <p:cNvSpPr txBox="1"/>
+          <p:nvPr/>
+        </p:nvSpPr>
+        <p:spPr>
+          <a:xfrm>
+            <a:off x="136635" y="4807169"/>
+            <a:ext cx="6251552" cy="1477328"/>
+          </a:xfrm>
+          <a:prstGeom prst="rect">
+            <a:avLst/>
+          </a:prstGeom>
+          <a:noFill/>
+        </p:spPr>
+        <p:txBody>
+          <a:bodyPr wrap="square">
+            <a:spAutoFit/>
+          </a:bodyPr>
+          <a:lstStyle/>
+          <a:p>
+            <a:pPr marL="285750" indent="-285750">
+              <a:buFont typeface="Arial" panose="020B0604020202020204" pitchFamily="34" charset="0"/>
+              <a:buChar char="•"/>
+            </a:pPr>
+            <a:r>
+              <a:rPr lang="en-US" dirty="0">
+                <a:latin typeface="Amasis MT Pro" panose="02040504050005020304" pitchFamily="18" charset="0"/>
+              </a:rPr>
+              <a:t>Almost half of all fatal crashes (46%) occur on high-speed roads (100+).</a:t>
+            </a:r>
+          </a:p>
+          <a:p>
+            <a:pPr marL="285750" indent="-285750">
+              <a:buFont typeface="Arial" panose="020B0604020202020204" pitchFamily="34" charset="0"/>
+              <a:buChar char="•"/>
+            </a:pPr>
+            <a:endParaRPr lang="en-US" dirty="0">
+              <a:latin typeface="Amasis MT Pro" panose="02040504050005020304" pitchFamily="18" charset="0"/>
+            </a:endParaRPr>
+          </a:p>
+          <a:p>
+            <a:pPr marL="285750" indent="-285750">
+              <a:buFont typeface="Arial" panose="020B0604020202020204" pitchFamily="34" charset="0"/>
+              <a:buChar char="•"/>
+            </a:pPr>
+            <a:r>
+              <a:rPr lang="en-US" dirty="0">
+                <a:latin typeface="Amasis MT Pro" panose="02040504050005020304" pitchFamily="18" charset="0"/>
+              </a:rPr>
+              <a:t>Urban/commuter zones (≤60 km/h) still account for a large share (~32%), likely due to traffic density.</a:t>
+            </a:r>
+          </a:p>
+        </p:txBody>
+      </p:sp>
+      <p:sp>
+        <p:nvSpPr>
+          <p:cNvPr id="10" name="TextBox 9">
+            <a:extLst>
+              <a:ext uri="{FF2B5EF4-FFF2-40B4-BE49-F238E27FC236}">
+                <a16:creationId xmlns:a16="http://schemas.microsoft.com/office/drawing/2014/main" id="{E0290294-C9E6-C131-4876-596B4DCE4CD4}"/>
+              </a:ext>
+            </a:extLst>
+          </p:cNvPr>
+          <p:cNvSpPr txBox="1"/>
+          <p:nvPr/>
+        </p:nvSpPr>
+        <p:spPr>
+          <a:xfrm>
+            <a:off x="6560560" y="4754813"/>
+            <a:ext cx="5631440" cy="1477328"/>
+          </a:xfrm>
+          <a:prstGeom prst="rect">
+            <a:avLst/>
+          </a:prstGeom>
+          <a:noFill/>
+        </p:spPr>
+        <p:txBody>
+          <a:bodyPr wrap="square">
+            <a:spAutoFit/>
+          </a:bodyPr>
+          <a:lstStyle/>
+          <a:p>
+            <a:pPr marL="285750" indent="-285750">
+              <a:buFont typeface="Arial" panose="020B0604020202020204" pitchFamily="34" charset="0"/>
+              <a:buChar char="•"/>
+            </a:pPr>
+            <a:r>
+              <a:rPr lang="en-US" dirty="0">
+                <a:latin typeface="Amasis MT Pro" panose="02040504050005020304" pitchFamily="18" charset="0"/>
+              </a:rPr>
+              <a:t>Single-vehicle crashes dominate (55%) → especially in high-speed or rural contexts.</a:t>
+            </a:r>
+          </a:p>
+          <a:p>
+            <a:pPr marL="285750" indent="-285750">
+              <a:buFont typeface="Arial" panose="020B0604020202020204" pitchFamily="34" charset="0"/>
+              <a:buChar char="•"/>
+            </a:pPr>
+            <a:endParaRPr lang="en-US" dirty="0">
+              <a:latin typeface="Amasis MT Pro" panose="02040504050005020304" pitchFamily="18" charset="0"/>
+            </a:endParaRPr>
+          </a:p>
+          <a:p>
+            <a:pPr marL="285750" indent="-285750">
+              <a:buFont typeface="Arial" panose="020B0604020202020204" pitchFamily="34" charset="0"/>
+              <a:buChar char="•"/>
+            </a:pPr>
+            <a:r>
+              <a:rPr lang="en-US" dirty="0">
+                <a:latin typeface="Amasis MT Pro" panose="02040504050005020304" pitchFamily="18" charset="0"/>
+              </a:rPr>
+              <a:t>Multi-vehicle crashes (45%) are still significant, concentrated in commuting/urban settings</a:t>
+            </a:r>
+          </a:p>
+        </p:txBody>
+      </p:sp>
+      <p:cxnSp>
+        <p:nvCxnSpPr>
+          <p:cNvPr id="5" name="Straight Connector 4">
+            <a:extLst>
+              <a:ext uri="{FF2B5EF4-FFF2-40B4-BE49-F238E27FC236}">
+                <a16:creationId xmlns:a16="http://schemas.microsoft.com/office/drawing/2014/main" id="{CFEF9983-6CAC-8DE8-2BB4-6D92445BEA04}"/>
+              </a:ext>
+            </a:extLst>
+          </p:cNvPr>
+          <p:cNvCxnSpPr>
+            <a:cxnSpLocks/>
+          </p:cNvCxnSpPr>
+          <p:nvPr/>
+        </p:nvCxnSpPr>
+        <p:spPr>
+          <a:xfrm>
+            <a:off x="6474373" y="703609"/>
+            <a:ext cx="0" cy="5671966"/>
+          </a:xfrm>
+          <a:prstGeom prst="line">
+            <a:avLst/>
+          </a:prstGeom>
+          <a:ln>
+            <a:solidFill>
+              <a:schemeClr val="tx1"/>
+            </a:solidFill>
+          </a:ln>
+        </p:spPr>
+        <p:style>
+          <a:lnRef idx="2">
+            <a:schemeClr val="accent6"/>
+          </a:lnRef>
+          <a:fillRef idx="0">
+            <a:schemeClr val="accent6"/>
+          </a:fillRef>
+          <a:effectRef idx="1">
+            <a:schemeClr val="accent6"/>
+          </a:effectRef>
+          <a:fontRef idx="minor">
+            <a:schemeClr val="tx1"/>
+          </a:fontRef>
+        </p:style>
+      </p:cxnSp>
+      <p:pic>
+        <p:nvPicPr>
+          <p:cNvPr id="11" name="Picture 10">
+            <a:extLst>
+              <a:ext uri="{FF2B5EF4-FFF2-40B4-BE49-F238E27FC236}">
+                <a16:creationId xmlns:a16="http://schemas.microsoft.com/office/drawing/2014/main" id="{1D76A785-6E4C-921F-808C-68D482BBCD69}"/>
+              </a:ext>
+            </a:extLst>
+          </p:cNvPr>
+          <p:cNvPicPr>
+            <a:picLocks noChangeAspect="1"/>
+          </p:cNvPicPr>
+          <p:nvPr/>
+        </p:nvPicPr>
+        <p:blipFill>
+          <a:blip r:embed="rId2"/>
+          <a:stretch>
+            <a:fillRect/>
+          </a:stretch>
+        </p:blipFill>
+        <p:spPr>
+          <a:xfrm>
+            <a:off x="0" y="703609"/>
+            <a:ext cx="6388186" cy="3710703"/>
+          </a:xfrm>
+          <a:prstGeom prst="rect">
+            <a:avLst/>
+          </a:prstGeom>
+        </p:spPr>
+      </p:pic>
+      <p:pic>
+        <p:nvPicPr>
+          <p:cNvPr id="15" name="Picture 14">
+            <a:extLst>
+              <a:ext uri="{FF2B5EF4-FFF2-40B4-BE49-F238E27FC236}">
+                <a16:creationId xmlns:a16="http://schemas.microsoft.com/office/drawing/2014/main" id="{9BF833B8-9353-0AAA-33C8-393713C30E98}"/>
+              </a:ext>
+            </a:extLst>
+          </p:cNvPr>
+          <p:cNvPicPr>
+            <a:picLocks noChangeAspect="1"/>
+          </p:cNvPicPr>
+          <p:nvPr/>
+        </p:nvPicPr>
+        <p:blipFill>
+          <a:blip r:embed="rId3"/>
+          <a:stretch>
+            <a:fillRect/>
+          </a:stretch>
+        </p:blipFill>
+        <p:spPr>
+          <a:xfrm>
+            <a:off x="6560560" y="703610"/>
+            <a:ext cx="5509517" cy="3644770"/>
+          </a:xfrm>
+          <a:prstGeom prst="rect">
+            <a:avLst/>
+          </a:prstGeom>
+        </p:spPr>
+      </p:pic>
+    </p:spTree>
+    <p:extLst>
+      <p:ext uri="{BB962C8B-B14F-4D97-AF65-F5344CB8AC3E}">
+        <p14:creationId xmlns:p14="http://schemas.microsoft.com/office/powerpoint/2010/main" val="1441598315"/>
+      </p:ext>
+    </p:extLst>
+  </p:cSld>
+  <p:clrMapOvr>
+    <a:masterClrMapping/>
+  </p:clrMapOvr>
+</p:sld>
+</file>
+
+<file path=ppt/slides/slide9.xml><?xml version="1.0" encoding="utf-8"?>
 <p:sld xmlns:a="http://schemas.openxmlformats.org/drawingml/2006/main" xmlns:r="http://schemas.openxmlformats.org/officeDocument/2006/relationships" xmlns:p="http://schemas.openxmlformats.org/presentationml/2006/main">
   <p:cSld>
     <p:bg>
@@ -14674,7 +15305,7 @@
             <a:fld id="{CBD12358-51D2-46B3-9BDE-DF29528B9454}" type="slidenum">
               <a:rPr lang="en-US" smtClean="0"/>
               <a:pPr/>
-              <a:t>6</a:t>
+              <a:t>9</a:t>
             </a:fld>
             <a:endParaRPr lang="en-US" dirty="0"/>
           </a:p>
@@ -15533,12 +16164,23 @@
 </file>
 
 <file path=customXml/item1.xml><?xml version="1.0" encoding="utf-8"?>
-<?mso-contentType ?>
-<FormTemplates xmlns="http://schemas.microsoft.com/sharepoint/v3/contenttype/forms">
-  <Display>DocumentLibraryForm</Display>
-  <Edit>DocumentLibraryForm</Edit>
-  <New>DocumentLibraryForm</New>
-</FormTemplates>
+<p:properties xmlns:p="http://schemas.microsoft.com/office/2006/metadata/properties" xmlns:xsi="http://www.w3.org/2001/XMLSchema-instance" xmlns:pc="http://schemas.microsoft.com/office/infopath/2007/PartnerControls">
+  <documentManagement>
+    <MediaServiceKeyPoints xmlns="71af3243-3dd4-4a8d-8c0d-dd76da1f02a5" xsi:nil="true"/>
+    <_ip_UnifiedCompliancePolicyUIAction xmlns="http://schemas.microsoft.com/sharepoint/v3" xsi:nil="true"/>
+    <Image xmlns="71af3243-3dd4-4a8d-8c0d-dd76da1f02a5">
+      <Url xsi:nil="true"/>
+      <Description xsi:nil="true"/>
+    </Image>
+    <Status xmlns="71af3243-3dd4-4a8d-8c0d-dd76da1f02a5">Not started</Status>
+    <Background xmlns="71af3243-3dd4-4a8d-8c0d-dd76da1f02a5">false</Background>
+    <_ip_UnifiedCompliancePolicyProperties xmlns="http://schemas.microsoft.com/sharepoint/v3" xsi:nil="true"/>
+    <ImageTagsTaxHTField xmlns="71af3243-3dd4-4a8d-8c0d-dd76da1f02a5">
+      <Terms xmlns="http://schemas.microsoft.com/office/infopath/2007/PartnerControls"/>
+    </ImageTagsTaxHTField>
+    <TaxCatchAll xmlns="230e9df3-be65-4c73-a93b-d1236ebd677e" xsi:nil="true"/>
+  </documentManagement>
+</p:properties>
 </file>
 
 <file path=customXml/item2.xml><?xml version="1.0" encoding="utf-8"?>
@@ -15854,29 +16496,29 @@
 </file>
 
 <file path=customXml/item3.xml><?xml version="1.0" encoding="utf-8"?>
-<p:properties xmlns:p="http://schemas.microsoft.com/office/2006/metadata/properties" xmlns:xsi="http://www.w3.org/2001/XMLSchema-instance" xmlns:pc="http://schemas.microsoft.com/office/infopath/2007/PartnerControls">
-  <documentManagement>
-    <MediaServiceKeyPoints xmlns="71af3243-3dd4-4a8d-8c0d-dd76da1f02a5" xsi:nil="true"/>
-    <_ip_UnifiedCompliancePolicyUIAction xmlns="http://schemas.microsoft.com/sharepoint/v3" xsi:nil="true"/>
-    <Image xmlns="71af3243-3dd4-4a8d-8c0d-dd76da1f02a5">
-      <Url xsi:nil="true"/>
-      <Description xsi:nil="true"/>
-    </Image>
-    <Status xmlns="71af3243-3dd4-4a8d-8c0d-dd76da1f02a5">Not started</Status>
-    <Background xmlns="71af3243-3dd4-4a8d-8c0d-dd76da1f02a5">false</Background>
-    <_ip_UnifiedCompliancePolicyProperties xmlns="http://schemas.microsoft.com/sharepoint/v3" xsi:nil="true"/>
-    <ImageTagsTaxHTField xmlns="71af3243-3dd4-4a8d-8c0d-dd76da1f02a5">
-      <Terms xmlns="http://schemas.microsoft.com/office/infopath/2007/PartnerControls"/>
-    </ImageTagsTaxHTField>
-    <TaxCatchAll xmlns="230e9df3-be65-4c73-a93b-d1236ebd677e" xsi:nil="true"/>
-  </documentManagement>
-</p:properties>
+<?mso-contentType ?>
+<FormTemplates xmlns="http://schemas.microsoft.com/sharepoint/v3/contenttype/forms">
+  <Display>DocumentLibraryForm</Display>
+  <Edit>DocumentLibraryForm</Edit>
+  <New>DocumentLibraryForm</New>
+</FormTemplates>
 </file>
 
 <file path=customXml/itemProps1.xml><?xml version="1.0" encoding="utf-8"?>
-<ds:datastoreItem xmlns:ds="http://schemas.openxmlformats.org/officeDocument/2006/customXml" ds:itemID="{0F60B100-7079-4DE7-AF7C-20BFB1D62C46}">
+<ds:datastoreItem xmlns:ds="http://schemas.openxmlformats.org/officeDocument/2006/customXml" ds:itemID="{826A71AF-4CF2-4B95-BFB6-5C27500258C6}">
   <ds:schemaRefs>
-    <ds:schemaRef ds:uri="http://schemas.microsoft.com/sharepoint/v3/contenttype/forms"/>
+    <ds:schemaRef ds:uri="http://schemas.openxmlformats.org/package/2006/metadata/core-properties"/>
+    <ds:schemaRef ds:uri="http://schemas.microsoft.com/office/infopath/2007/PartnerControls"/>
+    <ds:schemaRef ds:uri="http://schemas.microsoft.com/office/2006/metadata/properties"/>
+    <ds:schemaRef ds:uri="http://www.w3.org/XML/1998/namespace"/>
+    <ds:schemaRef ds:uri="http://purl.org/dc/elements/1.1/"/>
+    <ds:schemaRef ds:uri="http://schemas.microsoft.com/office/2006/documentManagement/types"/>
+    <ds:schemaRef ds:uri="230e9df3-be65-4c73-a93b-d1236ebd677e"/>
+    <ds:schemaRef ds:uri="71af3243-3dd4-4a8d-8c0d-dd76da1f02a5"/>
+    <ds:schemaRef ds:uri="16c05727-aa75-4e4a-9b5f-8a80a1165891"/>
+    <ds:schemaRef ds:uri="http://schemas.microsoft.com/sharepoint/v3"/>
+    <ds:schemaRef ds:uri="http://purl.org/dc/dcmitype/"/>
+    <ds:schemaRef ds:uri="http://purl.org/dc/terms/"/>
   </ds:schemaRefs>
 </ds:datastoreItem>
 </file>
@@ -15903,20 +16545,9 @@
 </file>
 
 <file path=customXml/itemProps3.xml><?xml version="1.0" encoding="utf-8"?>
-<ds:datastoreItem xmlns:ds="http://schemas.openxmlformats.org/officeDocument/2006/customXml" ds:itemID="{826A71AF-4CF2-4B95-BFB6-5C27500258C6}">
+<ds:datastoreItem xmlns:ds="http://schemas.openxmlformats.org/officeDocument/2006/customXml" ds:itemID="{0F60B100-7079-4DE7-AF7C-20BFB1D62C46}">
   <ds:schemaRefs>
-    <ds:schemaRef ds:uri="http://schemas.openxmlformats.org/package/2006/metadata/core-properties"/>
-    <ds:schemaRef ds:uri="http://schemas.microsoft.com/office/infopath/2007/PartnerControls"/>
-    <ds:schemaRef ds:uri="http://schemas.microsoft.com/office/2006/metadata/properties"/>
-    <ds:schemaRef ds:uri="http://www.w3.org/XML/1998/namespace"/>
-    <ds:schemaRef ds:uri="http://purl.org/dc/elements/1.1/"/>
-    <ds:schemaRef ds:uri="http://schemas.microsoft.com/office/2006/documentManagement/types"/>
-    <ds:schemaRef ds:uri="230e9df3-be65-4c73-a93b-d1236ebd677e"/>
-    <ds:schemaRef ds:uri="71af3243-3dd4-4a8d-8c0d-dd76da1f02a5"/>
-    <ds:schemaRef ds:uri="16c05727-aa75-4e4a-9b5f-8a80a1165891"/>
-    <ds:schemaRef ds:uri="http://schemas.microsoft.com/sharepoint/v3"/>
-    <ds:schemaRef ds:uri="http://purl.org/dc/dcmitype/"/>
-    <ds:schemaRef ds:uri="http://purl.org/dc/terms/"/>
+    <ds:schemaRef ds:uri="http://schemas.microsoft.com/sharepoint/v3/contenttype/forms"/>
   </ds:schemaRefs>
 </ds:datastoreItem>
 </file>

</xml_diff>

<commit_message>
adding some more stuff
</commit_message>
<xml_diff>
--- a/Scyne Advisory Interview/Scyne Advisory Presentation.pptx
+++ b/Scyne Advisory Interview/Scyne Advisory Presentation.pptx
@@ -5,10 +5,10 @@
     <p:sldMasterId id="2147483744" r:id="rId4"/>
   </p:sldMasterIdLst>
   <p:notesMasterIdLst>
-    <p:notesMasterId r:id="rId14"/>
+    <p:notesMasterId r:id="rId15"/>
   </p:notesMasterIdLst>
   <p:handoutMasterIdLst>
-    <p:handoutMasterId r:id="rId15"/>
+    <p:handoutMasterId r:id="rId16"/>
   </p:handoutMasterIdLst>
   <p:sldIdLst>
     <p:sldId id="256" r:id="rId5"/>
@@ -16,10 +16,11 @@
     <p:sldId id="280" r:id="rId7"/>
     <p:sldId id="281" r:id="rId8"/>
     <p:sldId id="282" r:id="rId9"/>
-    <p:sldId id="283" r:id="rId10"/>
+    <p:sldId id="286" r:id="rId10"/>
     <p:sldId id="284" r:id="rId11"/>
     <p:sldId id="285" r:id="rId12"/>
-    <p:sldId id="274" r:id="rId13"/>
+    <p:sldId id="287" r:id="rId13"/>
+    <p:sldId id="288" r:id="rId14"/>
   </p:sldIdLst>
   <p:sldSz cx="12192000" cy="6858000"/>
   <p:notesSz cx="6858000" cy="9144000"/>
@@ -7848,2031 +7849,6 @@
 </p:sldLayout>
 </file>
 
-<file path=ppt/slideLayouts/slideLayout19.xml><?xml version="1.0" encoding="utf-8"?>
-<p:sldLayout xmlns:a="http://schemas.openxmlformats.org/drawingml/2006/main" xmlns:r="http://schemas.openxmlformats.org/officeDocument/2006/relationships" xmlns:p="http://schemas.openxmlformats.org/presentationml/2006/main" userDrawn="1">
-  <p:cSld name="Title and content with image">
-    <p:bg>
-      <p:bgPr>
-        <a:solidFill>
-          <a:schemeClr val="accent3"/>
-        </a:solidFill>
-        <a:effectLst/>
-      </p:bgPr>
-    </p:bg>
-    <p:spTree>
-      <p:nvGrpSpPr>
-        <p:cNvPr id="1" name=""/>
-        <p:cNvGrpSpPr/>
-        <p:nvPr/>
-      </p:nvGrpSpPr>
-      <p:grpSpPr>
-        <a:xfrm>
-          <a:off x="0" y="0"/>
-          <a:ext cx="0" cy="0"/>
-          <a:chOff x="0" y="0"/>
-          <a:chExt cx="0" cy="0"/>
-        </a:xfrm>
-      </p:grpSpPr>
-      <p:sp>
-        <p:nvSpPr>
-          <p:cNvPr id="7" name="Freeform: Shape 6">
-            <a:extLst>
-              <a:ext uri="{FF2B5EF4-FFF2-40B4-BE49-F238E27FC236}">
-                <a16:creationId xmlns:a16="http://schemas.microsoft.com/office/drawing/2014/main" id="{053E07A4-0E6F-EA16-0C7A-9C91525562EC}"/>
-              </a:ext>
-            </a:extLst>
-          </p:cNvPr>
-          <p:cNvSpPr/>
-          <p:nvPr userDrawn="1"/>
-        </p:nvSpPr>
-        <p:spPr>
-          <a:xfrm>
-            <a:off x="8366517" y="-1"/>
-            <a:ext cx="3825483" cy="6858001"/>
-          </a:xfrm>
-          <a:custGeom>
-            <a:avLst/>
-            <a:gdLst>
-              <a:gd name="connsiteX0" fmla="*/ 474634 w 3825483"/>
-              <a:gd name="connsiteY0" fmla="*/ 0 h 6858001"/>
-              <a:gd name="connsiteX1" fmla="*/ 2642659 w 3825483"/>
-              <a:gd name="connsiteY1" fmla="*/ 0 h 6858001"/>
-              <a:gd name="connsiteX2" fmla="*/ 2642659 w 3825483"/>
-              <a:gd name="connsiteY2" fmla="*/ 1 h 6858001"/>
-              <a:gd name="connsiteX3" fmla="*/ 3825483 w 3825483"/>
-              <a:gd name="connsiteY3" fmla="*/ 1 h 6858001"/>
-              <a:gd name="connsiteX4" fmla="*/ 3825483 w 3825483"/>
-              <a:gd name="connsiteY4" fmla="*/ 6858001 h 6858001"/>
-              <a:gd name="connsiteX5" fmla="*/ 1772906 w 3825483"/>
-              <a:gd name="connsiteY5" fmla="*/ 6858001 h 6858001"/>
-              <a:gd name="connsiteX6" fmla="*/ 1772906 w 3825483"/>
-              <a:gd name="connsiteY6" fmla="*/ 6858000 h 6858001"/>
-              <a:gd name="connsiteX7" fmla="*/ 770467 w 3825483"/>
-              <a:gd name="connsiteY7" fmla="*/ 6858000 h 6858001"/>
-              <a:gd name="connsiteX8" fmla="*/ 770467 w 3825483"/>
-              <a:gd name="connsiteY8" fmla="*/ 6830556 h 6858001"/>
-              <a:gd name="connsiteX9" fmla="*/ 759822 w 3825483"/>
-              <a:gd name="connsiteY9" fmla="*/ 6858000 h 6858001"/>
-              <a:gd name="connsiteX10" fmla="*/ 479377 w 3825483"/>
-              <a:gd name="connsiteY10" fmla="*/ 6858000 h 6858001"/>
-              <a:gd name="connsiteX11" fmla="*/ 477309 w 3825483"/>
-              <a:gd name="connsiteY11" fmla="*/ 6846445 h 6858001"/>
-              <a:gd name="connsiteX12" fmla="*/ 515408 w 3825483"/>
-              <a:gd name="connsiteY12" fmla="*/ 6715003 h 6858001"/>
-              <a:gd name="connsiteX13" fmla="*/ 541867 w 3825483"/>
-              <a:gd name="connsiteY13" fmla="*/ 6583560 h 6858001"/>
-              <a:gd name="connsiteX14" fmla="*/ 543984 w 3825483"/>
-              <a:gd name="connsiteY14" fmla="*/ 6449228 h 6858001"/>
-              <a:gd name="connsiteX15" fmla="*/ 536575 w 3825483"/>
-              <a:gd name="connsiteY15" fmla="*/ 6338007 h 6858001"/>
-              <a:gd name="connsiteX16" fmla="*/ 518583 w 3825483"/>
-              <a:gd name="connsiteY16" fmla="*/ 6228231 h 6858001"/>
-              <a:gd name="connsiteX17" fmla="*/ 552450 w 3825483"/>
-              <a:gd name="connsiteY17" fmla="*/ 6108343 h 6858001"/>
-              <a:gd name="connsiteX18" fmla="*/ 609600 w 3825483"/>
-              <a:gd name="connsiteY18" fmla="*/ 6000011 h 6858001"/>
-              <a:gd name="connsiteX19" fmla="*/ 662517 w 3825483"/>
-              <a:gd name="connsiteY19" fmla="*/ 5891678 h 6858001"/>
-              <a:gd name="connsiteX20" fmla="*/ 678392 w 3825483"/>
-              <a:gd name="connsiteY20" fmla="*/ 5771791 h 6858001"/>
-              <a:gd name="connsiteX21" fmla="*/ 636059 w 3825483"/>
-              <a:gd name="connsiteY21" fmla="*/ 5657681 h 6858001"/>
-              <a:gd name="connsiteX22" fmla="*/ 656167 w 3825483"/>
-              <a:gd name="connsiteY22" fmla="*/ 5589792 h 6858001"/>
-              <a:gd name="connsiteX23" fmla="*/ 695325 w 3825483"/>
-              <a:gd name="connsiteY23" fmla="*/ 5432350 h 6858001"/>
-              <a:gd name="connsiteX24" fmla="*/ 778934 w 3825483"/>
-              <a:gd name="connsiteY24" fmla="*/ 5308129 h 6858001"/>
-              <a:gd name="connsiteX25" fmla="*/ 841375 w 3825483"/>
-              <a:gd name="connsiteY25" fmla="*/ 5191131 h 6858001"/>
-              <a:gd name="connsiteX26" fmla="*/ 881592 w 3825483"/>
-              <a:gd name="connsiteY26" fmla="*/ 5085687 h 6858001"/>
-              <a:gd name="connsiteX27" fmla="*/ 857250 w 3825483"/>
-              <a:gd name="connsiteY27" fmla="*/ 5038021 h 6858001"/>
-              <a:gd name="connsiteX28" fmla="*/ 755650 w 3825483"/>
-              <a:gd name="connsiteY28" fmla="*/ 4997578 h 6858001"/>
-              <a:gd name="connsiteX29" fmla="*/ 703792 w 3825483"/>
-              <a:gd name="connsiteY29" fmla="*/ 4910912 h 6858001"/>
-              <a:gd name="connsiteX30" fmla="*/ 713317 w 3825483"/>
-              <a:gd name="connsiteY30" fmla="*/ 4819913 h 6858001"/>
-              <a:gd name="connsiteX31" fmla="*/ 751417 w 3825483"/>
-              <a:gd name="connsiteY31" fmla="*/ 4642248 h 6858001"/>
-              <a:gd name="connsiteX32" fmla="*/ 649817 w 3825483"/>
-              <a:gd name="connsiteY32" fmla="*/ 4512249 h 6858001"/>
-              <a:gd name="connsiteX33" fmla="*/ 661458 w 3825483"/>
-              <a:gd name="connsiteY33" fmla="*/ 4416918 h 6858001"/>
-              <a:gd name="connsiteX34" fmla="*/ 726017 w 3825483"/>
-              <a:gd name="connsiteY34" fmla="*/ 4386584 h 6858001"/>
-              <a:gd name="connsiteX35" fmla="*/ 718609 w 3825483"/>
-              <a:gd name="connsiteY35" fmla="*/ 4234919 h 6858001"/>
-              <a:gd name="connsiteX36" fmla="*/ 655109 w 3825483"/>
-              <a:gd name="connsiteY36" fmla="*/ 4164141 h 6858001"/>
-              <a:gd name="connsiteX37" fmla="*/ 699559 w 3825483"/>
-              <a:gd name="connsiteY37" fmla="*/ 4084698 h 6858001"/>
-              <a:gd name="connsiteX38" fmla="*/ 669925 w 3825483"/>
-              <a:gd name="connsiteY38" fmla="*/ 3937366 h 6858001"/>
-              <a:gd name="connsiteX39" fmla="*/ 633942 w 3825483"/>
-              <a:gd name="connsiteY39" fmla="*/ 3791478 h 6858001"/>
-              <a:gd name="connsiteX40" fmla="*/ 672042 w 3825483"/>
-              <a:gd name="connsiteY40" fmla="*/ 3714925 h 6858001"/>
-              <a:gd name="connsiteX41" fmla="*/ 592667 w 3825483"/>
-              <a:gd name="connsiteY41" fmla="*/ 3648480 h 6858001"/>
-              <a:gd name="connsiteX42" fmla="*/ 575734 w 3825483"/>
-              <a:gd name="connsiteY42" fmla="*/ 3576258 h 6858001"/>
-              <a:gd name="connsiteX43" fmla="*/ 549275 w 3825483"/>
-              <a:gd name="connsiteY43" fmla="*/ 3505481 h 6858001"/>
-              <a:gd name="connsiteX44" fmla="*/ 506942 w 3825483"/>
-              <a:gd name="connsiteY44" fmla="*/ 3376928 h 6858001"/>
-              <a:gd name="connsiteX45" fmla="*/ 455083 w 3825483"/>
-              <a:gd name="connsiteY45" fmla="*/ 3255596 h 6858001"/>
-              <a:gd name="connsiteX46" fmla="*/ 403225 w 3825483"/>
-              <a:gd name="connsiteY46" fmla="*/ 3167485 h 6858001"/>
-              <a:gd name="connsiteX47" fmla="*/ 358775 w 3825483"/>
-              <a:gd name="connsiteY47" fmla="*/ 3075042 h 6858001"/>
-              <a:gd name="connsiteX48" fmla="*/ 330200 w 3825483"/>
-              <a:gd name="connsiteY48" fmla="*/ 2952266 h 6858001"/>
-              <a:gd name="connsiteX49" fmla="*/ 320675 w 3825483"/>
-              <a:gd name="connsiteY49" fmla="*/ 2822267 h 6858001"/>
-              <a:gd name="connsiteX50" fmla="*/ 320675 w 3825483"/>
-              <a:gd name="connsiteY50" fmla="*/ 2690823 h 6858001"/>
-              <a:gd name="connsiteX51" fmla="*/ 358775 w 3825483"/>
-              <a:gd name="connsiteY51" fmla="*/ 2560825 h 6858001"/>
-              <a:gd name="connsiteX52" fmla="*/ 370417 w 3825483"/>
-              <a:gd name="connsiteY52" fmla="*/ 2436605 h 6858001"/>
-              <a:gd name="connsiteX53" fmla="*/ 304800 w 3825483"/>
-              <a:gd name="connsiteY53" fmla="*/ 2358606 h 6858001"/>
-              <a:gd name="connsiteX54" fmla="*/ 241300 w 3825483"/>
-              <a:gd name="connsiteY54" fmla="*/ 2309494 h 6858001"/>
-              <a:gd name="connsiteX55" fmla="*/ 167217 w 3825483"/>
-              <a:gd name="connsiteY55" fmla="*/ 2260384 h 6858001"/>
-              <a:gd name="connsiteX56" fmla="*/ 135467 w 3825483"/>
-              <a:gd name="connsiteY56" fmla="*/ 2178052 h 6858001"/>
-              <a:gd name="connsiteX57" fmla="*/ 179917 w 3825483"/>
-              <a:gd name="connsiteY57" fmla="*/ 1996054 h 6858001"/>
-              <a:gd name="connsiteX58" fmla="*/ 131234 w 3825483"/>
-              <a:gd name="connsiteY58" fmla="*/ 1919498 h 6858001"/>
-              <a:gd name="connsiteX59" fmla="*/ 49742 w 3825483"/>
-              <a:gd name="connsiteY59" fmla="*/ 1867499 h 6858001"/>
-              <a:gd name="connsiteX60" fmla="*/ 0 w 3825483"/>
-              <a:gd name="connsiteY60" fmla="*/ 1741834 h 6858001"/>
-              <a:gd name="connsiteX61" fmla="*/ 47625 w 3825483"/>
-              <a:gd name="connsiteY61" fmla="*/ 1595947 h 6858001"/>
-              <a:gd name="connsiteX62" fmla="*/ 131234 w 3825483"/>
-              <a:gd name="connsiteY62" fmla="*/ 1448614 h 6858001"/>
-              <a:gd name="connsiteX63" fmla="*/ 187325 w 3825483"/>
-              <a:gd name="connsiteY63" fmla="*/ 1317172 h 6858001"/>
-              <a:gd name="connsiteX64" fmla="*/ 165100 w 3825483"/>
-              <a:gd name="connsiteY64" fmla="*/ 1138063 h 6858001"/>
-              <a:gd name="connsiteX65" fmla="*/ 141817 w 3825483"/>
-              <a:gd name="connsiteY65" fmla="*/ 951731 h 6858001"/>
-              <a:gd name="connsiteX66" fmla="*/ 232833 w 3825483"/>
-              <a:gd name="connsiteY66" fmla="*/ 723511 h 6858001"/>
-              <a:gd name="connsiteX67" fmla="*/ 293158 w 3825483"/>
-              <a:gd name="connsiteY67" fmla="*/ 597846 h 6858001"/>
-              <a:gd name="connsiteX68" fmla="*/ 335492 w 3825483"/>
-              <a:gd name="connsiteY68" fmla="*/ 476514 h 6858001"/>
-              <a:gd name="connsiteX69" fmla="*/ 376767 w 3825483"/>
-              <a:gd name="connsiteY69" fmla="*/ 297405 h 6858001"/>
-              <a:gd name="connsiteX70" fmla="*/ 418042 w 3825483"/>
-              <a:gd name="connsiteY70" fmla="*/ 118295 h 6858001"/>
-              <a:gd name="connsiteX71" fmla="*/ 492654 w 3825483"/>
-              <a:gd name="connsiteY71" fmla="*/ 24408 h 6858001"/>
-            </a:gdLst>
-            <a:ahLst/>
-            <a:cxnLst>
-              <a:cxn ang="0">
-                <a:pos x="connsiteX0" y="connsiteY0"/>
-              </a:cxn>
-              <a:cxn ang="0">
-                <a:pos x="connsiteX1" y="connsiteY1"/>
-              </a:cxn>
-              <a:cxn ang="0">
-                <a:pos x="connsiteX2" y="connsiteY2"/>
-              </a:cxn>
-              <a:cxn ang="0">
-                <a:pos x="connsiteX3" y="connsiteY3"/>
-              </a:cxn>
-              <a:cxn ang="0">
-                <a:pos x="connsiteX4" y="connsiteY4"/>
-              </a:cxn>
-              <a:cxn ang="0">
-                <a:pos x="connsiteX5" y="connsiteY5"/>
-              </a:cxn>
-              <a:cxn ang="0">
-                <a:pos x="connsiteX6" y="connsiteY6"/>
-              </a:cxn>
-              <a:cxn ang="0">
-                <a:pos x="connsiteX7" y="connsiteY7"/>
-              </a:cxn>
-              <a:cxn ang="0">
-                <a:pos x="connsiteX8" y="connsiteY8"/>
-              </a:cxn>
-              <a:cxn ang="0">
-                <a:pos x="connsiteX9" y="connsiteY9"/>
-              </a:cxn>
-              <a:cxn ang="0">
-                <a:pos x="connsiteX10" y="connsiteY10"/>
-              </a:cxn>
-              <a:cxn ang="0">
-                <a:pos x="connsiteX11" y="connsiteY11"/>
-              </a:cxn>
-              <a:cxn ang="0">
-                <a:pos x="connsiteX12" y="connsiteY12"/>
-              </a:cxn>
-              <a:cxn ang="0">
-                <a:pos x="connsiteX13" y="connsiteY13"/>
-              </a:cxn>
-              <a:cxn ang="0">
-                <a:pos x="connsiteX14" y="connsiteY14"/>
-              </a:cxn>
-              <a:cxn ang="0">
-                <a:pos x="connsiteX15" y="connsiteY15"/>
-              </a:cxn>
-              <a:cxn ang="0">
-                <a:pos x="connsiteX16" y="connsiteY16"/>
-              </a:cxn>
-              <a:cxn ang="0">
-                <a:pos x="connsiteX17" y="connsiteY17"/>
-              </a:cxn>
-              <a:cxn ang="0">
-                <a:pos x="connsiteX18" y="connsiteY18"/>
-              </a:cxn>
-              <a:cxn ang="0">
-                <a:pos x="connsiteX19" y="connsiteY19"/>
-              </a:cxn>
-              <a:cxn ang="0">
-                <a:pos x="connsiteX20" y="connsiteY20"/>
-              </a:cxn>
-              <a:cxn ang="0">
-                <a:pos x="connsiteX21" y="connsiteY21"/>
-              </a:cxn>
-              <a:cxn ang="0">
-                <a:pos x="connsiteX22" y="connsiteY22"/>
-              </a:cxn>
-              <a:cxn ang="0">
-                <a:pos x="connsiteX23" y="connsiteY23"/>
-              </a:cxn>
-              <a:cxn ang="0">
-                <a:pos x="connsiteX24" y="connsiteY24"/>
-              </a:cxn>
-              <a:cxn ang="0">
-                <a:pos x="connsiteX25" y="connsiteY25"/>
-              </a:cxn>
-              <a:cxn ang="0">
-                <a:pos x="connsiteX26" y="connsiteY26"/>
-              </a:cxn>
-              <a:cxn ang="0">
-                <a:pos x="connsiteX27" y="connsiteY27"/>
-              </a:cxn>
-              <a:cxn ang="0">
-                <a:pos x="connsiteX28" y="connsiteY28"/>
-              </a:cxn>
-              <a:cxn ang="0">
-                <a:pos x="connsiteX29" y="connsiteY29"/>
-              </a:cxn>
-              <a:cxn ang="0">
-                <a:pos x="connsiteX30" y="connsiteY30"/>
-              </a:cxn>
-              <a:cxn ang="0">
-                <a:pos x="connsiteX31" y="connsiteY31"/>
-              </a:cxn>
-              <a:cxn ang="0">
-                <a:pos x="connsiteX32" y="connsiteY32"/>
-              </a:cxn>
-              <a:cxn ang="0">
-                <a:pos x="connsiteX33" y="connsiteY33"/>
-              </a:cxn>
-              <a:cxn ang="0">
-                <a:pos x="connsiteX34" y="connsiteY34"/>
-              </a:cxn>
-              <a:cxn ang="0">
-                <a:pos x="connsiteX35" y="connsiteY35"/>
-              </a:cxn>
-              <a:cxn ang="0">
-                <a:pos x="connsiteX36" y="connsiteY36"/>
-              </a:cxn>
-              <a:cxn ang="0">
-                <a:pos x="connsiteX37" y="connsiteY37"/>
-              </a:cxn>
-              <a:cxn ang="0">
-                <a:pos x="connsiteX38" y="connsiteY38"/>
-              </a:cxn>
-              <a:cxn ang="0">
-                <a:pos x="connsiteX39" y="connsiteY39"/>
-              </a:cxn>
-              <a:cxn ang="0">
-                <a:pos x="connsiteX40" y="connsiteY40"/>
-              </a:cxn>
-              <a:cxn ang="0">
-                <a:pos x="connsiteX41" y="connsiteY41"/>
-              </a:cxn>
-              <a:cxn ang="0">
-                <a:pos x="connsiteX42" y="connsiteY42"/>
-              </a:cxn>
-              <a:cxn ang="0">
-                <a:pos x="connsiteX43" y="connsiteY43"/>
-              </a:cxn>
-              <a:cxn ang="0">
-                <a:pos x="connsiteX44" y="connsiteY44"/>
-              </a:cxn>
-              <a:cxn ang="0">
-                <a:pos x="connsiteX45" y="connsiteY45"/>
-              </a:cxn>
-              <a:cxn ang="0">
-                <a:pos x="connsiteX46" y="connsiteY46"/>
-              </a:cxn>
-              <a:cxn ang="0">
-                <a:pos x="connsiteX47" y="connsiteY47"/>
-              </a:cxn>
-              <a:cxn ang="0">
-                <a:pos x="connsiteX48" y="connsiteY48"/>
-              </a:cxn>
-              <a:cxn ang="0">
-                <a:pos x="connsiteX49" y="connsiteY49"/>
-              </a:cxn>
-              <a:cxn ang="0">
-                <a:pos x="connsiteX50" y="connsiteY50"/>
-              </a:cxn>
-              <a:cxn ang="0">
-                <a:pos x="connsiteX51" y="connsiteY51"/>
-              </a:cxn>
-              <a:cxn ang="0">
-                <a:pos x="connsiteX52" y="connsiteY52"/>
-              </a:cxn>
-              <a:cxn ang="0">
-                <a:pos x="connsiteX53" y="connsiteY53"/>
-              </a:cxn>
-              <a:cxn ang="0">
-                <a:pos x="connsiteX54" y="connsiteY54"/>
-              </a:cxn>
-              <a:cxn ang="0">
-                <a:pos x="connsiteX55" y="connsiteY55"/>
-              </a:cxn>
-              <a:cxn ang="0">
-                <a:pos x="connsiteX56" y="connsiteY56"/>
-              </a:cxn>
-              <a:cxn ang="0">
-                <a:pos x="connsiteX57" y="connsiteY57"/>
-              </a:cxn>
-              <a:cxn ang="0">
-                <a:pos x="connsiteX58" y="connsiteY58"/>
-              </a:cxn>
-              <a:cxn ang="0">
-                <a:pos x="connsiteX59" y="connsiteY59"/>
-              </a:cxn>
-              <a:cxn ang="0">
-                <a:pos x="connsiteX60" y="connsiteY60"/>
-              </a:cxn>
-              <a:cxn ang="0">
-                <a:pos x="connsiteX61" y="connsiteY61"/>
-              </a:cxn>
-              <a:cxn ang="0">
-                <a:pos x="connsiteX62" y="connsiteY62"/>
-              </a:cxn>
-              <a:cxn ang="0">
-                <a:pos x="connsiteX63" y="connsiteY63"/>
-              </a:cxn>
-              <a:cxn ang="0">
-                <a:pos x="connsiteX64" y="connsiteY64"/>
-              </a:cxn>
-              <a:cxn ang="0">
-                <a:pos x="connsiteX65" y="connsiteY65"/>
-              </a:cxn>
-              <a:cxn ang="0">
-                <a:pos x="connsiteX66" y="connsiteY66"/>
-              </a:cxn>
-              <a:cxn ang="0">
-                <a:pos x="connsiteX67" y="connsiteY67"/>
-              </a:cxn>
-              <a:cxn ang="0">
-                <a:pos x="connsiteX68" y="connsiteY68"/>
-              </a:cxn>
-              <a:cxn ang="0">
-                <a:pos x="connsiteX69" y="connsiteY69"/>
-              </a:cxn>
-              <a:cxn ang="0">
-                <a:pos x="connsiteX70" y="connsiteY70"/>
-              </a:cxn>
-              <a:cxn ang="0">
-                <a:pos x="connsiteX71" y="connsiteY71"/>
-              </a:cxn>
-            </a:cxnLst>
-            <a:rect l="l" t="t" r="r" b="b"/>
-            <a:pathLst>
-              <a:path w="3825483" h="6858001">
-                <a:moveTo>
-                  <a:pt x="474634" y="0"/>
-                </a:moveTo>
-                <a:lnTo>
-                  <a:pt x="2642659" y="0"/>
-                </a:lnTo>
-                <a:lnTo>
-                  <a:pt x="2642659" y="1"/>
-                </a:lnTo>
-                <a:lnTo>
-                  <a:pt x="3825483" y="1"/>
-                </a:lnTo>
-                <a:lnTo>
-                  <a:pt x="3825483" y="6858001"/>
-                </a:lnTo>
-                <a:lnTo>
-                  <a:pt x="1772906" y="6858001"/>
-                </a:lnTo>
-                <a:lnTo>
-                  <a:pt x="1772906" y="6858000"/>
-                </a:lnTo>
-                <a:lnTo>
-                  <a:pt x="770467" y="6858000"/>
-                </a:lnTo>
-                <a:lnTo>
-                  <a:pt x="770467" y="6830556"/>
-                </a:lnTo>
-                <a:lnTo>
-                  <a:pt x="759822" y="6858000"/>
-                </a:lnTo>
-                <a:lnTo>
-                  <a:pt x="479377" y="6858000"/>
-                </a:lnTo>
-                <a:lnTo>
-                  <a:pt x="477309" y="6846445"/>
-                </a:lnTo>
-                <a:cubicBezTo>
-                  <a:pt x="479425" y="6803113"/>
-                  <a:pt x="559859" y="6754002"/>
-                  <a:pt x="515408" y="6715003"/>
-                </a:cubicBezTo>
-                <a:cubicBezTo>
-                  <a:pt x="554567" y="6670226"/>
-                  <a:pt x="530225" y="6628337"/>
-                  <a:pt x="541867" y="6583560"/>
-                </a:cubicBezTo>
-                <a:cubicBezTo>
-                  <a:pt x="537633" y="6540227"/>
-                  <a:pt x="570442" y="6492561"/>
-                  <a:pt x="543984" y="6449228"/>
-                </a:cubicBezTo>
-                <a:cubicBezTo>
-                  <a:pt x="567267" y="6410229"/>
-                  <a:pt x="607484" y="6369784"/>
-                  <a:pt x="536575" y="6338007"/>
-                </a:cubicBezTo>
-                <a:cubicBezTo>
-                  <a:pt x="504825" y="6303341"/>
-                  <a:pt x="499533" y="6267229"/>
-                  <a:pt x="518583" y="6228231"/>
-                </a:cubicBezTo>
-                <a:cubicBezTo>
-                  <a:pt x="484717" y="6187786"/>
-                  <a:pt x="584200" y="6141565"/>
-                  <a:pt x="552450" y="6108343"/>
-                </a:cubicBezTo>
-                <a:cubicBezTo>
-                  <a:pt x="587375" y="6069343"/>
-                  <a:pt x="555625" y="6039010"/>
-                  <a:pt x="609600" y="6000011"/>
-                </a:cubicBezTo>
-                <a:cubicBezTo>
-                  <a:pt x="602192" y="5966788"/>
-                  <a:pt x="661458" y="5927789"/>
-                  <a:pt x="662517" y="5891678"/>
-                </a:cubicBezTo>
-                <a:cubicBezTo>
-                  <a:pt x="672042" y="5854123"/>
-                  <a:pt x="705908" y="5812234"/>
-                  <a:pt x="678392" y="5771791"/>
-                </a:cubicBezTo>
-                <a:cubicBezTo>
-                  <a:pt x="631825" y="5722680"/>
-                  <a:pt x="637117" y="5686570"/>
-                  <a:pt x="636059" y="5657681"/>
-                </a:cubicBezTo>
-                <a:cubicBezTo>
-                  <a:pt x="626533" y="5630237"/>
-                  <a:pt x="633942" y="5610015"/>
-                  <a:pt x="656167" y="5589792"/>
-                </a:cubicBezTo>
-                <a:cubicBezTo>
-                  <a:pt x="662517" y="5552237"/>
-                  <a:pt x="695325" y="5517572"/>
-                  <a:pt x="695325" y="5432350"/>
-                </a:cubicBezTo>
-                <a:cubicBezTo>
-                  <a:pt x="717550" y="5402017"/>
-                  <a:pt x="681567" y="5360128"/>
-                  <a:pt x="778934" y="5308129"/>
-                </a:cubicBezTo>
-                <a:cubicBezTo>
-                  <a:pt x="745067" y="5267685"/>
-                  <a:pt x="792692" y="5220019"/>
-                  <a:pt x="841375" y="5191131"/>
-                </a:cubicBezTo>
-                <a:cubicBezTo>
-                  <a:pt x="882650" y="5153576"/>
-                  <a:pt x="917575" y="5116020"/>
-                  <a:pt x="881592" y="5085687"/>
-                </a:cubicBezTo>
-                <a:cubicBezTo>
-                  <a:pt x="886883" y="5068354"/>
-                  <a:pt x="911225" y="5049576"/>
-                  <a:pt x="857250" y="5038021"/>
-                </a:cubicBezTo>
-                <a:cubicBezTo>
-                  <a:pt x="843492" y="5023579"/>
-                  <a:pt x="783167" y="5012021"/>
-                  <a:pt x="755650" y="4997578"/>
-                </a:cubicBezTo>
-                <a:cubicBezTo>
-                  <a:pt x="699559" y="4971578"/>
-                  <a:pt x="718609" y="4939799"/>
-                  <a:pt x="703792" y="4910912"/>
-                </a:cubicBezTo>
-                <a:cubicBezTo>
-                  <a:pt x="662517" y="4884912"/>
-                  <a:pt x="687917" y="4851690"/>
-                  <a:pt x="713317" y="4819913"/>
-                </a:cubicBezTo>
-                <a:cubicBezTo>
-                  <a:pt x="723900" y="4757803"/>
-                  <a:pt x="722842" y="4700025"/>
-                  <a:pt x="751417" y="4642248"/>
-                </a:cubicBezTo>
-                <a:cubicBezTo>
-                  <a:pt x="713317" y="4617692"/>
-                  <a:pt x="717550" y="4565693"/>
-                  <a:pt x="649817" y="4512249"/>
-                </a:cubicBezTo>
-                <a:cubicBezTo>
-                  <a:pt x="630767" y="4481916"/>
-                  <a:pt x="635000" y="4444362"/>
-                  <a:pt x="661458" y="4416918"/>
-                </a:cubicBezTo>
-                <a:cubicBezTo>
-                  <a:pt x="685800" y="4389472"/>
-                  <a:pt x="696383" y="4375028"/>
-                  <a:pt x="726017" y="4386584"/>
-                </a:cubicBezTo>
-                <a:cubicBezTo>
-                  <a:pt x="714375" y="4337473"/>
-                  <a:pt x="718609" y="4285473"/>
-                  <a:pt x="718609" y="4234919"/>
-                </a:cubicBezTo>
-                <a:cubicBezTo>
-                  <a:pt x="714375" y="4210363"/>
-                  <a:pt x="672042" y="4188697"/>
-                  <a:pt x="655109" y="4164141"/>
-                </a:cubicBezTo>
-                <a:cubicBezTo>
-                  <a:pt x="664633" y="4138141"/>
-                  <a:pt x="646642" y="4113587"/>
-                  <a:pt x="699559" y="4084698"/>
-                </a:cubicBezTo>
-                <a:cubicBezTo>
-                  <a:pt x="711200" y="4034142"/>
-                  <a:pt x="748242" y="3980699"/>
-                  <a:pt x="669925" y="3937366"/>
-                </a:cubicBezTo>
-                <a:cubicBezTo>
-                  <a:pt x="631825" y="3889700"/>
-                  <a:pt x="643467" y="3840591"/>
-                  <a:pt x="633942" y="3791478"/>
-                </a:cubicBezTo>
-                <a:cubicBezTo>
-                  <a:pt x="654050" y="3765479"/>
-                  <a:pt x="670984" y="3739479"/>
-                  <a:pt x="672042" y="3714925"/>
-                </a:cubicBezTo>
-                <a:cubicBezTo>
-                  <a:pt x="662517" y="3691814"/>
-                  <a:pt x="639234" y="3668702"/>
-                  <a:pt x="592667" y="3648480"/>
-                </a:cubicBezTo>
-                <a:cubicBezTo>
-                  <a:pt x="532342" y="3628259"/>
-                  <a:pt x="543984" y="3603703"/>
-                  <a:pt x="575734" y="3576258"/>
-                </a:cubicBezTo>
-                <a:cubicBezTo>
-                  <a:pt x="594783" y="3550260"/>
-                  <a:pt x="617008" y="3524260"/>
-                  <a:pt x="549275" y="3505481"/>
-                </a:cubicBezTo>
-                <a:cubicBezTo>
-                  <a:pt x="594783" y="3457815"/>
-                  <a:pt x="542925" y="3417372"/>
-                  <a:pt x="506942" y="3376928"/>
-                </a:cubicBezTo>
-                <a:cubicBezTo>
-                  <a:pt x="478367" y="3336483"/>
-                  <a:pt x="479425" y="3293150"/>
-                  <a:pt x="455083" y="3255596"/>
-                </a:cubicBezTo>
-                <a:cubicBezTo>
-                  <a:pt x="451908" y="3223818"/>
-                  <a:pt x="412750" y="3197818"/>
-                  <a:pt x="403225" y="3167485"/>
-                </a:cubicBezTo>
-                <a:cubicBezTo>
-                  <a:pt x="404283" y="3137152"/>
-                  <a:pt x="352425" y="3109708"/>
-                  <a:pt x="358775" y="3075042"/>
-                </a:cubicBezTo>
-                <a:cubicBezTo>
-                  <a:pt x="339725" y="3036042"/>
-                  <a:pt x="329142" y="2995599"/>
-                  <a:pt x="330200" y="2952266"/>
-                </a:cubicBezTo>
-                <a:cubicBezTo>
-                  <a:pt x="296333" y="2911821"/>
-                  <a:pt x="330200" y="2865600"/>
-                  <a:pt x="320675" y="2822267"/>
-                </a:cubicBezTo>
-                <a:cubicBezTo>
-                  <a:pt x="324908" y="2777489"/>
-                  <a:pt x="315383" y="2734156"/>
-                  <a:pt x="320675" y="2690823"/>
-                </a:cubicBezTo>
-                <a:cubicBezTo>
-                  <a:pt x="365125" y="2643157"/>
-                  <a:pt x="356658" y="2601268"/>
-                  <a:pt x="358775" y="2560825"/>
-                </a:cubicBezTo>
-                <a:cubicBezTo>
-                  <a:pt x="448734" y="2514603"/>
-                  <a:pt x="390525" y="2477048"/>
-                  <a:pt x="370417" y="2436605"/>
-                </a:cubicBezTo>
-                <a:cubicBezTo>
-                  <a:pt x="369359" y="2400493"/>
-                  <a:pt x="356658" y="2375939"/>
-                  <a:pt x="304800" y="2358606"/>
-                </a:cubicBezTo>
-                <a:cubicBezTo>
-                  <a:pt x="283633" y="2339827"/>
-                  <a:pt x="219075" y="2328273"/>
-                  <a:pt x="241300" y="2309494"/>
-                </a:cubicBezTo>
-                <a:cubicBezTo>
-                  <a:pt x="211667" y="2295050"/>
-                  <a:pt x="189442" y="2280607"/>
-                  <a:pt x="167217" y="2260384"/>
-                </a:cubicBezTo>
-                <a:cubicBezTo>
-                  <a:pt x="156633" y="2238718"/>
-                  <a:pt x="154517" y="2212718"/>
-                  <a:pt x="135467" y="2178052"/>
-                </a:cubicBezTo>
-                <a:cubicBezTo>
-                  <a:pt x="117475" y="2114496"/>
-                  <a:pt x="144992" y="2063942"/>
-                  <a:pt x="179917" y="1996054"/>
-                </a:cubicBezTo>
-                <a:cubicBezTo>
-                  <a:pt x="168275" y="1959942"/>
-                  <a:pt x="152400" y="1936832"/>
-                  <a:pt x="131234" y="1919498"/>
-                </a:cubicBezTo>
-                <a:cubicBezTo>
-                  <a:pt x="109008" y="1902165"/>
-                  <a:pt x="82550" y="1887721"/>
-                  <a:pt x="49742" y="1867499"/>
-                </a:cubicBezTo>
-                <a:cubicBezTo>
-                  <a:pt x="15875" y="1829943"/>
-                  <a:pt x="42333" y="1783722"/>
-                  <a:pt x="0" y="1741834"/>
-                </a:cubicBezTo>
-                <a:cubicBezTo>
-                  <a:pt x="5292" y="1695613"/>
-                  <a:pt x="10583" y="1646501"/>
-                  <a:pt x="47625" y="1595947"/>
-                </a:cubicBezTo>
-                <a:cubicBezTo>
-                  <a:pt x="104775" y="1543948"/>
-                  <a:pt x="109008" y="1496280"/>
-                  <a:pt x="131234" y="1448614"/>
-                </a:cubicBezTo>
-                <a:cubicBezTo>
-                  <a:pt x="162984" y="1400949"/>
-                  <a:pt x="165100" y="1357616"/>
-                  <a:pt x="187325" y="1317172"/>
-                </a:cubicBezTo>
-                <a:cubicBezTo>
-                  <a:pt x="130175" y="1252172"/>
-                  <a:pt x="143934" y="1195839"/>
-                  <a:pt x="165100" y="1138063"/>
-                </a:cubicBezTo>
-                <a:cubicBezTo>
-                  <a:pt x="148167" y="1083174"/>
-                  <a:pt x="79375" y="1029730"/>
-                  <a:pt x="141817" y="951731"/>
-                </a:cubicBezTo>
-                <a:cubicBezTo>
-                  <a:pt x="142875" y="888176"/>
-                  <a:pt x="242359" y="802956"/>
-                  <a:pt x="232833" y="723511"/>
-                </a:cubicBezTo>
-                <a:cubicBezTo>
-                  <a:pt x="298450" y="678734"/>
-                  <a:pt x="258234" y="641179"/>
-                  <a:pt x="293158" y="597846"/>
-                </a:cubicBezTo>
-                <a:cubicBezTo>
-                  <a:pt x="341842" y="553069"/>
-                  <a:pt x="313267" y="515513"/>
-                  <a:pt x="335492" y="476514"/>
-                </a:cubicBezTo>
-                <a:cubicBezTo>
-                  <a:pt x="322792" y="418737"/>
-                  <a:pt x="288925" y="362404"/>
-                  <a:pt x="376767" y="297405"/>
-                </a:cubicBezTo>
-                <a:cubicBezTo>
-                  <a:pt x="331258" y="242516"/>
-                  <a:pt x="418042" y="177517"/>
-                  <a:pt x="418042" y="118295"/>
-                </a:cubicBezTo>
-                <a:cubicBezTo>
-                  <a:pt x="509588" y="81463"/>
-                  <a:pt x="510117" y="52213"/>
-                  <a:pt x="492654" y="24408"/>
-                </a:cubicBezTo>
-                <a:close/>
-              </a:path>
-            </a:pathLst>
-          </a:custGeom>
-          <a:solidFill>
-            <a:schemeClr val="accent2"/>
-          </a:solidFill>
-          <a:ln w="10583" cap="flat">
-            <a:noFill/>
-            <a:prstDash val="solid"/>
-            <a:miter/>
-          </a:ln>
-          <a:effectLst>
-            <a:outerShdw blurRad="127000" algn="ctr" rotWithShape="0">
-              <a:prstClr val="black">
-                <a:alpha val="50000"/>
-              </a:prstClr>
-            </a:outerShdw>
-          </a:effectLst>
-        </p:spPr>
-        <p:txBody>
-          <a:bodyPr wrap="square" rtlCol="0" anchor="ctr">
-            <a:noAutofit/>
-          </a:bodyPr>
-          <a:lstStyle/>
-          <a:p>
-            <a:pPr lvl="0"/>
-            <a:endParaRPr lang="en-US" dirty="0"/>
-          </a:p>
-        </p:txBody>
-      </p:sp>
-      <p:sp>
-        <p:nvSpPr>
-          <p:cNvPr id="13" name="Title 1">
-            <a:extLst>
-              <a:ext uri="{FF2B5EF4-FFF2-40B4-BE49-F238E27FC236}">
-                <a16:creationId xmlns:a16="http://schemas.microsoft.com/office/drawing/2014/main" id="{D3666D80-E54A-2AF5-91A6-D1DF326E105C}"/>
-              </a:ext>
-            </a:extLst>
-          </p:cNvPr>
-          <p:cNvSpPr>
-            <a:spLocks noGrp="1"/>
-          </p:cNvSpPr>
-          <p:nvPr>
-            <p:ph type="title"/>
-          </p:nvPr>
-        </p:nvSpPr>
-        <p:spPr>
-          <a:xfrm>
-            <a:off x="838200" y="853333"/>
-            <a:ext cx="7383780" cy="1805565"/>
-          </a:xfrm>
-        </p:spPr>
-        <p:txBody>
-          <a:bodyPr anchor="t">
-            <a:normAutofit/>
-          </a:bodyPr>
-          <a:lstStyle>
-            <a:lvl1pPr>
-              <a:defRPr sz="3600">
-                <a:solidFill>
-                  <a:schemeClr val="bg1">
-                    <a:lumMod val="95000"/>
-                  </a:schemeClr>
-                </a:solidFill>
-              </a:defRPr>
-            </a:lvl1pPr>
-          </a:lstStyle>
-          <a:p>
-            <a:r>
-              <a:rPr lang="en-US"/>
-              <a:t>Click to edit Master title style</a:t>
-            </a:r>
-            <a:endParaRPr lang="en-US" dirty="0"/>
-          </a:p>
-        </p:txBody>
-      </p:sp>
-      <p:sp>
-        <p:nvSpPr>
-          <p:cNvPr id="14" name="Content Placeholder 2">
-            <a:extLst>
-              <a:ext uri="{FF2B5EF4-FFF2-40B4-BE49-F238E27FC236}">
-                <a16:creationId xmlns:a16="http://schemas.microsoft.com/office/drawing/2014/main" id="{99A0C594-25FA-788A-5743-35631FCBD662}"/>
-              </a:ext>
-            </a:extLst>
-          </p:cNvPr>
-          <p:cNvSpPr>
-            <a:spLocks noGrp="1"/>
-          </p:cNvSpPr>
-          <p:nvPr>
-            <p:ph idx="1"/>
-          </p:nvPr>
-        </p:nvSpPr>
-        <p:spPr>
-          <a:xfrm>
-            <a:off x="838200" y="2916309"/>
-            <a:ext cx="6835140" cy="2844411"/>
-          </a:xfrm>
-        </p:spPr>
-        <p:txBody>
-          <a:bodyPr anchor="b" anchorCtr="0">
-            <a:normAutofit/>
-          </a:bodyPr>
-          <a:lstStyle>
-            <a:lvl1pPr marL="342900" indent="-342900">
-              <a:lnSpc>
-                <a:spcPct val="100000"/>
-              </a:lnSpc>
-              <a:buFont typeface="Arial" panose="020B0604020202020204" pitchFamily="34" charset="0"/>
-              <a:buChar char="•"/>
-              <a:defRPr lang="en-US" sz="2400" kern="1200" dirty="0">
-                <a:solidFill>
-                  <a:schemeClr val="bg2"/>
-                </a:solidFill>
-                <a:latin typeface="+mn-lt"/>
-                <a:ea typeface="+mn-ea"/>
-                <a:cs typeface="+mn-cs"/>
-              </a:defRPr>
-            </a:lvl1pPr>
-            <a:lvl2pPr marL="800100" indent="-342900">
-              <a:lnSpc>
-                <a:spcPct val="100000"/>
-              </a:lnSpc>
-              <a:buFont typeface="Arial" panose="020B0604020202020204" pitchFamily="34" charset="0"/>
-              <a:buChar char="•"/>
-              <a:defRPr lang="en-US" sz="2400" kern="1200" dirty="0">
-                <a:solidFill>
-                  <a:schemeClr val="bg2"/>
-                </a:solidFill>
-                <a:latin typeface="+mn-lt"/>
-                <a:ea typeface="+mn-ea"/>
-                <a:cs typeface="+mn-cs"/>
-              </a:defRPr>
-            </a:lvl2pPr>
-            <a:lvl3pPr marL="1257300" indent="-342900">
-              <a:lnSpc>
-                <a:spcPct val="100000"/>
-              </a:lnSpc>
-              <a:buFont typeface="Arial" panose="020B0604020202020204" pitchFamily="34" charset="0"/>
-              <a:buChar char="•"/>
-              <a:defRPr lang="en-US" sz="2400" kern="1200" dirty="0">
-                <a:solidFill>
-                  <a:schemeClr val="bg2"/>
-                </a:solidFill>
-                <a:latin typeface="+mn-lt"/>
-                <a:ea typeface="+mn-ea"/>
-                <a:cs typeface="+mn-cs"/>
-              </a:defRPr>
-            </a:lvl3pPr>
-            <a:lvl4pPr marL="1714500" indent="-342900">
-              <a:lnSpc>
-                <a:spcPct val="100000"/>
-              </a:lnSpc>
-              <a:buFont typeface="Arial" panose="020B0604020202020204" pitchFamily="34" charset="0"/>
-              <a:buChar char="•"/>
-              <a:defRPr lang="en-US" sz="2400" kern="1200" dirty="0">
-                <a:solidFill>
-                  <a:schemeClr val="bg2"/>
-                </a:solidFill>
-                <a:latin typeface="+mn-lt"/>
-                <a:ea typeface="+mn-ea"/>
-                <a:cs typeface="+mn-cs"/>
-              </a:defRPr>
-            </a:lvl4pPr>
-            <a:lvl5pPr marL="2171700" indent="-342900">
-              <a:lnSpc>
-                <a:spcPct val="100000"/>
-              </a:lnSpc>
-              <a:buFont typeface="Arial" panose="020B0604020202020204" pitchFamily="34" charset="0"/>
-              <a:buChar char="•"/>
-              <a:defRPr lang="en-US" sz="2400" kern="1200" dirty="0">
-                <a:solidFill>
-                  <a:schemeClr val="bg2"/>
-                </a:solidFill>
-                <a:latin typeface="+mn-lt"/>
-                <a:ea typeface="+mn-ea"/>
-                <a:cs typeface="+mn-cs"/>
-              </a:defRPr>
-            </a:lvl5pPr>
-          </a:lstStyle>
-          <a:p>
-            <a:pPr lvl="0"/>
-            <a:r>
-              <a:rPr lang="en-US"/>
-              <a:t>Click to edit Master text styles</a:t>
-            </a:r>
-          </a:p>
-          <a:p>
-            <a:pPr lvl="1"/>
-            <a:r>
-              <a:rPr lang="en-US"/>
-              <a:t>Second level</a:t>
-            </a:r>
-          </a:p>
-          <a:p>
-            <a:pPr lvl="2"/>
-            <a:r>
-              <a:rPr lang="en-US"/>
-              <a:t>Third level</a:t>
-            </a:r>
-          </a:p>
-          <a:p>
-            <a:pPr lvl="3"/>
-            <a:r>
-              <a:rPr lang="en-US"/>
-              <a:t>Fourth level</a:t>
-            </a:r>
-          </a:p>
-          <a:p>
-            <a:pPr lvl="4"/>
-            <a:r>
-              <a:rPr lang="en-US"/>
-              <a:t>Fifth level</a:t>
-            </a:r>
-            <a:endParaRPr lang="en-US" dirty="0"/>
-          </a:p>
-        </p:txBody>
-      </p:sp>
-      <p:sp>
-        <p:nvSpPr>
-          <p:cNvPr id="5" name="Picture Placeholder 4">
-            <a:extLst>
-              <a:ext uri="{FF2B5EF4-FFF2-40B4-BE49-F238E27FC236}">
-                <a16:creationId xmlns:a16="http://schemas.microsoft.com/office/drawing/2014/main" id="{CAD571D0-9B56-17AE-B31E-FA3BF0F2FBCF}"/>
-              </a:ext>
-            </a:extLst>
-          </p:cNvPr>
-          <p:cNvSpPr>
-            <a:spLocks noGrp="1"/>
-          </p:cNvSpPr>
-          <p:nvPr>
-            <p:ph type="pic" sz="quarter" idx="14"/>
-          </p:nvPr>
-        </p:nvSpPr>
-        <p:spPr>
-          <a:xfrm>
-            <a:off x="9064625" y="2"/>
-            <a:ext cx="3127373" cy="6857999"/>
-          </a:xfrm>
-          <a:custGeom>
-            <a:avLst/>
-            <a:gdLst>
-              <a:gd name="connsiteX0" fmla="*/ 13983 w 3127373"/>
-              <a:gd name="connsiteY0" fmla="*/ 0 h 6857999"/>
-              <a:gd name="connsiteX1" fmla="*/ 3127373 w 3127373"/>
-              <a:gd name="connsiteY1" fmla="*/ 0 h 6857999"/>
-              <a:gd name="connsiteX2" fmla="*/ 3127373 w 3127373"/>
-              <a:gd name="connsiteY2" fmla="*/ 6857999 h 6857999"/>
-              <a:gd name="connsiteX3" fmla="*/ 1338911 w 3127373"/>
-              <a:gd name="connsiteY3" fmla="*/ 6857999 h 6857999"/>
-              <a:gd name="connsiteX4" fmla="*/ 1342632 w 3127373"/>
-              <a:gd name="connsiteY4" fmla="*/ 6835323 h 6857999"/>
-              <a:gd name="connsiteX5" fmla="*/ 1319861 w 3127373"/>
-              <a:gd name="connsiteY5" fmla="*/ 6778602 h 6857999"/>
-              <a:gd name="connsiteX6" fmla="*/ 1321766 w 3127373"/>
-              <a:gd name="connsiteY6" fmla="*/ 6674854 h 6857999"/>
-              <a:gd name="connsiteX7" fmla="*/ 1324624 w 3127373"/>
-              <a:gd name="connsiteY7" fmla="*/ 6571105 h 6857999"/>
-              <a:gd name="connsiteX8" fmla="*/ 1320813 w 3127373"/>
-              <a:gd name="connsiteY8" fmla="*/ 6468414 h 6857999"/>
-              <a:gd name="connsiteX9" fmla="*/ 1303669 w 3127373"/>
-              <a:gd name="connsiteY9" fmla="*/ 6366783 h 6857999"/>
-              <a:gd name="connsiteX10" fmla="*/ 1284619 w 3127373"/>
-              <a:gd name="connsiteY10" fmla="*/ 6284208 h 6857999"/>
-              <a:gd name="connsiteX11" fmla="*/ 1259853 w 3127373"/>
-              <a:gd name="connsiteY11" fmla="*/ 6203749 h 6857999"/>
-              <a:gd name="connsiteX12" fmla="*/ 1261758 w 3127373"/>
-              <a:gd name="connsiteY12" fmla="*/ 6108470 h 6857999"/>
-              <a:gd name="connsiteX13" fmla="*/ 1277951 w 3127373"/>
-              <a:gd name="connsiteY13" fmla="*/ 6019542 h 6857999"/>
-              <a:gd name="connsiteX14" fmla="*/ 1291286 w 3127373"/>
-              <a:gd name="connsiteY14" fmla="*/ 5930615 h 6857999"/>
-              <a:gd name="connsiteX15" fmla="*/ 1283666 w 3127373"/>
-              <a:gd name="connsiteY15" fmla="*/ 5838512 h 6857999"/>
-              <a:gd name="connsiteX16" fmla="*/ 1244613 w 3127373"/>
-              <a:gd name="connsiteY16" fmla="*/ 5756995 h 6857999"/>
-              <a:gd name="connsiteX17" fmla="*/ 1246519 w 3127373"/>
-              <a:gd name="connsiteY17" fmla="*/ 5703004 h 6857999"/>
-              <a:gd name="connsiteX18" fmla="*/ 1245566 w 3127373"/>
-              <a:gd name="connsiteY18" fmla="*/ 5579140 h 6857999"/>
-              <a:gd name="connsiteX19" fmla="*/ 1274141 w 3127373"/>
-              <a:gd name="connsiteY19" fmla="*/ 5475391 h 6857999"/>
-              <a:gd name="connsiteX20" fmla="*/ 1292238 w 3127373"/>
-              <a:gd name="connsiteY20" fmla="*/ 5379054 h 6857999"/>
-              <a:gd name="connsiteX21" fmla="*/ 1299858 w 3127373"/>
-              <a:gd name="connsiteY21" fmla="*/ 5294361 h 6857999"/>
-              <a:gd name="connsiteX22" fmla="*/ 1279856 w 3127373"/>
-              <a:gd name="connsiteY22" fmla="*/ 5260484 h 6857999"/>
-              <a:gd name="connsiteX23" fmla="*/ 1218896 w 3127373"/>
-              <a:gd name="connsiteY23" fmla="*/ 5241428 h 6857999"/>
-              <a:gd name="connsiteX24" fmla="*/ 1178891 w 3127373"/>
-              <a:gd name="connsiteY24" fmla="*/ 5182143 h 6857999"/>
-              <a:gd name="connsiteX25" fmla="*/ 1171271 w 3127373"/>
-              <a:gd name="connsiteY25" fmla="*/ 5112271 h 6857999"/>
-              <a:gd name="connsiteX26" fmla="*/ 1167461 w 3127373"/>
-              <a:gd name="connsiteY26" fmla="*/ 4973586 h 6857999"/>
-              <a:gd name="connsiteX27" fmla="*/ 1094119 w 3127373"/>
-              <a:gd name="connsiteY27" fmla="*/ 4887835 h 6857999"/>
-              <a:gd name="connsiteX28" fmla="*/ 1087451 w 3127373"/>
-              <a:gd name="connsiteY28" fmla="*/ 4813729 h 6857999"/>
-              <a:gd name="connsiteX29" fmla="*/ 1118883 w 3127373"/>
-              <a:gd name="connsiteY29" fmla="*/ 4783027 h 6857999"/>
-              <a:gd name="connsiteX30" fmla="*/ 1094119 w 3127373"/>
-              <a:gd name="connsiteY30" fmla="*/ 4668692 h 6857999"/>
-              <a:gd name="connsiteX31" fmla="*/ 1049351 w 3127373"/>
-              <a:gd name="connsiteY31" fmla="*/ 4623170 h 6857999"/>
-              <a:gd name="connsiteX32" fmla="*/ 1062686 w 3127373"/>
-              <a:gd name="connsiteY32" fmla="*/ 4557533 h 6857999"/>
-              <a:gd name="connsiteX33" fmla="*/ 1026491 w 3127373"/>
-              <a:gd name="connsiteY33" fmla="*/ 4449550 h 6857999"/>
-              <a:gd name="connsiteX34" fmla="*/ 986486 w 3127373"/>
-              <a:gd name="connsiteY34" fmla="*/ 4343684 h 6857999"/>
-              <a:gd name="connsiteX35" fmla="*/ 996963 w 3127373"/>
-              <a:gd name="connsiteY35" fmla="*/ 4281222 h 6857999"/>
-              <a:gd name="connsiteX36" fmla="*/ 944576 w 3127373"/>
-              <a:gd name="connsiteY36" fmla="*/ 4239935 h 6857999"/>
-              <a:gd name="connsiteX37" fmla="*/ 925526 w 3127373"/>
-              <a:gd name="connsiteY37" fmla="*/ 4188060 h 6857999"/>
-              <a:gd name="connsiteX38" fmla="*/ 900761 w 3127373"/>
-              <a:gd name="connsiteY38" fmla="*/ 4138304 h 6857999"/>
-              <a:gd name="connsiteX39" fmla="*/ 861708 w 3127373"/>
-              <a:gd name="connsiteY39" fmla="*/ 4048317 h 6857999"/>
-              <a:gd name="connsiteX40" fmla="*/ 816941 w 3127373"/>
-              <a:gd name="connsiteY40" fmla="*/ 3962566 h 6857999"/>
-              <a:gd name="connsiteX41" fmla="*/ 776936 w 3127373"/>
-              <a:gd name="connsiteY41" fmla="*/ 3902222 h 6857999"/>
-              <a:gd name="connsiteX42" fmla="*/ 739788 w 3127373"/>
-              <a:gd name="connsiteY42" fmla="*/ 3837644 h 6857999"/>
-              <a:gd name="connsiteX43" fmla="*/ 707403 w 3127373"/>
-              <a:gd name="connsiteY43" fmla="*/ 3748717 h 6857999"/>
-              <a:gd name="connsiteX44" fmla="*/ 684544 w 3127373"/>
-              <a:gd name="connsiteY44" fmla="*/ 3651320 h 6857999"/>
-              <a:gd name="connsiteX45" fmla="*/ 666446 w 3127373"/>
-              <a:gd name="connsiteY45" fmla="*/ 3551806 h 6857999"/>
-              <a:gd name="connsiteX46" fmla="*/ 669303 w 3127373"/>
-              <a:gd name="connsiteY46" fmla="*/ 3449115 h 6857999"/>
-              <a:gd name="connsiteX47" fmla="*/ 658826 w 3127373"/>
-              <a:gd name="connsiteY47" fmla="*/ 3353836 h 6857999"/>
-              <a:gd name="connsiteX48" fmla="*/ 612153 w 3127373"/>
-              <a:gd name="connsiteY48" fmla="*/ 3303020 h 6857999"/>
-              <a:gd name="connsiteX49" fmla="*/ 570244 w 3127373"/>
-              <a:gd name="connsiteY49" fmla="*/ 3273378 h 6857999"/>
-              <a:gd name="connsiteX50" fmla="*/ 523571 w 3127373"/>
-              <a:gd name="connsiteY50" fmla="*/ 3245852 h 6857999"/>
-              <a:gd name="connsiteX51" fmla="*/ 494996 w 3127373"/>
-              <a:gd name="connsiteY51" fmla="*/ 3187627 h 6857999"/>
-              <a:gd name="connsiteX52" fmla="*/ 494044 w 3127373"/>
-              <a:gd name="connsiteY52" fmla="*/ 3043649 h 6857999"/>
-              <a:gd name="connsiteX53" fmla="*/ 456896 w 3127373"/>
-              <a:gd name="connsiteY53" fmla="*/ 2990716 h 6857999"/>
-              <a:gd name="connsiteX54" fmla="*/ 405461 w 3127373"/>
-              <a:gd name="connsiteY54" fmla="*/ 2961073 h 6857999"/>
-              <a:gd name="connsiteX55" fmla="*/ 360694 w 3127373"/>
-              <a:gd name="connsiteY55" fmla="*/ 2872146 h 6857999"/>
-              <a:gd name="connsiteX56" fmla="*/ 366408 w 3127373"/>
-              <a:gd name="connsiteY56" fmla="*/ 2755693 h 6857999"/>
-              <a:gd name="connsiteX57" fmla="*/ 391174 w 3127373"/>
-              <a:gd name="connsiteY57" fmla="*/ 2633947 h 6857999"/>
-              <a:gd name="connsiteX58" fmla="*/ 403556 w 3127373"/>
-              <a:gd name="connsiteY58" fmla="*/ 2527023 h 6857999"/>
-              <a:gd name="connsiteX59" fmla="*/ 367361 w 3127373"/>
-              <a:gd name="connsiteY59" fmla="*/ 2394690 h 6857999"/>
-              <a:gd name="connsiteX60" fmla="*/ 329261 w 3127373"/>
-              <a:gd name="connsiteY60" fmla="*/ 2257064 h 6857999"/>
-              <a:gd name="connsiteX61" fmla="*/ 347358 w 3127373"/>
-              <a:gd name="connsiteY61" fmla="*/ 2073916 h 6857999"/>
-              <a:gd name="connsiteX62" fmla="*/ 362599 w 3127373"/>
-              <a:gd name="connsiteY62" fmla="*/ 1971226 h 6857999"/>
-              <a:gd name="connsiteX63" fmla="*/ 369266 w 3127373"/>
-              <a:gd name="connsiteY63" fmla="*/ 1874888 h 6857999"/>
-              <a:gd name="connsiteX64" fmla="*/ 367361 w 3127373"/>
-              <a:gd name="connsiteY64" fmla="*/ 1734086 h 6857999"/>
-              <a:gd name="connsiteX65" fmla="*/ 365456 w 3127373"/>
-              <a:gd name="connsiteY65" fmla="*/ 1593284 h 6857999"/>
-              <a:gd name="connsiteX66" fmla="*/ 363551 w 3127373"/>
-              <a:gd name="connsiteY66" fmla="*/ 1452482 h 6857999"/>
-              <a:gd name="connsiteX67" fmla="*/ 361646 w 3127373"/>
-              <a:gd name="connsiteY67" fmla="*/ 1311681 h 6857999"/>
-              <a:gd name="connsiteX68" fmla="*/ 359741 w 3127373"/>
-              <a:gd name="connsiteY68" fmla="*/ 1170878 h 6857999"/>
-              <a:gd name="connsiteX69" fmla="*/ 357836 w 3127373"/>
-              <a:gd name="connsiteY69" fmla="*/ 1030077 h 6857999"/>
-              <a:gd name="connsiteX70" fmla="*/ 346406 w 3127373"/>
-              <a:gd name="connsiteY70" fmla="*/ 908331 h 6857999"/>
-              <a:gd name="connsiteX71" fmla="*/ 304496 w 3127373"/>
-              <a:gd name="connsiteY71" fmla="*/ 818345 h 6857999"/>
-              <a:gd name="connsiteX72" fmla="*/ 365456 w 3127373"/>
-              <a:gd name="connsiteY72" fmla="*/ 766470 h 6857999"/>
-              <a:gd name="connsiteX73" fmla="*/ 391174 w 3127373"/>
-              <a:gd name="connsiteY73" fmla="*/ 720948 h 6857999"/>
-              <a:gd name="connsiteX74" fmla="*/ 382601 w 3127373"/>
-              <a:gd name="connsiteY74" fmla="*/ 639431 h 6857999"/>
-              <a:gd name="connsiteX75" fmla="*/ 314974 w 3127373"/>
-              <a:gd name="connsiteY75" fmla="*/ 574853 h 6857999"/>
-              <a:gd name="connsiteX76" fmla="*/ 222581 w 3127373"/>
-              <a:gd name="connsiteY76" fmla="*/ 528272 h 6857999"/>
-              <a:gd name="connsiteX77" fmla="*/ 141619 w 3127373"/>
-              <a:gd name="connsiteY77" fmla="*/ 500747 h 6857999"/>
-              <a:gd name="connsiteX78" fmla="*/ 106376 w 3127373"/>
-              <a:gd name="connsiteY78" fmla="*/ 493336 h 6857999"/>
-              <a:gd name="connsiteX79" fmla="*/ 135903 w 3127373"/>
-              <a:gd name="connsiteY79" fmla="*/ 385352 h 6857999"/>
-              <a:gd name="connsiteX80" fmla="*/ 151144 w 3127373"/>
-              <a:gd name="connsiteY80" fmla="*/ 278428 h 6857999"/>
-              <a:gd name="connsiteX81" fmla="*/ 122569 w 3127373"/>
-              <a:gd name="connsiteY81" fmla="*/ 222319 h 6857999"/>
-              <a:gd name="connsiteX82" fmla="*/ 63513 w 3127373"/>
-              <a:gd name="connsiteY82" fmla="*/ 116453 h 6857999"/>
-              <a:gd name="connsiteX83" fmla="*/ 10412 w 3127373"/>
-              <a:gd name="connsiteY83" fmla="*/ 69078 h 6857999"/>
-              <a:gd name="connsiteX84" fmla="*/ 0 w 3127373"/>
-              <a:gd name="connsiteY84" fmla="*/ 41687 h 6857999"/>
-              <a:gd name="connsiteX85" fmla="*/ 0 w 3127373"/>
-              <a:gd name="connsiteY85" fmla="*/ 35112 h 6857999"/>
-              <a:gd name="connsiteX86" fmla="*/ 2308 w 3127373"/>
-              <a:gd name="connsiteY86" fmla="*/ 21736 h 6857999"/>
-              <a:gd name="connsiteX87" fmla="*/ 13031 w 3127373"/>
-              <a:gd name="connsiteY87" fmla="*/ 1059 h 6857999"/>
-              <a:gd name="connsiteX88" fmla="*/ 13983 w 3127373"/>
-              <a:gd name="connsiteY88" fmla="*/ 0 h 6857999"/>
-            </a:gdLst>
-            <a:ahLst/>
-            <a:cxnLst>
-              <a:cxn ang="0">
-                <a:pos x="connsiteX0" y="connsiteY0"/>
-              </a:cxn>
-              <a:cxn ang="0">
-                <a:pos x="connsiteX1" y="connsiteY1"/>
-              </a:cxn>
-              <a:cxn ang="0">
-                <a:pos x="connsiteX2" y="connsiteY2"/>
-              </a:cxn>
-              <a:cxn ang="0">
-                <a:pos x="connsiteX3" y="connsiteY3"/>
-              </a:cxn>
-              <a:cxn ang="0">
-                <a:pos x="connsiteX4" y="connsiteY4"/>
-              </a:cxn>
-              <a:cxn ang="0">
-                <a:pos x="connsiteX5" y="connsiteY5"/>
-              </a:cxn>
-              <a:cxn ang="0">
-                <a:pos x="connsiteX6" y="connsiteY6"/>
-              </a:cxn>
-              <a:cxn ang="0">
-                <a:pos x="connsiteX7" y="connsiteY7"/>
-              </a:cxn>
-              <a:cxn ang="0">
-                <a:pos x="connsiteX8" y="connsiteY8"/>
-              </a:cxn>
-              <a:cxn ang="0">
-                <a:pos x="connsiteX9" y="connsiteY9"/>
-              </a:cxn>
-              <a:cxn ang="0">
-                <a:pos x="connsiteX10" y="connsiteY10"/>
-              </a:cxn>
-              <a:cxn ang="0">
-                <a:pos x="connsiteX11" y="connsiteY11"/>
-              </a:cxn>
-              <a:cxn ang="0">
-                <a:pos x="connsiteX12" y="connsiteY12"/>
-              </a:cxn>
-              <a:cxn ang="0">
-                <a:pos x="connsiteX13" y="connsiteY13"/>
-              </a:cxn>
-              <a:cxn ang="0">
-                <a:pos x="connsiteX14" y="connsiteY14"/>
-              </a:cxn>
-              <a:cxn ang="0">
-                <a:pos x="connsiteX15" y="connsiteY15"/>
-              </a:cxn>
-              <a:cxn ang="0">
-                <a:pos x="connsiteX16" y="connsiteY16"/>
-              </a:cxn>
-              <a:cxn ang="0">
-                <a:pos x="connsiteX17" y="connsiteY17"/>
-              </a:cxn>
-              <a:cxn ang="0">
-                <a:pos x="connsiteX18" y="connsiteY18"/>
-              </a:cxn>
-              <a:cxn ang="0">
-                <a:pos x="connsiteX19" y="connsiteY19"/>
-              </a:cxn>
-              <a:cxn ang="0">
-                <a:pos x="connsiteX20" y="connsiteY20"/>
-              </a:cxn>
-              <a:cxn ang="0">
-                <a:pos x="connsiteX21" y="connsiteY21"/>
-              </a:cxn>
-              <a:cxn ang="0">
-                <a:pos x="connsiteX22" y="connsiteY22"/>
-              </a:cxn>
-              <a:cxn ang="0">
-                <a:pos x="connsiteX23" y="connsiteY23"/>
-              </a:cxn>
-              <a:cxn ang="0">
-                <a:pos x="connsiteX24" y="connsiteY24"/>
-              </a:cxn>
-              <a:cxn ang="0">
-                <a:pos x="connsiteX25" y="connsiteY25"/>
-              </a:cxn>
-              <a:cxn ang="0">
-                <a:pos x="connsiteX26" y="connsiteY26"/>
-              </a:cxn>
-              <a:cxn ang="0">
-                <a:pos x="connsiteX27" y="connsiteY27"/>
-              </a:cxn>
-              <a:cxn ang="0">
-                <a:pos x="connsiteX28" y="connsiteY28"/>
-              </a:cxn>
-              <a:cxn ang="0">
-                <a:pos x="connsiteX29" y="connsiteY29"/>
-              </a:cxn>
-              <a:cxn ang="0">
-                <a:pos x="connsiteX30" y="connsiteY30"/>
-              </a:cxn>
-              <a:cxn ang="0">
-                <a:pos x="connsiteX31" y="connsiteY31"/>
-              </a:cxn>
-              <a:cxn ang="0">
-                <a:pos x="connsiteX32" y="connsiteY32"/>
-              </a:cxn>
-              <a:cxn ang="0">
-                <a:pos x="connsiteX33" y="connsiteY33"/>
-              </a:cxn>
-              <a:cxn ang="0">
-                <a:pos x="connsiteX34" y="connsiteY34"/>
-              </a:cxn>
-              <a:cxn ang="0">
-                <a:pos x="connsiteX35" y="connsiteY35"/>
-              </a:cxn>
-              <a:cxn ang="0">
-                <a:pos x="connsiteX36" y="connsiteY36"/>
-              </a:cxn>
-              <a:cxn ang="0">
-                <a:pos x="connsiteX37" y="connsiteY37"/>
-              </a:cxn>
-              <a:cxn ang="0">
-                <a:pos x="connsiteX38" y="connsiteY38"/>
-              </a:cxn>
-              <a:cxn ang="0">
-                <a:pos x="connsiteX39" y="connsiteY39"/>
-              </a:cxn>
-              <a:cxn ang="0">
-                <a:pos x="connsiteX40" y="connsiteY40"/>
-              </a:cxn>
-              <a:cxn ang="0">
-                <a:pos x="connsiteX41" y="connsiteY41"/>
-              </a:cxn>
-              <a:cxn ang="0">
-                <a:pos x="connsiteX42" y="connsiteY42"/>
-              </a:cxn>
-              <a:cxn ang="0">
-                <a:pos x="connsiteX43" y="connsiteY43"/>
-              </a:cxn>
-              <a:cxn ang="0">
-                <a:pos x="connsiteX44" y="connsiteY44"/>
-              </a:cxn>
-              <a:cxn ang="0">
-                <a:pos x="connsiteX45" y="connsiteY45"/>
-              </a:cxn>
-              <a:cxn ang="0">
-                <a:pos x="connsiteX46" y="connsiteY46"/>
-              </a:cxn>
-              <a:cxn ang="0">
-                <a:pos x="connsiteX47" y="connsiteY47"/>
-              </a:cxn>
-              <a:cxn ang="0">
-                <a:pos x="connsiteX48" y="connsiteY48"/>
-              </a:cxn>
-              <a:cxn ang="0">
-                <a:pos x="connsiteX49" y="connsiteY49"/>
-              </a:cxn>
-              <a:cxn ang="0">
-                <a:pos x="connsiteX50" y="connsiteY50"/>
-              </a:cxn>
-              <a:cxn ang="0">
-                <a:pos x="connsiteX51" y="connsiteY51"/>
-              </a:cxn>
-              <a:cxn ang="0">
-                <a:pos x="connsiteX52" y="connsiteY52"/>
-              </a:cxn>
-              <a:cxn ang="0">
-                <a:pos x="connsiteX53" y="connsiteY53"/>
-              </a:cxn>
-              <a:cxn ang="0">
-                <a:pos x="connsiteX54" y="connsiteY54"/>
-              </a:cxn>
-              <a:cxn ang="0">
-                <a:pos x="connsiteX55" y="connsiteY55"/>
-              </a:cxn>
-              <a:cxn ang="0">
-                <a:pos x="connsiteX56" y="connsiteY56"/>
-              </a:cxn>
-              <a:cxn ang="0">
-                <a:pos x="connsiteX57" y="connsiteY57"/>
-              </a:cxn>
-              <a:cxn ang="0">
-                <a:pos x="connsiteX58" y="connsiteY58"/>
-              </a:cxn>
-              <a:cxn ang="0">
-                <a:pos x="connsiteX59" y="connsiteY59"/>
-              </a:cxn>
-              <a:cxn ang="0">
-                <a:pos x="connsiteX60" y="connsiteY60"/>
-              </a:cxn>
-              <a:cxn ang="0">
-                <a:pos x="connsiteX61" y="connsiteY61"/>
-              </a:cxn>
-              <a:cxn ang="0">
-                <a:pos x="connsiteX62" y="connsiteY62"/>
-              </a:cxn>
-              <a:cxn ang="0">
-                <a:pos x="connsiteX63" y="connsiteY63"/>
-              </a:cxn>
-              <a:cxn ang="0">
-                <a:pos x="connsiteX64" y="connsiteY64"/>
-              </a:cxn>
-              <a:cxn ang="0">
-                <a:pos x="connsiteX65" y="connsiteY65"/>
-              </a:cxn>
-              <a:cxn ang="0">
-                <a:pos x="connsiteX66" y="connsiteY66"/>
-              </a:cxn>
-              <a:cxn ang="0">
-                <a:pos x="connsiteX67" y="connsiteY67"/>
-              </a:cxn>
-              <a:cxn ang="0">
-                <a:pos x="connsiteX68" y="connsiteY68"/>
-              </a:cxn>
-              <a:cxn ang="0">
-                <a:pos x="connsiteX69" y="connsiteY69"/>
-              </a:cxn>
-              <a:cxn ang="0">
-                <a:pos x="connsiteX70" y="connsiteY70"/>
-              </a:cxn>
-              <a:cxn ang="0">
-                <a:pos x="connsiteX71" y="connsiteY71"/>
-              </a:cxn>
-              <a:cxn ang="0">
-                <a:pos x="connsiteX72" y="connsiteY72"/>
-              </a:cxn>
-              <a:cxn ang="0">
-                <a:pos x="connsiteX73" y="connsiteY73"/>
-              </a:cxn>
-              <a:cxn ang="0">
-                <a:pos x="connsiteX74" y="connsiteY74"/>
-              </a:cxn>
-              <a:cxn ang="0">
-                <a:pos x="connsiteX75" y="connsiteY75"/>
-              </a:cxn>
-              <a:cxn ang="0">
-                <a:pos x="connsiteX76" y="connsiteY76"/>
-              </a:cxn>
-              <a:cxn ang="0">
-                <a:pos x="connsiteX77" y="connsiteY77"/>
-              </a:cxn>
-              <a:cxn ang="0">
-                <a:pos x="connsiteX78" y="connsiteY78"/>
-              </a:cxn>
-              <a:cxn ang="0">
-                <a:pos x="connsiteX79" y="connsiteY79"/>
-              </a:cxn>
-              <a:cxn ang="0">
-                <a:pos x="connsiteX80" y="connsiteY80"/>
-              </a:cxn>
-              <a:cxn ang="0">
-                <a:pos x="connsiteX81" y="connsiteY81"/>
-              </a:cxn>
-              <a:cxn ang="0">
-                <a:pos x="connsiteX82" y="connsiteY82"/>
-              </a:cxn>
-              <a:cxn ang="0">
-                <a:pos x="connsiteX83" y="connsiteY83"/>
-              </a:cxn>
-              <a:cxn ang="0">
-                <a:pos x="connsiteX84" y="connsiteY84"/>
-              </a:cxn>
-              <a:cxn ang="0">
-                <a:pos x="connsiteX85" y="connsiteY85"/>
-              </a:cxn>
-              <a:cxn ang="0">
-                <a:pos x="connsiteX86" y="connsiteY86"/>
-              </a:cxn>
-              <a:cxn ang="0">
-                <a:pos x="connsiteX87" y="connsiteY87"/>
-              </a:cxn>
-              <a:cxn ang="0">
-                <a:pos x="connsiteX88" y="connsiteY88"/>
-              </a:cxn>
-            </a:cxnLst>
-            <a:rect l="l" t="t" r="r" b="b"/>
-            <a:pathLst>
-              <a:path w="3127373" h="6857999">
-                <a:moveTo>
-                  <a:pt x="13983" y="0"/>
-                </a:moveTo>
-                <a:lnTo>
-                  <a:pt x="3127373" y="0"/>
-                </a:lnTo>
-                <a:lnTo>
-                  <a:pt x="3127373" y="6857999"/>
-                </a:lnTo>
-                <a:lnTo>
-                  <a:pt x="1338911" y="6857999"/>
-                </a:lnTo>
-                <a:lnTo>
-                  <a:pt x="1342632" y="6835323"/>
-                </a:lnTo>
-                <a:cubicBezTo>
-                  <a:pt x="1337720" y="6815523"/>
-                  <a:pt x="1312717" y="6802422"/>
-                  <a:pt x="1319861" y="6778602"/>
-                </a:cubicBezTo>
-                <a:cubicBezTo>
-                  <a:pt x="1364628" y="6728845"/>
-                  <a:pt x="1325576" y="6707672"/>
-                  <a:pt x="1321766" y="6674854"/>
-                </a:cubicBezTo>
-                <a:cubicBezTo>
-                  <a:pt x="1317003" y="6642035"/>
-                  <a:pt x="1354151" y="6595454"/>
-                  <a:pt x="1324624" y="6571105"/>
-                </a:cubicBezTo>
-                <a:cubicBezTo>
-                  <a:pt x="1339863" y="6531934"/>
-                  <a:pt x="1320813" y="6503351"/>
-                  <a:pt x="1320813" y="6468414"/>
-                </a:cubicBezTo>
-                <a:cubicBezTo>
-                  <a:pt x="1313194" y="6435596"/>
-                  <a:pt x="1323671" y="6396425"/>
-                  <a:pt x="1303669" y="6366783"/>
-                </a:cubicBezTo>
-                <a:cubicBezTo>
-                  <a:pt x="1311288" y="6335023"/>
-                  <a:pt x="1327481" y="6299029"/>
-                  <a:pt x="1284619" y="6284208"/>
-                </a:cubicBezTo>
-                <a:cubicBezTo>
-                  <a:pt x="1262711" y="6261976"/>
-                  <a:pt x="1255091" y="6235509"/>
-                  <a:pt x="1259853" y="6203749"/>
-                </a:cubicBezTo>
-                <a:cubicBezTo>
-                  <a:pt x="1236041" y="6177283"/>
-                  <a:pt x="1283666" y="6129643"/>
-                  <a:pt x="1261758" y="6108470"/>
-                </a:cubicBezTo>
-                <a:cubicBezTo>
-                  <a:pt x="1275094" y="6074593"/>
-                  <a:pt x="1254138" y="6055537"/>
-                  <a:pt x="1277951" y="6019542"/>
-                </a:cubicBezTo>
-                <a:cubicBezTo>
-                  <a:pt x="1268426" y="5995194"/>
-                  <a:pt x="1296049" y="5958140"/>
-                  <a:pt x="1291286" y="5930615"/>
-                </a:cubicBezTo>
-                <a:cubicBezTo>
-                  <a:pt x="1292238" y="5900972"/>
-                  <a:pt x="1303669" y="5866037"/>
-                  <a:pt x="1283666" y="5838512"/>
-                </a:cubicBezTo>
-                <a:cubicBezTo>
-                  <a:pt x="1251281" y="5806752"/>
-                  <a:pt x="1249376" y="5778168"/>
-                  <a:pt x="1244613" y="5756995"/>
-                </a:cubicBezTo>
-                <a:cubicBezTo>
-                  <a:pt x="1236041" y="5737939"/>
-                  <a:pt x="1236994" y="5721000"/>
-                  <a:pt x="1246519" y="5703004"/>
-                </a:cubicBezTo>
-                <a:cubicBezTo>
-                  <a:pt x="1244613" y="5673361"/>
-                  <a:pt x="1256996" y="5643719"/>
-                  <a:pt x="1245566" y="5579140"/>
-                </a:cubicBezTo>
-                <a:cubicBezTo>
-                  <a:pt x="1254138" y="5553732"/>
-                  <a:pt x="1228421" y="5526207"/>
-                  <a:pt x="1274141" y="5475391"/>
-                </a:cubicBezTo>
-                <a:cubicBezTo>
-                  <a:pt x="1250328" y="5448925"/>
-                  <a:pt x="1269378" y="5406579"/>
-                  <a:pt x="1292238" y="5379054"/>
-                </a:cubicBezTo>
-                <a:cubicBezTo>
-                  <a:pt x="1310336" y="5345176"/>
-                  <a:pt x="1323671" y="5313417"/>
-                  <a:pt x="1299858" y="5294361"/>
-                </a:cubicBezTo>
-                <a:cubicBezTo>
-                  <a:pt x="1300811" y="5280598"/>
-                  <a:pt x="1311288" y="5263659"/>
-                  <a:pt x="1279856" y="5260484"/>
-                </a:cubicBezTo>
-                <a:cubicBezTo>
-                  <a:pt x="1270331" y="5249897"/>
-                  <a:pt x="1236041" y="5248838"/>
-                  <a:pt x="1218896" y="5241428"/>
-                </a:cubicBezTo>
-                <a:cubicBezTo>
-                  <a:pt x="1185558" y="5228724"/>
-                  <a:pt x="1191274" y="5202257"/>
-                  <a:pt x="1178891" y="5182143"/>
-                </a:cubicBezTo>
-                <a:cubicBezTo>
-                  <a:pt x="1152221" y="5167321"/>
-                  <a:pt x="1161746" y="5139796"/>
-                  <a:pt x="1171271" y="5112271"/>
-                </a:cubicBezTo>
-                <a:cubicBezTo>
-                  <a:pt x="1168413" y="5064631"/>
-                  <a:pt x="1159841" y="5020167"/>
-                  <a:pt x="1167461" y="4973586"/>
-                </a:cubicBezTo>
-                <a:cubicBezTo>
-                  <a:pt x="1143649" y="4959824"/>
-                  <a:pt x="1138886" y="4919595"/>
-                  <a:pt x="1094119" y="4887835"/>
-                </a:cubicBezTo>
-                <a:cubicBezTo>
-                  <a:pt x="1079831" y="4866662"/>
-                  <a:pt x="1076974" y="4838078"/>
-                  <a:pt x="1087451" y="4813729"/>
-                </a:cubicBezTo>
-                <a:cubicBezTo>
-                  <a:pt x="1097928" y="4790438"/>
-                  <a:pt x="1101738" y="4778793"/>
-                  <a:pt x="1118883" y="4783027"/>
-                </a:cubicBezTo>
-                <a:cubicBezTo>
-                  <a:pt x="1105549" y="4745975"/>
-                  <a:pt x="1100786" y="4706804"/>
-                  <a:pt x="1094119" y="4668692"/>
-                </a:cubicBezTo>
-                <a:cubicBezTo>
-                  <a:pt x="1087451" y="4650695"/>
-                  <a:pt x="1061733" y="4639049"/>
-                  <a:pt x="1049351" y="4623170"/>
-                </a:cubicBezTo>
-                <a:cubicBezTo>
-                  <a:pt x="1051256" y="4601997"/>
-                  <a:pt x="1037921" y="4586116"/>
-                  <a:pt x="1062686" y="4557533"/>
-                </a:cubicBezTo>
-                <a:cubicBezTo>
-                  <a:pt x="1061733" y="4517304"/>
-                  <a:pt x="1075069" y="4472840"/>
-                  <a:pt x="1026491" y="4449550"/>
-                </a:cubicBezTo>
-                <a:cubicBezTo>
-                  <a:pt x="998869" y="4418848"/>
-                  <a:pt x="997916" y="4379678"/>
-                  <a:pt x="986486" y="4343684"/>
-                </a:cubicBezTo>
-                <a:cubicBezTo>
-                  <a:pt x="994106" y="4321451"/>
-                  <a:pt x="999821" y="4300278"/>
-                  <a:pt x="996963" y="4281222"/>
-                </a:cubicBezTo>
-                <a:cubicBezTo>
-                  <a:pt x="988391" y="4264284"/>
-                  <a:pt x="972199" y="4249463"/>
-                  <a:pt x="944576" y="4239935"/>
-                </a:cubicBezTo>
-                <a:cubicBezTo>
-                  <a:pt x="908381" y="4232524"/>
-                  <a:pt x="912191" y="4212410"/>
-                  <a:pt x="925526" y="4188060"/>
-                </a:cubicBezTo>
-                <a:cubicBezTo>
-                  <a:pt x="932194" y="4166887"/>
-                  <a:pt x="939813" y="4144656"/>
-                  <a:pt x="900761" y="4138304"/>
-                </a:cubicBezTo>
-                <a:cubicBezTo>
-                  <a:pt x="918858" y="4097015"/>
-                  <a:pt x="885521" y="4072667"/>
-                  <a:pt x="861708" y="4048317"/>
-                </a:cubicBezTo>
-                <a:cubicBezTo>
-                  <a:pt x="840753" y="4020792"/>
-                  <a:pt x="835038" y="3989032"/>
-                  <a:pt x="816941" y="3962566"/>
-                </a:cubicBezTo>
-                <a:cubicBezTo>
-                  <a:pt x="811226" y="3939275"/>
-                  <a:pt x="786461" y="3923395"/>
-                  <a:pt x="776936" y="3902222"/>
-                </a:cubicBezTo>
-                <a:cubicBezTo>
-                  <a:pt x="773126" y="3878931"/>
-                  <a:pt x="740741" y="3864110"/>
-                  <a:pt x="739788" y="3837644"/>
-                </a:cubicBezTo>
-                <a:cubicBezTo>
-                  <a:pt x="724549" y="3811177"/>
-                  <a:pt x="712166" y="3781535"/>
-                  <a:pt x="707403" y="3748717"/>
-                </a:cubicBezTo>
-                <a:cubicBezTo>
-                  <a:pt x="683591" y="3722250"/>
-                  <a:pt x="695974" y="3683080"/>
-                  <a:pt x="684544" y="3651320"/>
-                </a:cubicBezTo>
-                <a:cubicBezTo>
-                  <a:pt x="680733" y="3617443"/>
-                  <a:pt x="670256" y="3585683"/>
-                  <a:pt x="666446" y="3551806"/>
-                </a:cubicBezTo>
-                <a:cubicBezTo>
-                  <a:pt x="683591" y="3511577"/>
-                  <a:pt x="674066" y="3480875"/>
-                  <a:pt x="669303" y="3449115"/>
-                </a:cubicBezTo>
-                <a:cubicBezTo>
-                  <a:pt x="712166" y="3402534"/>
-                  <a:pt x="675971" y="3381361"/>
-                  <a:pt x="658826" y="3353836"/>
-                </a:cubicBezTo>
-                <a:cubicBezTo>
-                  <a:pt x="653111" y="3327370"/>
-                  <a:pt x="642633" y="3309372"/>
-                  <a:pt x="612153" y="3303020"/>
-                </a:cubicBezTo>
-                <a:cubicBezTo>
-                  <a:pt x="596913" y="3290316"/>
-                  <a:pt x="560719" y="3290316"/>
-                  <a:pt x="570244" y="3273378"/>
-                </a:cubicBezTo>
-                <a:cubicBezTo>
-                  <a:pt x="552146" y="3267026"/>
-                  <a:pt x="538811" y="3258556"/>
-                  <a:pt x="523571" y="3245852"/>
-                </a:cubicBezTo>
-                <a:cubicBezTo>
-                  <a:pt x="514999" y="3231031"/>
-                  <a:pt x="510236" y="3211975"/>
-                  <a:pt x="494996" y="3187627"/>
-                </a:cubicBezTo>
-                <a:cubicBezTo>
-                  <a:pt x="475946" y="3141046"/>
-                  <a:pt x="484519" y="3098699"/>
-                  <a:pt x="494044" y="3043649"/>
-                </a:cubicBezTo>
-                <a:cubicBezTo>
-                  <a:pt x="482613" y="3016124"/>
-                  <a:pt x="471183" y="3001302"/>
-                  <a:pt x="456896" y="2990716"/>
-                </a:cubicBezTo>
-                <a:cubicBezTo>
-                  <a:pt x="442608" y="2980129"/>
-                  <a:pt x="426416" y="2972718"/>
-                  <a:pt x="405461" y="2961073"/>
-                </a:cubicBezTo>
-                <a:cubicBezTo>
-                  <a:pt x="381649" y="2937783"/>
-                  <a:pt x="390221" y="2898612"/>
-                  <a:pt x="360694" y="2872146"/>
-                </a:cubicBezTo>
-                <a:cubicBezTo>
-                  <a:pt x="356883" y="2836151"/>
-                  <a:pt x="353074" y="2799098"/>
-                  <a:pt x="366408" y="2755693"/>
-                </a:cubicBezTo>
-                <a:cubicBezTo>
-                  <a:pt x="390221" y="2709112"/>
-                  <a:pt x="385458" y="2672059"/>
-                  <a:pt x="391174" y="2633947"/>
-                </a:cubicBezTo>
-                <a:cubicBezTo>
-                  <a:pt x="401651" y="2593718"/>
-                  <a:pt x="396888" y="2559841"/>
-                  <a:pt x="403556" y="2527023"/>
-                </a:cubicBezTo>
-                <a:cubicBezTo>
-                  <a:pt x="364503" y="2485734"/>
-                  <a:pt x="364503" y="2441271"/>
-                  <a:pt x="367361" y="2394690"/>
-                </a:cubicBezTo>
-                <a:cubicBezTo>
-                  <a:pt x="351169" y="2355520"/>
-                  <a:pt x="306401" y="2324818"/>
-                  <a:pt x="329261" y="2257064"/>
-                </a:cubicBezTo>
-                <a:cubicBezTo>
-                  <a:pt x="320688" y="2209425"/>
-                  <a:pt x="363551" y="2133201"/>
-                  <a:pt x="347358" y="2073916"/>
-                </a:cubicBezTo>
-                <a:cubicBezTo>
-                  <a:pt x="376886" y="2031570"/>
-                  <a:pt x="349263" y="2008279"/>
-                  <a:pt x="362599" y="1971226"/>
-                </a:cubicBezTo>
-                <a:cubicBezTo>
-                  <a:pt x="383553" y="1932056"/>
-                  <a:pt x="362599" y="1907706"/>
-                  <a:pt x="369266" y="1874888"/>
-                </a:cubicBezTo>
-                <a:cubicBezTo>
-                  <a:pt x="354026" y="1832542"/>
-                  <a:pt x="328308" y="1794430"/>
-                  <a:pt x="367361" y="1734086"/>
-                </a:cubicBezTo>
-                <a:cubicBezTo>
-                  <a:pt x="334976" y="1698091"/>
-                  <a:pt x="373076" y="1637748"/>
-                  <a:pt x="365456" y="1593284"/>
-                </a:cubicBezTo>
-                <a:cubicBezTo>
-                  <a:pt x="454991" y="1514943"/>
-                  <a:pt x="351169" y="1504357"/>
-                  <a:pt x="363551" y="1452482"/>
-                </a:cubicBezTo>
-                <a:cubicBezTo>
-                  <a:pt x="365456" y="1404843"/>
-                  <a:pt x="354978" y="1361437"/>
-                  <a:pt x="361646" y="1311681"/>
-                </a:cubicBezTo>
-                <a:cubicBezTo>
-                  <a:pt x="367361" y="1262982"/>
-                  <a:pt x="396888" y="1205815"/>
-                  <a:pt x="359741" y="1170878"/>
-                </a:cubicBezTo>
-                <a:cubicBezTo>
-                  <a:pt x="332119" y="1132767"/>
-                  <a:pt x="364503" y="1074541"/>
-                  <a:pt x="357836" y="1030077"/>
-                </a:cubicBezTo>
-                <a:cubicBezTo>
-                  <a:pt x="373076" y="985613"/>
-                  <a:pt x="368313" y="942208"/>
-                  <a:pt x="346406" y="908331"/>
-                </a:cubicBezTo>
-                <a:cubicBezTo>
-                  <a:pt x="364503" y="860691"/>
-                  <a:pt x="333071" y="833166"/>
-                  <a:pt x="304496" y="818345"/>
-                </a:cubicBezTo>
-                <a:cubicBezTo>
-                  <a:pt x="347358" y="793995"/>
-                  <a:pt x="309258" y="797172"/>
-                  <a:pt x="365456" y="766470"/>
-                </a:cubicBezTo>
-                <a:cubicBezTo>
-                  <a:pt x="377838" y="750591"/>
-                  <a:pt x="413081" y="726241"/>
-                  <a:pt x="391174" y="720948"/>
-                </a:cubicBezTo>
-                <a:cubicBezTo>
-                  <a:pt x="343549" y="710362"/>
-                  <a:pt x="432131" y="652135"/>
-                  <a:pt x="382601" y="639431"/>
-                </a:cubicBezTo>
-                <a:cubicBezTo>
-                  <a:pt x="353074" y="620375"/>
-                  <a:pt x="298781" y="608730"/>
-                  <a:pt x="314974" y="574853"/>
-                </a:cubicBezTo>
-                <a:cubicBezTo>
-                  <a:pt x="275921" y="560032"/>
-                  <a:pt x="229249" y="549445"/>
-                  <a:pt x="222581" y="528272"/>
-                </a:cubicBezTo>
-                <a:cubicBezTo>
-                  <a:pt x="165431" y="525096"/>
-                  <a:pt x="114949" y="522978"/>
-                  <a:pt x="141619" y="500747"/>
-                </a:cubicBezTo>
-                <a:cubicBezTo>
-                  <a:pt x="133046" y="490160"/>
-                  <a:pt x="70181" y="504982"/>
-                  <a:pt x="106376" y="493336"/>
-                </a:cubicBezTo>
-                <a:cubicBezTo>
-                  <a:pt x="120663" y="444637"/>
-                  <a:pt x="110186" y="421347"/>
-                  <a:pt x="135903" y="385352"/>
-                </a:cubicBezTo>
-                <a:cubicBezTo>
-                  <a:pt x="165431" y="347241"/>
-                  <a:pt x="194006" y="310188"/>
-                  <a:pt x="151144" y="278428"/>
-                </a:cubicBezTo>
-                <a:cubicBezTo>
-                  <a:pt x="192101" y="240316"/>
-                  <a:pt x="124474" y="242434"/>
-                  <a:pt x="122569" y="222319"/>
-                </a:cubicBezTo>
-                <a:cubicBezTo>
-                  <a:pt x="116853" y="183149"/>
-                  <a:pt x="48274" y="165151"/>
-                  <a:pt x="63513" y="116453"/>
-                </a:cubicBezTo>
-                <a:cubicBezTo>
-                  <a:pt x="46369" y="100573"/>
-                  <a:pt x="23747" y="86546"/>
-                  <a:pt x="10412" y="69078"/>
-                </a:cubicBezTo>
-                <a:lnTo>
-                  <a:pt x="0" y="41687"/>
-                </a:lnTo>
-                <a:lnTo>
-                  <a:pt x="0" y="35112"/>
-                </a:lnTo>
-                <a:lnTo>
-                  <a:pt x="2308" y="21736"/>
-                </a:lnTo>
-                <a:cubicBezTo>
-                  <a:pt x="4533" y="15334"/>
-                  <a:pt x="8030" y="8470"/>
-                  <a:pt x="13031" y="1059"/>
-                </a:cubicBezTo>
-                <a:cubicBezTo>
-                  <a:pt x="13031" y="1059"/>
-                  <a:pt x="13983" y="0"/>
-                  <a:pt x="13983" y="0"/>
-                </a:cubicBezTo>
-                <a:close/>
-              </a:path>
-            </a:pathLst>
-          </a:custGeom>
-        </p:spPr>
-        <p:txBody>
-          <a:bodyPr wrap="square">
-            <a:noAutofit/>
-          </a:bodyPr>
-          <a:lstStyle>
-            <a:lvl1pPr marL="0" indent="0">
-              <a:buNone/>
-              <a:defRPr lang="en-US" sz="2800" kern="1200">
-                <a:solidFill>
-                  <a:schemeClr val="bg2"/>
-                </a:solidFill>
-                <a:latin typeface="+mn-lt"/>
-                <a:ea typeface="+mn-ea"/>
-                <a:cs typeface="+mn-cs"/>
-              </a:defRPr>
-            </a:lvl1pPr>
-          </a:lstStyle>
-          <a:p>
-            <a:r>
-              <a:rPr lang="en-US"/>
-              <a:t>Click icon to add picture</a:t>
-            </a:r>
-            <a:endParaRPr lang="en-US" dirty="0"/>
-          </a:p>
-        </p:txBody>
-      </p:sp>
-      <p:sp>
-        <p:nvSpPr>
-          <p:cNvPr id="54" name="Footer Placeholder 4">
-            <a:extLst>
-              <a:ext uri="{FF2B5EF4-FFF2-40B4-BE49-F238E27FC236}">
-                <a16:creationId xmlns:a16="http://schemas.microsoft.com/office/drawing/2014/main" id="{3F4AEB9B-8BF5-D254-9598-67F8D1501903}"/>
-              </a:ext>
-            </a:extLst>
-          </p:cNvPr>
-          <p:cNvSpPr>
-            <a:spLocks noGrp="1"/>
-          </p:cNvSpPr>
-          <p:nvPr>
-            <p:ph type="ftr" sz="quarter" idx="11"/>
-          </p:nvPr>
-        </p:nvSpPr>
-        <p:spPr>
-          <a:xfrm>
-            <a:off x="838201" y="6169936"/>
-            <a:ext cx="2955858" cy="365125"/>
-          </a:xfrm>
-        </p:spPr>
-        <p:txBody>
-          <a:bodyPr lIns="0"/>
-          <a:lstStyle>
-            <a:lvl1pPr>
-              <a:defRPr sz="1100" cap="all" spc="300" baseline="0"/>
-            </a:lvl1pPr>
-          </a:lstStyle>
-          <a:p>
-            <a:endParaRPr lang="en-US" dirty="0"/>
-          </a:p>
-        </p:txBody>
-      </p:sp>
-      <p:sp>
-        <p:nvSpPr>
-          <p:cNvPr id="55" name="Slide Number Placeholder 5">
-            <a:extLst>
-              <a:ext uri="{FF2B5EF4-FFF2-40B4-BE49-F238E27FC236}">
-                <a16:creationId xmlns:a16="http://schemas.microsoft.com/office/drawing/2014/main" id="{1DA07454-F7CC-3E10-B671-B3C639FB12A2}"/>
-              </a:ext>
-            </a:extLst>
-          </p:cNvPr>
-          <p:cNvSpPr>
-            <a:spLocks noGrp="1"/>
-          </p:cNvSpPr>
-          <p:nvPr>
-            <p:ph type="sldNum" sz="quarter" idx="12"/>
-          </p:nvPr>
-        </p:nvSpPr>
-        <p:spPr>
-          <a:xfrm>
-            <a:off x="3981049" y="6169936"/>
-            <a:ext cx="549442" cy="365125"/>
-          </a:xfrm>
-        </p:spPr>
-        <p:txBody>
-          <a:bodyPr/>
-          <a:lstStyle>
-            <a:lvl1pPr>
-              <a:defRPr sz="1100"/>
-            </a:lvl1pPr>
-          </a:lstStyle>
-          <a:p>
-            <a:fld id="{CBD12358-51D2-46B3-9BDE-DF29528B9454}" type="slidenum">
-              <a:rPr lang="en-US" smtClean="0"/>
-              <a:pPr/>
-              <a:t>‹#›</a:t>
-            </a:fld>
-            <a:endParaRPr lang="en-US" dirty="0"/>
-          </a:p>
-        </p:txBody>
-      </p:sp>
-      <p:sp>
-        <p:nvSpPr>
-          <p:cNvPr id="53" name="Date Placeholder 3">
-            <a:extLst>
-              <a:ext uri="{FF2B5EF4-FFF2-40B4-BE49-F238E27FC236}">
-                <a16:creationId xmlns:a16="http://schemas.microsoft.com/office/drawing/2014/main" id="{8569CA70-92DD-328B-8260-0E79E369AEAF}"/>
-              </a:ext>
-            </a:extLst>
-          </p:cNvPr>
-          <p:cNvSpPr>
-            <a:spLocks noGrp="1"/>
-          </p:cNvSpPr>
-          <p:nvPr>
-            <p:ph type="dt" sz="half" idx="10"/>
-          </p:nvPr>
-        </p:nvSpPr>
-        <p:spPr>
-          <a:xfrm>
-            <a:off x="4717482" y="6174618"/>
-            <a:ext cx="2955858" cy="360444"/>
-          </a:xfrm>
-        </p:spPr>
-        <p:txBody>
-          <a:bodyPr rIns="0"/>
-          <a:lstStyle>
-            <a:lvl1pPr>
-              <a:defRPr sz="1100"/>
-            </a:lvl1pPr>
-          </a:lstStyle>
-          <a:p>
-            <a:r>
-              <a:rPr lang="en-US" dirty="0"/>
-              <a:t>8/6/20XX</a:t>
-            </a:r>
-          </a:p>
-        </p:txBody>
-      </p:sp>
-    </p:spTree>
-    <p:extLst>
-      <p:ext uri="{BB962C8B-B14F-4D97-AF65-F5344CB8AC3E}">
-        <p14:creationId xmlns:p14="http://schemas.microsoft.com/office/powerpoint/2010/main" val="2249148656"/>
-      </p:ext>
-    </p:extLst>
-  </p:cSld>
-  <p:clrMapOvr>
-    <a:masterClrMapping/>
-  </p:clrMapOvr>
-</p:sldLayout>
-</file>
-
 <file path=ppt/slideLayouts/slideLayout2.xml><?xml version="1.0" encoding="utf-8"?>
 <p:sldLayout xmlns:a="http://schemas.openxmlformats.org/drawingml/2006/main" xmlns:r="http://schemas.openxmlformats.org/officeDocument/2006/relationships" xmlns:p="http://schemas.openxmlformats.org/presentationml/2006/main" type="obj" preserve="1">
   <p:cSld name="Title and Content">
@@ -12152,7 +10128,6 @@
     <p:sldLayoutId id="2147483760" r:id="rId16"/>
     <p:sldLayoutId id="2147483761" r:id="rId17"/>
     <p:sldLayoutId id="2147483762" r:id="rId18"/>
-    <p:sldLayoutId id="2147483767" r:id="rId19"/>
   </p:sldLayoutIdLst>
   <p:hf hdr="0" ftr="0" dt="0"/>
   <p:txStyles>
@@ -13090,6 +11065,121 @@
 </p:sld>
 </file>
 
+<file path=ppt/slides/slide10.xml><?xml version="1.0" encoding="utf-8"?>
+<p:sld xmlns:a="http://schemas.openxmlformats.org/drawingml/2006/main" xmlns:r="http://schemas.openxmlformats.org/officeDocument/2006/relationships" xmlns:p="http://schemas.openxmlformats.org/presentationml/2006/main">
+  <p:cSld>
+    <p:bg>
+      <p:bgPr>
+        <a:solidFill>
+          <a:schemeClr val="accent1">
+            <a:lumMod val="50000"/>
+          </a:schemeClr>
+        </a:solidFill>
+        <a:effectLst/>
+      </p:bgPr>
+    </p:bg>
+    <p:spTree>
+      <p:nvGrpSpPr>
+        <p:cNvPr id="1" name="">
+          <a:extLst>
+            <a:ext uri="{FF2B5EF4-FFF2-40B4-BE49-F238E27FC236}">
+              <a16:creationId xmlns:a16="http://schemas.microsoft.com/office/drawing/2014/main" id="{FD85EE2D-4219-6573-2CBB-0CCA440396C1}"/>
+            </a:ext>
+          </a:extLst>
+        </p:cNvPr>
+        <p:cNvGrpSpPr/>
+        <p:nvPr/>
+      </p:nvGrpSpPr>
+      <p:grpSpPr>
+        <a:xfrm>
+          <a:off x="0" y="0"/>
+          <a:ext cx="0" cy="0"/>
+          <a:chOff x="0" y="0"/>
+          <a:chExt cx="0" cy="0"/>
+        </a:xfrm>
+      </p:grpSpPr>
+      <p:sp>
+        <p:nvSpPr>
+          <p:cNvPr id="2" name="Title 1">
+            <a:extLst>
+              <a:ext uri="{FF2B5EF4-FFF2-40B4-BE49-F238E27FC236}">
+                <a16:creationId xmlns:a16="http://schemas.microsoft.com/office/drawing/2014/main" id="{72F93E64-708C-E0A9-9226-F267993540F5}"/>
+              </a:ext>
+            </a:extLst>
+          </p:cNvPr>
+          <p:cNvSpPr>
+            <a:spLocks noGrp="1"/>
+          </p:cNvSpPr>
+          <p:nvPr>
+            <p:ph type="title"/>
+          </p:nvPr>
+        </p:nvSpPr>
+        <p:spPr>
+          <a:xfrm>
+            <a:off x="0" y="0"/>
+            <a:ext cx="12192000" cy="655846"/>
+          </a:xfrm>
+          <a:noFill/>
+        </p:spPr>
+        <p:txBody>
+          <a:bodyPr anchor="t">
+            <a:noAutofit/>
+          </a:bodyPr>
+          <a:lstStyle/>
+          <a:p>
+            <a:pPr algn="ctr"/>
+            <a:r>
+              <a:rPr lang="en-US" dirty="0">
+                <a:latin typeface="Amasis MT Pro Black" panose="02040A04050005020304" pitchFamily="18" charset="0"/>
+              </a:rPr>
+              <a:t>Temporal Patterns</a:t>
+            </a:r>
+          </a:p>
+        </p:txBody>
+      </p:sp>
+      <p:pic>
+        <p:nvPicPr>
+          <p:cNvPr id="4" name="Picture 3">
+            <a:extLst>
+              <a:ext uri="{FF2B5EF4-FFF2-40B4-BE49-F238E27FC236}">
+                <a16:creationId xmlns:a16="http://schemas.microsoft.com/office/drawing/2014/main" id="{19D3FB7F-D793-EA9E-B295-A5CCCCBB60DB}"/>
+              </a:ext>
+            </a:extLst>
+          </p:cNvPr>
+          <p:cNvPicPr>
+            <a:picLocks noChangeAspect="1"/>
+          </p:cNvPicPr>
+          <p:nvPr/>
+        </p:nvPicPr>
+        <p:blipFill>
+          <a:blip r:embed="rId2"/>
+          <a:stretch>
+            <a:fillRect/>
+          </a:stretch>
+        </p:blipFill>
+        <p:spPr>
+          <a:xfrm>
+            <a:off x="216503" y="1061019"/>
+            <a:ext cx="11758994" cy="4735962"/>
+          </a:xfrm>
+          <a:prstGeom prst="rect">
+            <a:avLst/>
+          </a:prstGeom>
+        </p:spPr>
+      </p:pic>
+    </p:spTree>
+    <p:extLst>
+      <p:ext uri="{BB962C8B-B14F-4D97-AF65-F5344CB8AC3E}">
+        <p14:creationId xmlns:p14="http://schemas.microsoft.com/office/powerpoint/2010/main" val="1762262309"/>
+      </p:ext>
+    </p:extLst>
+  </p:cSld>
+  <p:clrMapOvr>
+    <a:masterClrMapping/>
+  </p:clrMapOvr>
+</p:sld>
+</file>
+
 <file path=ppt/slides/slide2.xml><?xml version="1.0" encoding="utf-8"?>
 <p:sld xmlns:a="http://schemas.openxmlformats.org/drawingml/2006/main" xmlns:r="http://schemas.openxmlformats.org/officeDocument/2006/relationships" xmlns:p="http://schemas.openxmlformats.org/presentationml/2006/main">
   <p:cSld>
@@ -14234,7 +12324,7 @@
         <p:cNvPr id="1" name="">
           <a:extLst>
             <a:ext uri="{FF2B5EF4-FFF2-40B4-BE49-F238E27FC236}">
-              <a16:creationId xmlns:a16="http://schemas.microsoft.com/office/drawing/2014/main" id="{450B3EBA-0E85-5419-7990-FDB719037684}"/>
+              <a16:creationId xmlns:a16="http://schemas.microsoft.com/office/drawing/2014/main" id="{56A289F4-2049-9E58-F75C-DB2592C57458}"/>
             </a:ext>
           </a:extLst>
         </p:cNvPr>
@@ -14254,7 +12344,7 @@
           <p:cNvPr id="2" name="Title 1">
             <a:extLst>
               <a:ext uri="{FF2B5EF4-FFF2-40B4-BE49-F238E27FC236}">
-                <a16:creationId xmlns:a16="http://schemas.microsoft.com/office/drawing/2014/main" id="{B7C22F86-580C-03F2-4249-3980CD92E849}"/>
+                <a16:creationId xmlns:a16="http://schemas.microsoft.com/office/drawing/2014/main" id="{B289F383-F8A0-BD5E-CFBD-19C9FD076150}"/>
               </a:ext>
             </a:extLst>
           </p:cNvPr>
@@ -14293,7 +12383,7 @@
           <p:cNvPr id="7" name="TextBox 6">
             <a:extLst>
               <a:ext uri="{FF2B5EF4-FFF2-40B4-BE49-F238E27FC236}">
-                <a16:creationId xmlns:a16="http://schemas.microsoft.com/office/drawing/2014/main" id="{D0428219-1C01-0A51-C185-45B6B9276EC6}"/>
+                <a16:creationId xmlns:a16="http://schemas.microsoft.com/office/drawing/2014/main" id="{A278FC9E-6986-0774-7115-912AE164FC97}"/>
               </a:ext>
             </a:extLst>
           </p:cNvPr>
@@ -14364,7 +12454,7 @@
           <p:cNvPr id="4" name="Picture 3">
             <a:extLst>
               <a:ext uri="{FF2B5EF4-FFF2-40B4-BE49-F238E27FC236}">
-                <a16:creationId xmlns:a16="http://schemas.microsoft.com/office/drawing/2014/main" id="{F9059107-CA04-B50B-D391-D775CCF5A6D2}"/>
+                <a16:creationId xmlns:a16="http://schemas.microsoft.com/office/drawing/2014/main" id="{17F6DD02-094A-F66E-2EA6-2ACA89808EFC}"/>
               </a:ext>
             </a:extLst>
           </p:cNvPr>
@@ -14394,7 +12484,7 @@
           <p:cNvPr id="8" name="Picture 7">
             <a:extLst>
               <a:ext uri="{FF2B5EF4-FFF2-40B4-BE49-F238E27FC236}">
-                <a16:creationId xmlns:a16="http://schemas.microsoft.com/office/drawing/2014/main" id="{67FC4A8B-9EA4-F6C4-F155-04757C38EA19}"/>
+                <a16:creationId xmlns:a16="http://schemas.microsoft.com/office/drawing/2014/main" id="{2C066848-45B0-8271-F08E-56C83E9665A1}"/>
               </a:ext>
             </a:extLst>
           </p:cNvPr>
@@ -14424,7 +12514,7 @@
           <p:cNvPr id="10" name="TextBox 9">
             <a:extLst>
               <a:ext uri="{FF2B5EF4-FFF2-40B4-BE49-F238E27FC236}">
-                <a16:creationId xmlns:a16="http://schemas.microsoft.com/office/drawing/2014/main" id="{6C248970-A7D1-58EC-45D1-5432FFE8E056}"/>
+                <a16:creationId xmlns:a16="http://schemas.microsoft.com/office/drawing/2014/main" id="{9C0A8D20-311B-FDBB-0026-B8DB098AFFCC}"/>
               </a:ext>
             </a:extLst>
           </p:cNvPr>
@@ -14502,7 +12592,7 @@
     </p:spTree>
     <p:extLst>
       <p:ext uri="{BB962C8B-B14F-4D97-AF65-F5344CB8AC3E}">
-        <p14:creationId xmlns:p14="http://schemas.microsoft.com/office/powerpoint/2010/main" val="183639272"/>
+        <p14:creationId xmlns:p14="http://schemas.microsoft.com/office/powerpoint/2010/main" val="404361455"/>
       </p:ext>
     </p:extLst>
   </p:cSld>
@@ -14891,184 +12981,17 @@
               <a:rPr lang="en-US" dirty="0">
                 <a:latin typeface="Amasis MT Pro Black" panose="02040A04050005020304" pitchFamily="18" charset="0"/>
               </a:rPr>
-              <a:t>Fatal CRASH Demographics</a:t>
+              <a:t>Temporal Patterns</a:t>
             </a:r>
           </a:p>
         </p:txBody>
       </p:sp>
-      <p:sp>
-        <p:nvSpPr>
-          <p:cNvPr id="7" name="TextBox 6">
+      <p:pic>
+        <p:nvPicPr>
+          <p:cNvPr id="4" name="Picture 3">
             <a:extLst>
               <a:ext uri="{FF2B5EF4-FFF2-40B4-BE49-F238E27FC236}">
-                <a16:creationId xmlns:a16="http://schemas.microsoft.com/office/drawing/2014/main" id="{40333DA9-B57D-1E6A-04EA-C47CF42D76D2}"/>
-              </a:ext>
-            </a:extLst>
-          </p:cNvPr>
-          <p:cNvSpPr txBox="1"/>
-          <p:nvPr/>
-        </p:nvSpPr>
-        <p:spPr>
-          <a:xfrm>
-            <a:off x="136635" y="4807169"/>
-            <a:ext cx="6251552" cy="1477328"/>
-          </a:xfrm>
-          <a:prstGeom prst="rect">
-            <a:avLst/>
-          </a:prstGeom>
-          <a:noFill/>
-        </p:spPr>
-        <p:txBody>
-          <a:bodyPr wrap="square">
-            <a:spAutoFit/>
-          </a:bodyPr>
-          <a:lstStyle/>
-          <a:p>
-            <a:pPr marL="285750" indent="-285750">
-              <a:buFont typeface="Arial" panose="020B0604020202020204" pitchFamily="34" charset="0"/>
-              <a:buChar char="•"/>
-            </a:pPr>
-            <a:r>
-              <a:rPr lang="en-US" dirty="0">
-                <a:latin typeface="Amasis MT Pro" panose="02040504050005020304" pitchFamily="18" charset="0"/>
-              </a:rPr>
-              <a:t>Almost half of all fatal crashes (46%) occur on high-speed roads (100+).</a:t>
-            </a:r>
-          </a:p>
-          <a:p>
-            <a:pPr marL="285750" indent="-285750">
-              <a:buFont typeface="Arial" panose="020B0604020202020204" pitchFamily="34" charset="0"/>
-              <a:buChar char="•"/>
-            </a:pPr>
-            <a:endParaRPr lang="en-US" dirty="0">
-              <a:latin typeface="Amasis MT Pro" panose="02040504050005020304" pitchFamily="18" charset="0"/>
-            </a:endParaRPr>
-          </a:p>
-          <a:p>
-            <a:pPr marL="285750" indent="-285750">
-              <a:buFont typeface="Arial" panose="020B0604020202020204" pitchFamily="34" charset="0"/>
-              <a:buChar char="•"/>
-            </a:pPr>
-            <a:r>
-              <a:rPr lang="en-US" dirty="0">
-                <a:latin typeface="Amasis MT Pro" panose="02040504050005020304" pitchFamily="18" charset="0"/>
-              </a:rPr>
-              <a:t>Urban/commuter zones (≤60 km/h) still account for a large share (~32%), likely due to traffic density.</a:t>
-            </a:r>
-          </a:p>
-        </p:txBody>
-      </p:sp>
-      <p:sp>
-        <p:nvSpPr>
-          <p:cNvPr id="10" name="TextBox 9">
-            <a:extLst>
-              <a:ext uri="{FF2B5EF4-FFF2-40B4-BE49-F238E27FC236}">
-                <a16:creationId xmlns:a16="http://schemas.microsoft.com/office/drawing/2014/main" id="{E0290294-C9E6-C131-4876-596B4DCE4CD4}"/>
-              </a:ext>
-            </a:extLst>
-          </p:cNvPr>
-          <p:cNvSpPr txBox="1"/>
-          <p:nvPr/>
-        </p:nvSpPr>
-        <p:spPr>
-          <a:xfrm>
-            <a:off x="6560560" y="4754813"/>
-            <a:ext cx="5631440" cy="1477328"/>
-          </a:xfrm>
-          <a:prstGeom prst="rect">
-            <a:avLst/>
-          </a:prstGeom>
-          <a:noFill/>
-        </p:spPr>
-        <p:txBody>
-          <a:bodyPr wrap="square">
-            <a:spAutoFit/>
-          </a:bodyPr>
-          <a:lstStyle/>
-          <a:p>
-            <a:pPr marL="285750" indent="-285750">
-              <a:buFont typeface="Arial" panose="020B0604020202020204" pitchFamily="34" charset="0"/>
-              <a:buChar char="•"/>
-            </a:pPr>
-            <a:r>
-              <a:rPr lang="en-US" dirty="0">
-                <a:latin typeface="Amasis MT Pro" panose="02040504050005020304" pitchFamily="18" charset="0"/>
-              </a:rPr>
-              <a:t>Single-vehicle crashes dominate (55%) → especially in high-speed or rural contexts.</a:t>
-            </a:r>
-          </a:p>
-          <a:p>
-            <a:pPr marL="285750" indent="-285750">
-              <a:buFont typeface="Arial" panose="020B0604020202020204" pitchFamily="34" charset="0"/>
-              <a:buChar char="•"/>
-            </a:pPr>
-            <a:endParaRPr lang="en-US" dirty="0">
-              <a:latin typeface="Amasis MT Pro" panose="02040504050005020304" pitchFamily="18" charset="0"/>
-            </a:endParaRPr>
-          </a:p>
-          <a:p>
-            <a:pPr marL="285750" indent="-285750">
-              <a:buFont typeface="Arial" panose="020B0604020202020204" pitchFamily="34" charset="0"/>
-              <a:buChar char="•"/>
-            </a:pPr>
-            <a:r>
-              <a:rPr lang="en-US" dirty="0">
-                <a:latin typeface="Amasis MT Pro" panose="02040504050005020304" pitchFamily="18" charset="0"/>
-              </a:rPr>
-              <a:t>Multi-vehicle crashes (45%) are still significant, concentrated in commuting/urban settings</a:t>
-            </a:r>
-          </a:p>
-        </p:txBody>
-      </p:sp>
-      <p:cxnSp>
-        <p:nvCxnSpPr>
-          <p:cNvPr id="5" name="Straight Connector 4">
-            <a:extLst>
-              <a:ext uri="{FF2B5EF4-FFF2-40B4-BE49-F238E27FC236}">
-                <a16:creationId xmlns:a16="http://schemas.microsoft.com/office/drawing/2014/main" id="{CFEF9983-6CAC-8DE8-2BB4-6D92445BEA04}"/>
-              </a:ext>
-            </a:extLst>
-          </p:cNvPr>
-          <p:cNvCxnSpPr>
-            <a:cxnSpLocks/>
-          </p:cNvCxnSpPr>
-          <p:nvPr/>
-        </p:nvCxnSpPr>
-        <p:spPr>
-          <a:xfrm>
-            <a:off x="6474373" y="703609"/>
-            <a:ext cx="0" cy="5671966"/>
-          </a:xfrm>
-          <a:prstGeom prst="line">
-            <a:avLst/>
-          </a:prstGeom>
-          <a:ln>
-            <a:solidFill>
-              <a:schemeClr val="tx1"/>
-            </a:solidFill>
-          </a:ln>
-        </p:spPr>
-        <p:style>
-          <a:lnRef idx="2">
-            <a:schemeClr val="accent6"/>
-          </a:lnRef>
-          <a:fillRef idx="0">
-            <a:schemeClr val="accent6"/>
-          </a:fillRef>
-          <a:effectRef idx="1">
-            <a:schemeClr val="accent6"/>
-          </a:effectRef>
-          <a:fontRef idx="minor">
-            <a:schemeClr val="tx1"/>
-          </a:fontRef>
-        </p:style>
-      </p:cxnSp>
-      <p:pic>
-        <p:nvPicPr>
-          <p:cNvPr id="11" name="Picture 10">
-            <a:extLst>
-              <a:ext uri="{FF2B5EF4-FFF2-40B4-BE49-F238E27FC236}">
-                <a16:creationId xmlns:a16="http://schemas.microsoft.com/office/drawing/2014/main" id="{1D76A785-6E4C-921F-808C-68D482BBCD69}"/>
+                <a16:creationId xmlns:a16="http://schemas.microsoft.com/office/drawing/2014/main" id="{7085AA42-EE46-6E4A-8A74-CEDC36BC852D}"/>
               </a:ext>
             </a:extLst>
           </p:cNvPr>
@@ -15085,38 +13008,8 @@
         </p:blipFill>
         <p:spPr>
           <a:xfrm>
-            <a:off x="0" y="703609"/>
-            <a:ext cx="6388186" cy="3710703"/>
-          </a:xfrm>
-          <a:prstGeom prst="rect">
-            <a:avLst/>
-          </a:prstGeom>
-        </p:spPr>
-      </p:pic>
-      <p:pic>
-        <p:nvPicPr>
-          <p:cNvPr id="15" name="Picture 14">
-            <a:extLst>
-              <a:ext uri="{FF2B5EF4-FFF2-40B4-BE49-F238E27FC236}">
-                <a16:creationId xmlns:a16="http://schemas.microsoft.com/office/drawing/2014/main" id="{9BF833B8-9353-0AAA-33C8-393713C30E98}"/>
-              </a:ext>
-            </a:extLst>
-          </p:cNvPr>
-          <p:cNvPicPr>
-            <a:picLocks noChangeAspect="1"/>
-          </p:cNvPicPr>
-          <p:nvPr/>
-        </p:nvPicPr>
-        <p:blipFill>
-          <a:blip r:embed="rId3"/>
-          <a:stretch>
-            <a:fillRect/>
-          </a:stretch>
-        </p:blipFill>
-        <p:spPr>
-          <a:xfrm>
-            <a:off x="6560560" y="703610"/>
-            <a:ext cx="5509517" cy="3644770"/>
+            <a:off x="205833" y="1319574"/>
+            <a:ext cx="11780333" cy="4218852"/>
           </a:xfrm>
           <a:prstGeom prst="rect">
             <a:avLst/>
@@ -15142,14 +13035,22 @@
     <p:bg>
       <p:bgPr>
         <a:solidFill>
-          <a:schemeClr val="accent3"/>
+          <a:schemeClr val="accent1">
+            <a:lumMod val="50000"/>
+          </a:schemeClr>
         </a:solidFill>
         <a:effectLst/>
       </p:bgPr>
     </p:bg>
     <p:spTree>
       <p:nvGrpSpPr>
-        <p:cNvPr id="1" name=""/>
+        <p:cNvPr id="1" name="">
+          <a:extLst>
+            <a:ext uri="{FF2B5EF4-FFF2-40B4-BE49-F238E27FC236}">
+              <a16:creationId xmlns:a16="http://schemas.microsoft.com/office/drawing/2014/main" id="{156CEFAF-52AC-D814-AE79-BE1E243557A2}"/>
+            </a:ext>
+          </a:extLst>
+        </p:cNvPr>
         <p:cNvGrpSpPr/>
         <p:nvPr/>
       </p:nvGrpSpPr>
@@ -15166,7 +13067,7 @@
           <p:cNvPr id="2" name="Title 1">
             <a:extLst>
               <a:ext uri="{FF2B5EF4-FFF2-40B4-BE49-F238E27FC236}">
-                <a16:creationId xmlns:a16="http://schemas.microsoft.com/office/drawing/2014/main" id="{314C27C8-165C-5513-DB4B-9D840097C545}"/>
+                <a16:creationId xmlns:a16="http://schemas.microsoft.com/office/drawing/2014/main" id="{506DAF0C-4507-CD0E-FB33-AD514D1B42A8}"/>
               </a:ext>
             </a:extLst>
           </p:cNvPr>
@@ -15178,143 +13079,62 @@
           </p:nvPr>
         </p:nvSpPr>
         <p:spPr>
+          <a:xfrm>
+            <a:off x="0" y="0"/>
+            <a:ext cx="12192000" cy="655846"/>
+          </a:xfrm>
           <a:noFill/>
         </p:spPr>
         <p:txBody>
-          <a:bodyPr>
+          <a:bodyPr anchor="t">
             <a:noAutofit/>
           </a:bodyPr>
           <a:lstStyle/>
           <a:p>
+            <a:pPr algn="ctr"/>
             <a:r>
-              <a:rPr lang="en-US" dirty="0"/>
-              <a:t>Marketing </a:t>
-            </a:r>
-            <a:br>
-              <a:rPr lang="en-US" dirty="0"/>
-            </a:br>
-            <a:r>
-              <a:rPr lang="en-US" dirty="0"/>
-              <a:t>strategies</a:t>
-            </a:r>
-          </a:p>
-        </p:txBody>
-      </p:sp>
-      <p:sp>
-        <p:nvSpPr>
-          <p:cNvPr id="3" name="Content Placeholder 2">
-            <a:extLst>
-              <a:ext uri="{FF2B5EF4-FFF2-40B4-BE49-F238E27FC236}">
-                <a16:creationId xmlns:a16="http://schemas.microsoft.com/office/drawing/2014/main" id="{FACE640F-7F5A-BDB7-205D-765FA80B6796}"/>
-              </a:ext>
-            </a:extLst>
-          </p:cNvPr>
-          <p:cNvSpPr>
-            <a:spLocks noGrp="1"/>
-          </p:cNvSpPr>
-          <p:nvPr>
-            <p:ph idx="1"/>
-          </p:nvPr>
-        </p:nvSpPr>
-        <p:spPr>
-          <a:noFill/>
-        </p:spPr>
-        <p:txBody>
-          <a:bodyPr vert="horz" lIns="91440" tIns="45720" rIns="91440" bIns="45720" rtlCol="0" anchor="t">
-            <a:normAutofit/>
-          </a:bodyPr>
-          <a:lstStyle/>
-          <a:p>
-            <a:r>
-              <a:rPr lang="en-US" dirty="0"/>
-              <a:t>Implement personalized engagement strategies</a:t>
-            </a:r>
-          </a:p>
-          <a:p>
-            <a:r>
-              <a:rPr lang="en-US" dirty="0"/>
-              <a:t>Tailor campaigns to resonate with specific demographics, fostering a sense of relevance </a:t>
-            </a:r>
-            <a:br>
-              <a:rPr lang="en-US" dirty="0"/>
-            </a:br>
-            <a:r>
-              <a:rPr lang="en-US" dirty="0"/>
-              <a:t>and connection</a:t>
-            </a:r>
-          </a:p>
-          <a:p>
-            <a:r>
-              <a:rPr lang="en-US" dirty="0"/>
-              <a:t>Collaborate with influencers and thought leaders </a:t>
-            </a:r>
-            <a:br>
-              <a:rPr lang="en-US" dirty="0"/>
-            </a:br>
-            <a:r>
-              <a:rPr lang="en-US" dirty="0"/>
-              <a:t>to amplify our brand message</a:t>
+              <a:rPr lang="en-US" dirty="0">
+                <a:latin typeface="Amasis MT Pro Black" panose="02040A04050005020304" pitchFamily="18" charset="0"/>
+              </a:rPr>
+              <a:t>Temporal Patterns</a:t>
             </a:r>
           </a:p>
         </p:txBody>
       </p:sp>
       <p:pic>
         <p:nvPicPr>
-          <p:cNvPr id="20" name="Picture Placeholder 19" descr="Person standing on the edge looking out at the mountains">
+          <p:cNvPr id="5" name="Picture 4">
             <a:extLst>
               <a:ext uri="{FF2B5EF4-FFF2-40B4-BE49-F238E27FC236}">
-                <a16:creationId xmlns:a16="http://schemas.microsoft.com/office/drawing/2014/main" id="{9EE0017D-36B3-6A70-9371-F8EDD0F54246}"/>
+                <a16:creationId xmlns:a16="http://schemas.microsoft.com/office/drawing/2014/main" id="{629C0E4C-12CC-8EC4-4ECC-338146697638}"/>
               </a:ext>
             </a:extLst>
           </p:cNvPr>
           <p:cNvPicPr>
-            <a:picLocks noGrp="1" noChangeAspect="1"/>
+            <a:picLocks noChangeAspect="1"/>
           </p:cNvPicPr>
-          <p:nvPr>
-            <p:ph type="pic" sz="quarter" idx="14"/>
-          </p:nvPr>
+          <p:nvPr/>
         </p:nvPicPr>
         <p:blipFill>
           <a:blip r:embed="rId2"/>
-          <a:srcRect t="206" b="206"/>
-          <a:stretch/>
+          <a:stretch>
+            <a:fillRect/>
+          </a:stretch>
         </p:blipFill>
-        <p:spPr/>
+        <p:spPr>
+          <a:xfrm>
+            <a:off x="27709" y="766870"/>
+            <a:ext cx="12136582" cy="5324260"/>
+          </a:xfrm>
+          <a:prstGeom prst="rect">
+            <a:avLst/>
+          </a:prstGeom>
+        </p:spPr>
       </p:pic>
-      <p:sp>
-        <p:nvSpPr>
-          <p:cNvPr id="4" name="Slide Number Placeholder 3">
-            <a:extLst>
-              <a:ext uri="{FF2B5EF4-FFF2-40B4-BE49-F238E27FC236}">
-                <a16:creationId xmlns:a16="http://schemas.microsoft.com/office/drawing/2014/main" id="{4A329F3F-96FB-EEA9-B9F5-E9EE13982B3B}"/>
-              </a:ext>
-            </a:extLst>
-          </p:cNvPr>
-          <p:cNvSpPr>
-            <a:spLocks noGrp="1"/>
-          </p:cNvSpPr>
-          <p:nvPr>
-            <p:ph type="sldNum" sz="quarter" idx="12"/>
-          </p:nvPr>
-        </p:nvSpPr>
-        <p:spPr/>
-        <p:txBody>
-          <a:bodyPr/>
-          <a:lstStyle/>
-          <a:p>
-            <a:fld id="{CBD12358-51D2-46B3-9BDE-DF29528B9454}" type="slidenum">
-              <a:rPr lang="en-US" smtClean="0"/>
-              <a:pPr/>
-              <a:t>9</a:t>
-            </a:fld>
-            <a:endParaRPr lang="en-US" dirty="0"/>
-          </a:p>
-        </p:txBody>
-      </p:sp>
     </p:spTree>
     <p:extLst>
       <p:ext uri="{BB962C8B-B14F-4D97-AF65-F5344CB8AC3E}">
-        <p14:creationId xmlns:p14="http://schemas.microsoft.com/office/powerpoint/2010/main" val="729609147"/>
+        <p14:creationId xmlns:p14="http://schemas.microsoft.com/office/powerpoint/2010/main" val="753349515"/>
       </p:ext>
     </p:extLst>
   </p:cSld>
@@ -16164,26 +13984,6 @@
 </file>
 
 <file path=customXml/item1.xml><?xml version="1.0" encoding="utf-8"?>
-<p:properties xmlns:p="http://schemas.microsoft.com/office/2006/metadata/properties" xmlns:xsi="http://www.w3.org/2001/XMLSchema-instance" xmlns:pc="http://schemas.microsoft.com/office/infopath/2007/PartnerControls">
-  <documentManagement>
-    <MediaServiceKeyPoints xmlns="71af3243-3dd4-4a8d-8c0d-dd76da1f02a5" xsi:nil="true"/>
-    <_ip_UnifiedCompliancePolicyUIAction xmlns="http://schemas.microsoft.com/sharepoint/v3" xsi:nil="true"/>
-    <Image xmlns="71af3243-3dd4-4a8d-8c0d-dd76da1f02a5">
-      <Url xsi:nil="true"/>
-      <Description xsi:nil="true"/>
-    </Image>
-    <Status xmlns="71af3243-3dd4-4a8d-8c0d-dd76da1f02a5">Not started</Status>
-    <Background xmlns="71af3243-3dd4-4a8d-8c0d-dd76da1f02a5">false</Background>
-    <_ip_UnifiedCompliancePolicyProperties xmlns="http://schemas.microsoft.com/sharepoint/v3" xsi:nil="true"/>
-    <ImageTagsTaxHTField xmlns="71af3243-3dd4-4a8d-8c0d-dd76da1f02a5">
-      <Terms xmlns="http://schemas.microsoft.com/office/infopath/2007/PartnerControls"/>
-    </ImageTagsTaxHTField>
-    <TaxCatchAll xmlns="230e9df3-be65-4c73-a93b-d1236ebd677e" xsi:nil="true"/>
-  </documentManagement>
-</p:properties>
-</file>
-
-<file path=customXml/item2.xml><?xml version="1.0" encoding="utf-8"?>
 <ct:contentTypeSchema xmlns:ct="http://schemas.microsoft.com/office/2006/metadata/contentType" xmlns:ma="http://schemas.microsoft.com/office/2006/metadata/properties/metaAttributes" ct:_="" ma:_="" ma:contentTypeName="Document" ma:contentTypeID="0x01010079F111ED35F8CC479449609E8A0923A6" ma:contentTypeVersion="29" ma:contentTypeDescription="Create a new document." ma:contentTypeScope="" ma:versionID="6a914531ae0f23be31da2eba1f3b42a9">
   <xsd:schema xmlns:xsd="http://www.w3.org/2001/XMLSchema" xmlns:xs="http://www.w3.org/2001/XMLSchema" xmlns:p="http://schemas.microsoft.com/office/2006/metadata/properties" xmlns:ns1="http://schemas.microsoft.com/sharepoint/v3" xmlns:ns2="71af3243-3dd4-4a8d-8c0d-dd76da1f02a5" xmlns:ns3="16c05727-aa75-4e4a-9b5f-8a80a1165891" xmlns:ns4="230e9df3-be65-4c73-a93b-d1236ebd677e" targetNamespace="http://schemas.microsoft.com/office/2006/metadata/properties" ma:root="true" ma:fieldsID="ae00154c9e66547f022c4923f88826d6" ns1:_="" ns2:_="" ns3:_="" ns4:_="">
     <xsd:import namespace="http://schemas.microsoft.com/sharepoint/v3"/>
@@ -16495,6 +14295,26 @@
 </ct:contentTypeSchema>
 </file>
 
+<file path=customXml/item2.xml><?xml version="1.0" encoding="utf-8"?>
+<p:properties xmlns:p="http://schemas.microsoft.com/office/2006/metadata/properties" xmlns:xsi="http://www.w3.org/2001/XMLSchema-instance" xmlns:pc="http://schemas.microsoft.com/office/infopath/2007/PartnerControls">
+  <documentManagement>
+    <MediaServiceKeyPoints xmlns="71af3243-3dd4-4a8d-8c0d-dd76da1f02a5" xsi:nil="true"/>
+    <_ip_UnifiedCompliancePolicyUIAction xmlns="http://schemas.microsoft.com/sharepoint/v3" xsi:nil="true"/>
+    <Image xmlns="71af3243-3dd4-4a8d-8c0d-dd76da1f02a5">
+      <Url xsi:nil="true"/>
+      <Description xsi:nil="true"/>
+    </Image>
+    <Status xmlns="71af3243-3dd4-4a8d-8c0d-dd76da1f02a5">Not started</Status>
+    <Background xmlns="71af3243-3dd4-4a8d-8c0d-dd76da1f02a5">false</Background>
+    <_ip_UnifiedCompliancePolicyProperties xmlns="http://schemas.microsoft.com/sharepoint/v3" xsi:nil="true"/>
+    <ImageTagsTaxHTField xmlns="71af3243-3dd4-4a8d-8c0d-dd76da1f02a5">
+      <Terms xmlns="http://schemas.microsoft.com/office/infopath/2007/PartnerControls"/>
+    </ImageTagsTaxHTField>
+    <TaxCatchAll xmlns="230e9df3-be65-4c73-a93b-d1236ebd677e" xsi:nil="true"/>
+  </documentManagement>
+</p:properties>
+</file>
+
 <file path=customXml/item3.xml><?xml version="1.0" encoding="utf-8"?>
 <?mso-contentType ?>
 <FormTemplates xmlns="http://schemas.microsoft.com/sharepoint/v3/contenttype/forms">
@@ -16505,25 +14325,6 @@
 </file>
 
 <file path=customXml/itemProps1.xml><?xml version="1.0" encoding="utf-8"?>
-<ds:datastoreItem xmlns:ds="http://schemas.openxmlformats.org/officeDocument/2006/customXml" ds:itemID="{826A71AF-4CF2-4B95-BFB6-5C27500258C6}">
-  <ds:schemaRefs>
-    <ds:schemaRef ds:uri="http://schemas.openxmlformats.org/package/2006/metadata/core-properties"/>
-    <ds:schemaRef ds:uri="http://schemas.microsoft.com/office/infopath/2007/PartnerControls"/>
-    <ds:schemaRef ds:uri="http://schemas.microsoft.com/office/2006/metadata/properties"/>
-    <ds:schemaRef ds:uri="http://www.w3.org/XML/1998/namespace"/>
-    <ds:schemaRef ds:uri="http://purl.org/dc/elements/1.1/"/>
-    <ds:schemaRef ds:uri="http://schemas.microsoft.com/office/2006/documentManagement/types"/>
-    <ds:schemaRef ds:uri="230e9df3-be65-4c73-a93b-d1236ebd677e"/>
-    <ds:schemaRef ds:uri="71af3243-3dd4-4a8d-8c0d-dd76da1f02a5"/>
-    <ds:schemaRef ds:uri="16c05727-aa75-4e4a-9b5f-8a80a1165891"/>
-    <ds:schemaRef ds:uri="http://schemas.microsoft.com/sharepoint/v3"/>
-    <ds:schemaRef ds:uri="http://purl.org/dc/dcmitype/"/>
-    <ds:schemaRef ds:uri="http://purl.org/dc/terms/"/>
-  </ds:schemaRefs>
-</ds:datastoreItem>
-</file>
-
-<file path=customXml/itemProps2.xml><?xml version="1.0" encoding="utf-8"?>
 <ds:datastoreItem xmlns:ds="http://schemas.openxmlformats.org/officeDocument/2006/customXml" ds:itemID="{D22F18AB-4822-461F-89DD-ED433D7D595D}">
   <ds:schemaRefs>
     <ds:schemaRef ds:uri="http://schemas.microsoft.com/office/2006/metadata/contentType"/>
@@ -16544,6 +14345,25 @@
 </ds:datastoreItem>
 </file>
 
+<file path=customXml/itemProps2.xml><?xml version="1.0" encoding="utf-8"?>
+<ds:datastoreItem xmlns:ds="http://schemas.openxmlformats.org/officeDocument/2006/customXml" ds:itemID="{826A71AF-4CF2-4B95-BFB6-5C27500258C6}">
+  <ds:schemaRefs>
+    <ds:schemaRef ds:uri="http://schemas.openxmlformats.org/package/2006/metadata/core-properties"/>
+    <ds:schemaRef ds:uri="http://schemas.microsoft.com/office/infopath/2007/PartnerControls"/>
+    <ds:schemaRef ds:uri="http://schemas.microsoft.com/office/2006/metadata/properties"/>
+    <ds:schemaRef ds:uri="http://www.w3.org/XML/1998/namespace"/>
+    <ds:schemaRef ds:uri="http://purl.org/dc/elements/1.1/"/>
+    <ds:schemaRef ds:uri="http://schemas.microsoft.com/office/2006/documentManagement/types"/>
+    <ds:schemaRef ds:uri="230e9df3-be65-4c73-a93b-d1236ebd677e"/>
+    <ds:schemaRef ds:uri="71af3243-3dd4-4a8d-8c0d-dd76da1f02a5"/>
+    <ds:schemaRef ds:uri="16c05727-aa75-4e4a-9b5f-8a80a1165891"/>
+    <ds:schemaRef ds:uri="http://schemas.microsoft.com/sharepoint/v3"/>
+    <ds:schemaRef ds:uri="http://purl.org/dc/dcmitype/"/>
+    <ds:schemaRef ds:uri="http://purl.org/dc/terms/"/>
+  </ds:schemaRefs>
+</ds:datastoreItem>
+</file>
+
 <file path=customXml/itemProps3.xml><?xml version="1.0" encoding="utf-8"?>
 <ds:datastoreItem xmlns:ds="http://schemas.openxmlformats.org/officeDocument/2006/customXml" ds:itemID="{0F60B100-7079-4DE7-AF7C-20BFB1D62C46}">
   <ds:schemaRefs>

</xml_diff>

<commit_message>
working on presentation slides and visuals
</commit_message>
<xml_diff>
--- a/Scyne Advisory Interview/Scyne Advisory Presentation.pptx
+++ b/Scyne Advisory Interview/Scyne Advisory Presentation.pptx
@@ -5,10 +5,10 @@
     <p:sldMasterId id="2147483744" r:id="rId4"/>
   </p:sldMasterIdLst>
   <p:notesMasterIdLst>
-    <p:notesMasterId r:id="rId19"/>
+    <p:notesMasterId r:id="rId21"/>
   </p:notesMasterIdLst>
   <p:handoutMasterIdLst>
-    <p:handoutMasterId r:id="rId20"/>
+    <p:handoutMasterId r:id="rId22"/>
   </p:handoutMasterIdLst>
   <p:sldIdLst>
     <p:sldId id="256" r:id="rId5"/>
@@ -25,6 +25,8 @@
     <p:sldId id="290" r:id="rId16"/>
     <p:sldId id="289" r:id="rId17"/>
     <p:sldId id="292" r:id="rId18"/>
+    <p:sldId id="293" r:id="rId19"/>
+    <p:sldId id="294" r:id="rId20"/>
   </p:sldIdLst>
   <p:sldSz cx="12192000" cy="6858000"/>
   <p:notesSz cx="6858000" cy="9144000"/>
@@ -11720,6 +11722,274 @@
     <p:extLst>
       <p:ext uri="{BB962C8B-B14F-4D97-AF65-F5344CB8AC3E}">
         <p14:creationId xmlns:p14="http://schemas.microsoft.com/office/powerpoint/2010/main" val="2133959577"/>
+      </p:ext>
+    </p:extLst>
+  </p:cSld>
+  <p:clrMapOvr>
+    <a:masterClrMapping/>
+  </p:clrMapOvr>
+</p:sld>
+</file>
+
+<file path=ppt/slides/slide15.xml><?xml version="1.0" encoding="utf-8"?>
+<p:sld xmlns:a="http://schemas.openxmlformats.org/drawingml/2006/main" xmlns:r="http://schemas.openxmlformats.org/officeDocument/2006/relationships" xmlns:p="http://schemas.openxmlformats.org/presentationml/2006/main">
+  <p:cSld>
+    <p:bg>
+      <p:bgPr>
+        <a:solidFill>
+          <a:schemeClr val="accent1">
+            <a:lumMod val="50000"/>
+          </a:schemeClr>
+        </a:solidFill>
+        <a:effectLst/>
+      </p:bgPr>
+    </p:bg>
+    <p:spTree>
+      <p:nvGrpSpPr>
+        <p:cNvPr id="1" name="">
+          <a:extLst>
+            <a:ext uri="{FF2B5EF4-FFF2-40B4-BE49-F238E27FC236}">
+              <a16:creationId xmlns:a16="http://schemas.microsoft.com/office/drawing/2014/main" id="{DAA8F05C-6B9E-16F1-1F0C-8E0997BA88E8}"/>
+            </a:ext>
+          </a:extLst>
+        </p:cNvPr>
+        <p:cNvGrpSpPr/>
+        <p:nvPr/>
+      </p:nvGrpSpPr>
+      <p:grpSpPr>
+        <a:xfrm>
+          <a:off x="0" y="0"/>
+          <a:ext cx="0" cy="0"/>
+          <a:chOff x="0" y="0"/>
+          <a:chExt cx="0" cy="0"/>
+        </a:xfrm>
+      </p:grpSpPr>
+      <p:sp>
+        <p:nvSpPr>
+          <p:cNvPr id="2" name="Title 1">
+            <a:extLst>
+              <a:ext uri="{FF2B5EF4-FFF2-40B4-BE49-F238E27FC236}">
+                <a16:creationId xmlns:a16="http://schemas.microsoft.com/office/drawing/2014/main" id="{B6D8F877-150A-43ED-6F64-4FB65DBBE028}"/>
+              </a:ext>
+            </a:extLst>
+          </p:cNvPr>
+          <p:cNvSpPr>
+            <a:spLocks noGrp="1"/>
+          </p:cNvSpPr>
+          <p:nvPr>
+            <p:ph type="title"/>
+          </p:nvPr>
+        </p:nvSpPr>
+        <p:spPr>
+          <a:xfrm>
+            <a:off x="0" y="0"/>
+            <a:ext cx="12192000" cy="655846"/>
+          </a:xfrm>
+          <a:noFill/>
+        </p:spPr>
+        <p:txBody>
+          <a:bodyPr anchor="t">
+            <a:noAutofit/>
+          </a:bodyPr>
+          <a:lstStyle/>
+          <a:p>
+            <a:pPr algn="ctr"/>
+            <a:r>
+              <a:rPr lang="en-US" dirty="0">
+                <a:latin typeface="Amasis MT Pro Black" panose="02040A04050005020304" pitchFamily="18" charset="0"/>
+              </a:rPr>
+              <a:t>Predictions</a:t>
+            </a:r>
+          </a:p>
+        </p:txBody>
+      </p:sp>
+      <p:pic>
+        <p:nvPicPr>
+          <p:cNvPr id="5" name="Picture 4">
+            <a:extLst>
+              <a:ext uri="{FF2B5EF4-FFF2-40B4-BE49-F238E27FC236}">
+                <a16:creationId xmlns:a16="http://schemas.microsoft.com/office/drawing/2014/main" id="{9D453304-A351-4324-5A2A-3BD184D41896}"/>
+              </a:ext>
+            </a:extLst>
+          </p:cNvPr>
+          <p:cNvPicPr>
+            <a:picLocks noChangeAspect="1"/>
+          </p:cNvPicPr>
+          <p:nvPr/>
+        </p:nvPicPr>
+        <p:blipFill>
+          <a:blip r:embed="rId2"/>
+          <a:stretch>
+            <a:fillRect/>
+          </a:stretch>
+        </p:blipFill>
+        <p:spPr>
+          <a:xfrm>
+            <a:off x="41271" y="1114622"/>
+            <a:ext cx="12109457" cy="4628755"/>
+          </a:xfrm>
+          <a:prstGeom prst="rect">
+            <a:avLst/>
+          </a:prstGeom>
+        </p:spPr>
+      </p:pic>
+    </p:spTree>
+    <p:extLst>
+      <p:ext uri="{BB962C8B-B14F-4D97-AF65-F5344CB8AC3E}">
+        <p14:creationId xmlns:p14="http://schemas.microsoft.com/office/powerpoint/2010/main" val="2312529657"/>
+      </p:ext>
+    </p:extLst>
+  </p:cSld>
+  <p:clrMapOvr>
+    <a:masterClrMapping/>
+  </p:clrMapOvr>
+</p:sld>
+</file>
+
+<file path=ppt/slides/slide16.xml><?xml version="1.0" encoding="utf-8"?>
+<p:sld xmlns:a="http://schemas.openxmlformats.org/drawingml/2006/main" xmlns:r="http://schemas.openxmlformats.org/officeDocument/2006/relationships" xmlns:p="http://schemas.openxmlformats.org/presentationml/2006/main">
+  <p:cSld>
+    <p:bg>
+      <p:bgPr>
+        <a:solidFill>
+          <a:schemeClr val="accent1">
+            <a:lumMod val="50000"/>
+          </a:schemeClr>
+        </a:solidFill>
+        <a:effectLst/>
+      </p:bgPr>
+    </p:bg>
+    <p:spTree>
+      <p:nvGrpSpPr>
+        <p:cNvPr id="1" name="">
+          <a:extLst>
+            <a:ext uri="{FF2B5EF4-FFF2-40B4-BE49-F238E27FC236}">
+              <a16:creationId xmlns:a16="http://schemas.microsoft.com/office/drawing/2014/main" id="{28A47D98-F10C-F2D5-5C31-129ECA1270A1}"/>
+            </a:ext>
+          </a:extLst>
+        </p:cNvPr>
+        <p:cNvGrpSpPr/>
+        <p:nvPr/>
+      </p:nvGrpSpPr>
+      <p:grpSpPr>
+        <a:xfrm>
+          <a:off x="0" y="0"/>
+          <a:ext cx="0" cy="0"/>
+          <a:chOff x="0" y="0"/>
+          <a:chExt cx="0" cy="0"/>
+        </a:xfrm>
+      </p:grpSpPr>
+      <p:sp>
+        <p:nvSpPr>
+          <p:cNvPr id="2" name="Title 1">
+            <a:extLst>
+              <a:ext uri="{FF2B5EF4-FFF2-40B4-BE49-F238E27FC236}">
+                <a16:creationId xmlns:a16="http://schemas.microsoft.com/office/drawing/2014/main" id="{282F6437-9145-B70B-B18C-1C2D3DCBC4D5}"/>
+              </a:ext>
+            </a:extLst>
+          </p:cNvPr>
+          <p:cNvSpPr>
+            <a:spLocks noGrp="1"/>
+          </p:cNvSpPr>
+          <p:nvPr>
+            <p:ph type="title"/>
+          </p:nvPr>
+        </p:nvSpPr>
+        <p:spPr>
+          <a:xfrm>
+            <a:off x="0" y="0"/>
+            <a:ext cx="12192000" cy="655846"/>
+          </a:xfrm>
+          <a:noFill/>
+        </p:spPr>
+        <p:txBody>
+          <a:bodyPr anchor="t">
+            <a:noAutofit/>
+          </a:bodyPr>
+          <a:lstStyle/>
+          <a:p>
+            <a:pPr algn="ctr"/>
+            <a:r>
+              <a:rPr lang="en-US" dirty="0">
+                <a:latin typeface="Amasis MT Pro Black" panose="02040A04050005020304" pitchFamily="18" charset="0"/>
+              </a:rPr>
+              <a:t>3d probability analysis</a:t>
+            </a:r>
+          </a:p>
+        </p:txBody>
+      </p:sp>
+      <p:pic>
+        <p:nvPicPr>
+          <p:cNvPr id="6" name="Picture 5">
+            <a:extLst>
+              <a:ext uri="{FF2B5EF4-FFF2-40B4-BE49-F238E27FC236}">
+                <a16:creationId xmlns:a16="http://schemas.microsoft.com/office/drawing/2014/main" id="{C1A5392D-3027-BBCD-E5AB-D10210A3205C}"/>
+              </a:ext>
+            </a:extLst>
+          </p:cNvPr>
+          <p:cNvPicPr>
+            <a:picLocks noChangeAspect="1"/>
+          </p:cNvPicPr>
+          <p:nvPr/>
+        </p:nvPicPr>
+        <p:blipFill>
+          <a:blip r:embed="rId2"/>
+          <a:stretch>
+            <a:fillRect/>
+          </a:stretch>
+        </p:blipFill>
+        <p:spPr>
+          <a:xfrm>
+            <a:off x="2639051" y="959893"/>
+            <a:ext cx="6913893" cy="5898107"/>
+          </a:xfrm>
+          <a:prstGeom prst="rect">
+            <a:avLst/>
+          </a:prstGeom>
+        </p:spPr>
+      </p:pic>
+      <p:sp>
+        <p:nvSpPr>
+          <p:cNvPr id="8" name="TextBox 7">
+            <a:extLst>
+              <a:ext uri="{FF2B5EF4-FFF2-40B4-BE49-F238E27FC236}">
+                <a16:creationId xmlns:a16="http://schemas.microsoft.com/office/drawing/2014/main" id="{5DCDD26C-2E54-0674-EA4A-47995D579088}"/>
+              </a:ext>
+            </a:extLst>
+          </p:cNvPr>
+          <p:cNvSpPr txBox="1"/>
+          <p:nvPr/>
+        </p:nvSpPr>
+        <p:spPr>
+          <a:xfrm>
+            <a:off x="2496466" y="590561"/>
+            <a:ext cx="7199061" cy="369332"/>
+          </a:xfrm>
+          <a:prstGeom prst="rect">
+            <a:avLst/>
+          </a:prstGeom>
+          <a:noFill/>
+        </p:spPr>
+        <p:txBody>
+          <a:bodyPr wrap="square">
+            <a:spAutoFit/>
+          </a:bodyPr>
+          <a:lstStyle/>
+          <a:p>
+            <a:pPr algn="ctr"/>
+            <a:r>
+              <a:rPr lang="en-US" dirty="0">
+                <a:latin typeface="Amasis MT Pro Black" panose="02040A04050005020304" pitchFamily="18" charset="0"/>
+              </a:rPr>
+              <a:t>Are single crashes more likely at night on high-speed roads?</a:t>
+            </a:r>
+          </a:p>
+        </p:txBody>
+      </p:sp>
+    </p:spTree>
+    <p:extLst>
+      <p:ext uri="{BB962C8B-B14F-4D97-AF65-F5344CB8AC3E}">
+        <p14:creationId xmlns:p14="http://schemas.microsoft.com/office/powerpoint/2010/main" val="4195482931"/>
       </p:ext>
     </p:extLst>
   </p:cSld>
@@ -14533,26 +14803,6 @@
 </file>
 
 <file path=customXml/item1.xml><?xml version="1.0" encoding="utf-8"?>
-<p:properties xmlns:p="http://schemas.microsoft.com/office/2006/metadata/properties" xmlns:xsi="http://www.w3.org/2001/XMLSchema-instance" xmlns:pc="http://schemas.microsoft.com/office/infopath/2007/PartnerControls">
-  <documentManagement>
-    <MediaServiceKeyPoints xmlns="71af3243-3dd4-4a8d-8c0d-dd76da1f02a5" xsi:nil="true"/>
-    <_ip_UnifiedCompliancePolicyUIAction xmlns="http://schemas.microsoft.com/sharepoint/v3" xsi:nil="true"/>
-    <Image xmlns="71af3243-3dd4-4a8d-8c0d-dd76da1f02a5">
-      <Url xsi:nil="true"/>
-      <Description xsi:nil="true"/>
-    </Image>
-    <Status xmlns="71af3243-3dd4-4a8d-8c0d-dd76da1f02a5">Not started</Status>
-    <Background xmlns="71af3243-3dd4-4a8d-8c0d-dd76da1f02a5">false</Background>
-    <_ip_UnifiedCompliancePolicyProperties xmlns="http://schemas.microsoft.com/sharepoint/v3" xsi:nil="true"/>
-    <ImageTagsTaxHTField xmlns="71af3243-3dd4-4a8d-8c0d-dd76da1f02a5">
-      <Terms xmlns="http://schemas.microsoft.com/office/infopath/2007/PartnerControls"/>
-    </ImageTagsTaxHTField>
-    <TaxCatchAll xmlns="230e9df3-be65-4c73-a93b-d1236ebd677e" xsi:nil="true"/>
-  </documentManagement>
-</p:properties>
-</file>
-
-<file path=customXml/item2.xml><?xml version="1.0" encoding="utf-8"?>
 <ct:contentTypeSchema xmlns:ct="http://schemas.microsoft.com/office/2006/metadata/contentType" xmlns:ma="http://schemas.microsoft.com/office/2006/metadata/properties/metaAttributes" ct:_="" ma:_="" ma:contentTypeName="Document" ma:contentTypeID="0x01010079F111ED35F8CC479449609E8A0923A6" ma:contentTypeVersion="29" ma:contentTypeDescription="Create a new document." ma:contentTypeScope="" ma:versionID="6a914531ae0f23be31da2eba1f3b42a9">
   <xsd:schema xmlns:xsd="http://www.w3.org/2001/XMLSchema" xmlns:xs="http://www.w3.org/2001/XMLSchema" xmlns:p="http://schemas.microsoft.com/office/2006/metadata/properties" xmlns:ns1="http://schemas.microsoft.com/sharepoint/v3" xmlns:ns2="71af3243-3dd4-4a8d-8c0d-dd76da1f02a5" xmlns:ns3="16c05727-aa75-4e4a-9b5f-8a80a1165891" xmlns:ns4="230e9df3-be65-4c73-a93b-d1236ebd677e" targetNamespace="http://schemas.microsoft.com/office/2006/metadata/properties" ma:root="true" ma:fieldsID="ae00154c9e66547f022c4923f88826d6" ns1:_="" ns2:_="" ns3:_="" ns4:_="">
     <xsd:import namespace="http://schemas.microsoft.com/sharepoint/v3"/>
@@ -14864,6 +15114,26 @@
 </ct:contentTypeSchema>
 </file>
 
+<file path=customXml/item2.xml><?xml version="1.0" encoding="utf-8"?>
+<p:properties xmlns:p="http://schemas.microsoft.com/office/2006/metadata/properties" xmlns:xsi="http://www.w3.org/2001/XMLSchema-instance" xmlns:pc="http://schemas.microsoft.com/office/infopath/2007/PartnerControls">
+  <documentManagement>
+    <MediaServiceKeyPoints xmlns="71af3243-3dd4-4a8d-8c0d-dd76da1f02a5" xsi:nil="true"/>
+    <_ip_UnifiedCompliancePolicyUIAction xmlns="http://schemas.microsoft.com/sharepoint/v3" xsi:nil="true"/>
+    <Image xmlns="71af3243-3dd4-4a8d-8c0d-dd76da1f02a5">
+      <Url xsi:nil="true"/>
+      <Description xsi:nil="true"/>
+    </Image>
+    <Status xmlns="71af3243-3dd4-4a8d-8c0d-dd76da1f02a5">Not started</Status>
+    <Background xmlns="71af3243-3dd4-4a8d-8c0d-dd76da1f02a5">false</Background>
+    <_ip_UnifiedCompliancePolicyProperties xmlns="http://schemas.microsoft.com/sharepoint/v3" xsi:nil="true"/>
+    <ImageTagsTaxHTField xmlns="71af3243-3dd4-4a8d-8c0d-dd76da1f02a5">
+      <Terms xmlns="http://schemas.microsoft.com/office/infopath/2007/PartnerControls"/>
+    </ImageTagsTaxHTField>
+    <TaxCatchAll xmlns="230e9df3-be65-4c73-a93b-d1236ebd677e" xsi:nil="true"/>
+  </documentManagement>
+</p:properties>
+</file>
+
 <file path=customXml/item3.xml><?xml version="1.0" encoding="utf-8"?>
 <?mso-contentType ?>
 <FormTemplates xmlns="http://schemas.microsoft.com/sharepoint/v3/contenttype/forms">
@@ -14874,25 +15144,6 @@
 </file>
 
 <file path=customXml/itemProps1.xml><?xml version="1.0" encoding="utf-8"?>
-<ds:datastoreItem xmlns:ds="http://schemas.openxmlformats.org/officeDocument/2006/customXml" ds:itemID="{826A71AF-4CF2-4B95-BFB6-5C27500258C6}">
-  <ds:schemaRefs>
-    <ds:schemaRef ds:uri="http://schemas.openxmlformats.org/package/2006/metadata/core-properties"/>
-    <ds:schemaRef ds:uri="http://schemas.microsoft.com/office/infopath/2007/PartnerControls"/>
-    <ds:schemaRef ds:uri="http://schemas.microsoft.com/office/2006/metadata/properties"/>
-    <ds:schemaRef ds:uri="http://www.w3.org/XML/1998/namespace"/>
-    <ds:schemaRef ds:uri="http://purl.org/dc/elements/1.1/"/>
-    <ds:schemaRef ds:uri="http://schemas.microsoft.com/office/2006/documentManagement/types"/>
-    <ds:schemaRef ds:uri="230e9df3-be65-4c73-a93b-d1236ebd677e"/>
-    <ds:schemaRef ds:uri="71af3243-3dd4-4a8d-8c0d-dd76da1f02a5"/>
-    <ds:schemaRef ds:uri="16c05727-aa75-4e4a-9b5f-8a80a1165891"/>
-    <ds:schemaRef ds:uri="http://schemas.microsoft.com/sharepoint/v3"/>
-    <ds:schemaRef ds:uri="http://purl.org/dc/dcmitype/"/>
-    <ds:schemaRef ds:uri="http://purl.org/dc/terms/"/>
-  </ds:schemaRefs>
-</ds:datastoreItem>
-</file>
-
-<file path=customXml/itemProps2.xml><?xml version="1.0" encoding="utf-8"?>
 <ds:datastoreItem xmlns:ds="http://schemas.openxmlformats.org/officeDocument/2006/customXml" ds:itemID="{D22F18AB-4822-461F-89DD-ED433D7D595D}">
   <ds:schemaRefs>
     <ds:schemaRef ds:uri="http://schemas.microsoft.com/office/2006/metadata/contentType"/>
@@ -14913,6 +15164,25 @@
 </ds:datastoreItem>
 </file>
 
+<file path=customXml/itemProps2.xml><?xml version="1.0" encoding="utf-8"?>
+<ds:datastoreItem xmlns:ds="http://schemas.openxmlformats.org/officeDocument/2006/customXml" ds:itemID="{826A71AF-4CF2-4B95-BFB6-5C27500258C6}">
+  <ds:schemaRefs>
+    <ds:schemaRef ds:uri="http://schemas.openxmlformats.org/package/2006/metadata/core-properties"/>
+    <ds:schemaRef ds:uri="http://schemas.microsoft.com/office/infopath/2007/PartnerControls"/>
+    <ds:schemaRef ds:uri="http://schemas.microsoft.com/office/2006/metadata/properties"/>
+    <ds:schemaRef ds:uri="http://www.w3.org/XML/1998/namespace"/>
+    <ds:schemaRef ds:uri="http://purl.org/dc/elements/1.1/"/>
+    <ds:schemaRef ds:uri="http://schemas.microsoft.com/office/2006/documentManagement/types"/>
+    <ds:schemaRef ds:uri="230e9df3-be65-4c73-a93b-d1236ebd677e"/>
+    <ds:schemaRef ds:uri="71af3243-3dd4-4a8d-8c0d-dd76da1f02a5"/>
+    <ds:schemaRef ds:uri="16c05727-aa75-4e4a-9b5f-8a80a1165891"/>
+    <ds:schemaRef ds:uri="http://schemas.microsoft.com/sharepoint/v3"/>
+    <ds:schemaRef ds:uri="http://purl.org/dc/dcmitype/"/>
+    <ds:schemaRef ds:uri="http://purl.org/dc/terms/"/>
+  </ds:schemaRefs>
+</ds:datastoreItem>
+</file>
+
 <file path=customXml/itemProps3.xml><?xml version="1.0" encoding="utf-8"?>
 <ds:datastoreItem xmlns:ds="http://schemas.openxmlformats.org/officeDocument/2006/customXml" ds:itemID="{0F60B100-7079-4DE7-AF7C-20BFB1D62C46}">
   <ds:schemaRefs>

</xml_diff>

<commit_message>
pre much done on the presentation
</commit_message>
<xml_diff>
--- a/Scyne Advisory Interview/Scyne Advisory Presentation.pptx
+++ b/Scyne Advisory Interview/Scyne Advisory Presentation.pptx
@@ -5,10 +5,10 @@
     <p:sldMasterId id="2147483744" r:id="rId4"/>
   </p:sldMasterIdLst>
   <p:notesMasterIdLst>
-    <p:notesMasterId r:id="rId21"/>
+    <p:notesMasterId r:id="rId23"/>
   </p:notesMasterIdLst>
   <p:handoutMasterIdLst>
-    <p:handoutMasterId r:id="rId22"/>
+    <p:handoutMasterId r:id="rId24"/>
   </p:handoutMasterIdLst>
   <p:sldIdLst>
     <p:sldId id="256" r:id="rId5"/>
@@ -25,8 +25,10 @@
     <p:sldId id="290" r:id="rId16"/>
     <p:sldId id="289" r:id="rId17"/>
     <p:sldId id="292" r:id="rId18"/>
-    <p:sldId id="293" r:id="rId19"/>
-    <p:sldId id="294" r:id="rId20"/>
+    <p:sldId id="295" r:id="rId19"/>
+    <p:sldId id="293" r:id="rId20"/>
+    <p:sldId id="294" r:id="rId21"/>
+    <p:sldId id="296" r:id="rId22"/>
   </p:sldIdLst>
   <p:sldSz cx="12192000" cy="6858000"/>
   <p:notesSz cx="6858000" cy="9144000"/>
@@ -11206,7 +11208,7 @@
               <a:rPr lang="en-US" dirty="0">
                 <a:latin typeface="Amasis MT Pro Black" panose="02040A04050005020304" pitchFamily="18" charset="0"/>
               </a:rPr>
-              <a:t>LINEAR RELATIONSHIPS DON’T ALWAYS EXIST</a:t>
+              <a:t>LINEAR RELATIONSHIPS DON’T ALWAYS EXIST IN REAL WORLD DATA</a:t>
             </a:r>
           </a:p>
           <a:p>
@@ -11300,17 +11302,17 @@
               <a:rPr lang="en-US" dirty="0">
                 <a:latin typeface="Amasis MT Pro Black" panose="02040A04050005020304" pitchFamily="18" charset="0"/>
               </a:rPr>
-              <a:t>Deeper Patterns</a:t>
+              <a:t>Deeper Temporal Patterns</a:t>
             </a:r>
           </a:p>
         </p:txBody>
       </p:sp>
       <p:pic>
         <p:nvPicPr>
-          <p:cNvPr id="4" name="Picture 3">
+          <p:cNvPr id="5" name="Picture 4">
             <a:extLst>
               <a:ext uri="{FF2B5EF4-FFF2-40B4-BE49-F238E27FC236}">
-                <a16:creationId xmlns:a16="http://schemas.microsoft.com/office/drawing/2014/main" id="{19D3FB7F-D793-EA9E-B295-A5CCCCBB60DB}"/>
+                <a16:creationId xmlns:a16="http://schemas.microsoft.com/office/drawing/2014/main" id="{B251959E-C65A-139C-C4ED-B6F18E0C06A1}"/>
               </a:ext>
             </a:extLst>
           </p:cNvPr>
@@ -11327,8 +11329,8 @@
         </p:blipFill>
         <p:spPr>
           <a:xfrm>
-            <a:off x="216503" y="1061019"/>
-            <a:ext cx="11758994" cy="4735962"/>
+            <a:off x="92912" y="1011242"/>
+            <a:ext cx="12006176" cy="4835515"/>
           </a:xfrm>
           <a:prstGeom prst="rect">
             <a:avLst/>
@@ -11713,7 +11715,7 @@
               <a:rPr lang="en-US" dirty="0">
                 <a:latin typeface="Amasis MT Pro Black" panose="02040A04050005020304" pitchFamily="18" charset="0"/>
               </a:rPr>
-              <a:t>SHOWS SAME FACTORS AS STATISTICAL TESTS</a:t>
+              <a:t>SHOWS SIMILAR FACTORS TO STATISTICAL TESTS</a:t>
             </a:r>
           </a:p>
         </p:txBody>
@@ -11732,6 +11734,121 @@
 </file>
 
 <file path=ppt/slides/slide15.xml><?xml version="1.0" encoding="utf-8"?>
+<p:sld xmlns:a="http://schemas.openxmlformats.org/drawingml/2006/main" xmlns:r="http://schemas.openxmlformats.org/officeDocument/2006/relationships" xmlns:p="http://schemas.openxmlformats.org/presentationml/2006/main">
+  <p:cSld>
+    <p:bg>
+      <p:bgPr>
+        <a:solidFill>
+          <a:schemeClr val="accent1">
+            <a:lumMod val="50000"/>
+          </a:schemeClr>
+        </a:solidFill>
+        <a:effectLst/>
+      </p:bgPr>
+    </p:bg>
+    <p:spTree>
+      <p:nvGrpSpPr>
+        <p:cNvPr id="1" name="">
+          <a:extLst>
+            <a:ext uri="{FF2B5EF4-FFF2-40B4-BE49-F238E27FC236}">
+              <a16:creationId xmlns:a16="http://schemas.microsoft.com/office/drawing/2014/main" id="{64C62C66-4B70-8181-40F1-00EE91D66300}"/>
+            </a:ext>
+          </a:extLst>
+        </p:cNvPr>
+        <p:cNvGrpSpPr/>
+        <p:nvPr/>
+      </p:nvGrpSpPr>
+      <p:grpSpPr>
+        <a:xfrm>
+          <a:off x="0" y="0"/>
+          <a:ext cx="0" cy="0"/>
+          <a:chOff x="0" y="0"/>
+          <a:chExt cx="0" cy="0"/>
+        </a:xfrm>
+      </p:grpSpPr>
+      <p:sp>
+        <p:nvSpPr>
+          <p:cNvPr id="2" name="Title 1">
+            <a:extLst>
+              <a:ext uri="{FF2B5EF4-FFF2-40B4-BE49-F238E27FC236}">
+                <a16:creationId xmlns:a16="http://schemas.microsoft.com/office/drawing/2014/main" id="{1F5938CE-DC03-5770-BD4E-572656A6CD57}"/>
+              </a:ext>
+            </a:extLst>
+          </p:cNvPr>
+          <p:cNvSpPr>
+            <a:spLocks noGrp="1"/>
+          </p:cNvSpPr>
+          <p:nvPr>
+            <p:ph type="title"/>
+          </p:nvPr>
+        </p:nvSpPr>
+        <p:spPr>
+          <a:xfrm>
+            <a:off x="0" y="0"/>
+            <a:ext cx="12192000" cy="655846"/>
+          </a:xfrm>
+          <a:noFill/>
+        </p:spPr>
+        <p:txBody>
+          <a:bodyPr anchor="t">
+            <a:noAutofit/>
+          </a:bodyPr>
+          <a:lstStyle/>
+          <a:p>
+            <a:pPr algn="ctr"/>
+            <a:r>
+              <a:rPr lang="en-US" dirty="0">
+                <a:latin typeface="Amasis MT Pro Black" panose="02040A04050005020304" pitchFamily="18" charset="0"/>
+              </a:rPr>
+              <a:t>Single vs Multiple</a:t>
+            </a:r>
+          </a:p>
+        </p:txBody>
+      </p:sp>
+      <p:pic>
+        <p:nvPicPr>
+          <p:cNvPr id="4" name="Picture 3">
+            <a:extLst>
+              <a:ext uri="{FF2B5EF4-FFF2-40B4-BE49-F238E27FC236}">
+                <a16:creationId xmlns:a16="http://schemas.microsoft.com/office/drawing/2014/main" id="{A5D6C6F3-C8E1-EB92-A570-1B77A87C0692}"/>
+              </a:ext>
+            </a:extLst>
+          </p:cNvPr>
+          <p:cNvPicPr>
+            <a:picLocks noChangeAspect="1"/>
+          </p:cNvPicPr>
+          <p:nvPr/>
+        </p:nvPicPr>
+        <p:blipFill>
+          <a:blip r:embed="rId2"/>
+          <a:stretch>
+            <a:fillRect/>
+          </a:stretch>
+        </p:blipFill>
+        <p:spPr>
+          <a:xfrm>
+            <a:off x="983992" y="798724"/>
+            <a:ext cx="10224016" cy="5720580"/>
+          </a:xfrm>
+          <a:prstGeom prst="rect">
+            <a:avLst/>
+          </a:prstGeom>
+        </p:spPr>
+      </p:pic>
+    </p:spTree>
+    <p:extLst>
+      <p:ext uri="{BB962C8B-B14F-4D97-AF65-F5344CB8AC3E}">
+        <p14:creationId xmlns:p14="http://schemas.microsoft.com/office/powerpoint/2010/main" val="2858948611"/>
+      </p:ext>
+    </p:extLst>
+  </p:cSld>
+  <p:clrMapOvr>
+    <a:masterClrMapping/>
+  </p:clrMapOvr>
+</p:sld>
+</file>
+
+<file path=ppt/slides/slide16.xml><?xml version="1.0" encoding="utf-8"?>
 <p:sld xmlns:a="http://schemas.openxmlformats.org/drawingml/2006/main" xmlns:r="http://schemas.openxmlformats.org/officeDocument/2006/relationships" xmlns:p="http://schemas.openxmlformats.org/presentationml/2006/main">
   <p:cSld>
     <p:bg>
@@ -11798,7 +11915,7 @@
               <a:rPr lang="en-US" dirty="0">
                 <a:latin typeface="Amasis MT Pro Black" panose="02040A04050005020304" pitchFamily="18" charset="0"/>
               </a:rPr>
-              <a:t>Predictions</a:t>
+              <a:t>ML Predictions</a:t>
             </a:r>
           </a:p>
         </p:txBody>
@@ -11846,7 +11963,7 @@
 </p:sld>
 </file>
 
-<file path=ppt/slides/slide16.xml><?xml version="1.0" encoding="utf-8"?>
+<file path=ppt/slides/slide17.xml><?xml version="1.0" encoding="utf-8"?>
 <p:sld xmlns:a="http://schemas.openxmlformats.org/drawingml/2006/main" xmlns:r="http://schemas.openxmlformats.org/officeDocument/2006/relationships" xmlns:p="http://schemas.openxmlformats.org/presentationml/2006/main">
   <p:cSld>
     <p:bg>
@@ -11999,6 +12116,680 @@
 </p:sld>
 </file>
 
+<file path=ppt/slides/slide18.xml><?xml version="1.0" encoding="utf-8"?>
+<p:sld xmlns:a="http://schemas.openxmlformats.org/drawingml/2006/main" xmlns:r="http://schemas.openxmlformats.org/officeDocument/2006/relationships" xmlns:p="http://schemas.openxmlformats.org/presentationml/2006/main">
+  <p:cSld>
+    <p:bg>
+      <p:bgPr>
+        <a:solidFill>
+          <a:schemeClr val="accent1">
+            <a:lumMod val="50000"/>
+          </a:schemeClr>
+        </a:solidFill>
+        <a:effectLst/>
+      </p:bgPr>
+    </p:bg>
+    <p:spTree>
+      <p:nvGrpSpPr>
+        <p:cNvPr id="1" name="">
+          <a:extLst>
+            <a:ext uri="{FF2B5EF4-FFF2-40B4-BE49-F238E27FC236}">
+              <a16:creationId xmlns:a16="http://schemas.microsoft.com/office/drawing/2014/main" id="{35ABFED9-3398-0D72-8DA1-4DBF54097A53}"/>
+            </a:ext>
+          </a:extLst>
+        </p:cNvPr>
+        <p:cNvGrpSpPr/>
+        <p:nvPr/>
+      </p:nvGrpSpPr>
+      <p:grpSpPr>
+        <a:xfrm>
+          <a:off x="0" y="0"/>
+          <a:ext cx="0" cy="0"/>
+          <a:chOff x="0" y="0"/>
+          <a:chExt cx="0" cy="0"/>
+        </a:xfrm>
+      </p:grpSpPr>
+      <p:sp>
+        <p:nvSpPr>
+          <p:cNvPr id="2" name="Title 1">
+            <a:extLst>
+              <a:ext uri="{FF2B5EF4-FFF2-40B4-BE49-F238E27FC236}">
+                <a16:creationId xmlns:a16="http://schemas.microsoft.com/office/drawing/2014/main" id="{AA05765F-B291-C98B-6FF1-F65BFC7B06E0}"/>
+              </a:ext>
+            </a:extLst>
+          </p:cNvPr>
+          <p:cNvSpPr>
+            <a:spLocks noGrp="1"/>
+          </p:cNvSpPr>
+          <p:nvPr>
+            <p:ph type="title"/>
+          </p:nvPr>
+        </p:nvSpPr>
+        <p:spPr>
+          <a:xfrm>
+            <a:off x="0" y="0"/>
+            <a:ext cx="12192000" cy="655846"/>
+          </a:xfrm>
+          <a:noFill/>
+        </p:spPr>
+        <p:txBody>
+          <a:bodyPr anchor="t">
+            <a:noAutofit/>
+          </a:bodyPr>
+          <a:lstStyle/>
+          <a:p>
+            <a:pPr algn="ctr"/>
+            <a:r>
+              <a:rPr lang="en-US" dirty="0">
+                <a:latin typeface="Amasis MT Pro Black" panose="02040A04050005020304" pitchFamily="18" charset="0"/>
+              </a:rPr>
+              <a:t>Findings &amp; summary</a:t>
+            </a:r>
+          </a:p>
+        </p:txBody>
+      </p:sp>
+      <p:sp>
+        <p:nvSpPr>
+          <p:cNvPr id="5" name="Rectangle 2">
+            <a:extLst>
+              <a:ext uri="{FF2B5EF4-FFF2-40B4-BE49-F238E27FC236}">
+                <a16:creationId xmlns:a16="http://schemas.microsoft.com/office/drawing/2014/main" id="{F746F253-F4A3-184F-800C-7CB2D2E75692}"/>
+              </a:ext>
+            </a:extLst>
+          </p:cNvPr>
+          <p:cNvSpPr>
+            <a:spLocks noChangeArrowheads="1"/>
+          </p:cNvSpPr>
+          <p:nvPr/>
+        </p:nvSpPr>
+        <p:spPr bwMode="auto">
+          <a:xfrm>
+            <a:off x="167640" y="725804"/>
+            <a:ext cx="11689080" cy="5909310"/>
+          </a:xfrm>
+          <a:prstGeom prst="rect">
+            <a:avLst/>
+          </a:prstGeom>
+          <a:noFill/>
+          <a:ln>
+            <a:noFill/>
+          </a:ln>
+          <a:effectLst/>
+          <a:extLst>
+            <a:ext uri="{909E8E84-426E-40DD-AFC4-6F175D3DCCD1}">
+              <a14:hiddenFill xmlns:a14="http://schemas.microsoft.com/office/drawing/2010/main">
+                <a:solidFill>
+                  <a:schemeClr val="accent1"/>
+                </a:solidFill>
+              </a14:hiddenFill>
+            </a:ext>
+            <a:ext uri="{91240B29-F687-4F45-9708-019B960494DF}">
+              <a14:hiddenLine xmlns:a14="http://schemas.microsoft.com/office/drawing/2010/main" w="9525">
+                <a:solidFill>
+                  <a:schemeClr val="tx1"/>
+                </a:solidFill>
+                <a:miter lim="800000"/>
+                <a:headEnd/>
+                <a:tailEnd/>
+              </a14:hiddenLine>
+            </a:ext>
+            <a:ext uri="{AF507438-7753-43E0-B8FC-AC1667EBCBE1}">
+              <a14:hiddenEffects xmlns:a14="http://schemas.microsoft.com/office/drawing/2010/main">
+                <a:effectLst>
+                  <a:outerShdw dist="35921" dir="2700000" algn="ctr" rotWithShape="0">
+                    <a:schemeClr val="bg2"/>
+                  </a:outerShdw>
+                </a:effectLst>
+              </a14:hiddenEffects>
+            </a:ext>
+          </a:extLst>
+        </p:spPr>
+        <p:txBody>
+          <a:bodyPr vert="horz" wrap="square" lIns="91440" tIns="45720" rIns="91440" bIns="45720" numCol="1" anchor="ctr" anchorCtr="0" compatLnSpc="1">
+            <a:prstTxWarp prst="textNoShape">
+              <a:avLst/>
+            </a:prstTxWarp>
+            <a:spAutoFit/>
+          </a:bodyPr>
+          <a:lstStyle/>
+          <a:p>
+            <a:pPr marL="285750" marR="0" lvl="0" indent="-285750" algn="l" defTabSz="914400" rtl="0" eaLnBrk="0" fontAlgn="base" latinLnBrk="0" hangingPunct="0">
+              <a:lnSpc>
+                <a:spcPct val="100000"/>
+              </a:lnSpc>
+              <a:spcBef>
+                <a:spcPct val="0"/>
+              </a:spcBef>
+              <a:spcAft>
+                <a:spcPct val="0"/>
+              </a:spcAft>
+              <a:buClrTx/>
+              <a:buSzTx/>
+              <a:buFont typeface="Arial" panose="020B0604020202020204" pitchFamily="34" charset="0"/>
+              <a:buChar char="•"/>
+              <a:tabLst/>
+            </a:pPr>
+            <a:r>
+              <a:rPr kumimoji="0" lang="en-US" altLang="en-US" sz="1800" i="0" u="none" strike="noStrike" cap="none" normalizeH="0" baseline="0" dirty="0">
+                <a:ln>
+                  <a:noFill/>
+                </a:ln>
+                <a:solidFill>
+                  <a:schemeClr val="tx1"/>
+                </a:solidFill>
+                <a:effectLst/>
+                <a:latin typeface="Arial" panose="020B0604020202020204" pitchFamily="34" charset="0"/>
+              </a:rPr>
+              <a:t>Long-term improvement:</a:t>
+            </a:r>
+          </a:p>
+          <a:p>
+            <a:pPr marL="742950" lvl="1" indent="-285750" defTabSz="914400" eaLnBrk="0" fontAlgn="base" hangingPunct="0">
+              <a:spcBef>
+                <a:spcPct val="0"/>
+              </a:spcBef>
+              <a:spcAft>
+                <a:spcPct val="0"/>
+              </a:spcAft>
+              <a:buFont typeface="Arial" panose="020B0604020202020204" pitchFamily="34" charset="0"/>
+              <a:buChar char="•"/>
+            </a:pPr>
+            <a:r>
+              <a:rPr kumimoji="0" lang="en-US" altLang="en-US" i="0" u="none" strike="noStrike" cap="none" normalizeH="0" baseline="0" dirty="0">
+                <a:ln>
+                  <a:noFill/>
+                </a:ln>
+                <a:solidFill>
+                  <a:schemeClr val="tx1"/>
+                </a:solidFill>
+                <a:effectLst/>
+                <a:latin typeface="Arial" panose="020B0604020202020204" pitchFamily="34" charset="0"/>
+              </a:rPr>
+              <a:t>Fatal crashes have dropped sharply since the late 1980s, despite massive growth in car ownership and road networks.</a:t>
+            </a:r>
+          </a:p>
+          <a:p>
+            <a:pPr marL="742950" lvl="1" indent="-285750" defTabSz="914400" eaLnBrk="0" fontAlgn="base" hangingPunct="0">
+              <a:spcBef>
+                <a:spcPct val="0"/>
+              </a:spcBef>
+              <a:spcAft>
+                <a:spcPct val="0"/>
+              </a:spcAft>
+              <a:buFont typeface="Arial" panose="020B0604020202020204" pitchFamily="34" charset="0"/>
+              <a:buChar char="•"/>
+            </a:pPr>
+            <a:r>
+              <a:rPr kumimoji="0" lang="en-US" altLang="en-US" i="0" u="none" strike="noStrike" cap="none" normalizeH="0" baseline="0" dirty="0">
+                <a:ln>
+                  <a:noFill/>
+                </a:ln>
+                <a:solidFill>
+                  <a:schemeClr val="tx1"/>
+                </a:solidFill>
+                <a:effectLst/>
+                <a:latin typeface="Arial" panose="020B0604020202020204" pitchFamily="34" charset="0"/>
+              </a:rPr>
+              <a:t>However, progress has plateaued since ~2020, with fatalities trending slightly upward again.</a:t>
+            </a:r>
+            <a:endParaRPr lang="en-US" altLang="en-US" dirty="0">
+              <a:latin typeface="Arial" panose="020B0604020202020204" pitchFamily="34" charset="0"/>
+            </a:endParaRPr>
+          </a:p>
+          <a:p>
+            <a:pPr marL="285750" marR="0" lvl="0" indent="-285750" algn="l" defTabSz="914400" rtl="0" eaLnBrk="0" fontAlgn="base" latinLnBrk="0" hangingPunct="0">
+              <a:lnSpc>
+                <a:spcPct val="100000"/>
+              </a:lnSpc>
+              <a:spcBef>
+                <a:spcPct val="0"/>
+              </a:spcBef>
+              <a:spcAft>
+                <a:spcPct val="0"/>
+              </a:spcAft>
+              <a:buClrTx/>
+              <a:buSzTx/>
+              <a:buFont typeface="Arial" panose="020B0604020202020204" pitchFamily="34" charset="0"/>
+              <a:buChar char="•"/>
+              <a:tabLst/>
+            </a:pPr>
+            <a:r>
+              <a:rPr kumimoji="0" lang="en-US" altLang="en-US" sz="1800" i="0" u="none" strike="noStrike" cap="none" normalizeH="0" baseline="0" dirty="0">
+                <a:ln>
+                  <a:noFill/>
+                </a:ln>
+                <a:solidFill>
+                  <a:schemeClr val="tx1"/>
+                </a:solidFill>
+                <a:effectLst/>
+                <a:latin typeface="Arial" panose="020B0604020202020204" pitchFamily="34" charset="0"/>
+              </a:rPr>
+              <a:t>Gender imbalance:</a:t>
+            </a:r>
+          </a:p>
+          <a:p>
+            <a:pPr marL="742950" lvl="1" indent="-285750" defTabSz="914400" eaLnBrk="0" fontAlgn="base" hangingPunct="0">
+              <a:spcBef>
+                <a:spcPct val="0"/>
+              </a:spcBef>
+              <a:spcAft>
+                <a:spcPct val="0"/>
+              </a:spcAft>
+              <a:buFont typeface="Arial" panose="020B0604020202020204" pitchFamily="34" charset="0"/>
+              <a:buChar char="•"/>
+            </a:pPr>
+            <a:r>
+              <a:rPr kumimoji="0" lang="en-US" altLang="en-US" i="0" u="none" strike="noStrike" cap="none" normalizeH="0" baseline="0" dirty="0">
+                <a:ln>
+                  <a:noFill/>
+                </a:ln>
+                <a:solidFill>
+                  <a:schemeClr val="tx1"/>
+                </a:solidFill>
+                <a:effectLst/>
+                <a:latin typeface="Arial" panose="020B0604020202020204" pitchFamily="34" charset="0"/>
+              </a:rPr>
+              <a:t>Males account for ~72% of fatal crashes, confirming a major risk factor.</a:t>
+            </a:r>
+          </a:p>
+          <a:p>
+            <a:pPr marL="285750" marR="0" lvl="0" indent="-285750" algn="l" defTabSz="914400" rtl="0" eaLnBrk="0" fontAlgn="base" latinLnBrk="0" hangingPunct="0">
+              <a:lnSpc>
+                <a:spcPct val="100000"/>
+              </a:lnSpc>
+              <a:spcBef>
+                <a:spcPct val="0"/>
+              </a:spcBef>
+              <a:spcAft>
+                <a:spcPct val="0"/>
+              </a:spcAft>
+              <a:buClrTx/>
+              <a:buSzTx/>
+              <a:buFont typeface="Arial" panose="020B0604020202020204" pitchFamily="34" charset="0"/>
+              <a:buChar char="•"/>
+              <a:tabLst/>
+            </a:pPr>
+            <a:r>
+              <a:rPr kumimoji="0" lang="en-US" altLang="en-US" sz="1800" i="0" u="none" strike="noStrike" cap="none" normalizeH="0" baseline="0" dirty="0">
+                <a:ln>
+                  <a:noFill/>
+                </a:ln>
+                <a:solidFill>
+                  <a:schemeClr val="tx1"/>
+                </a:solidFill>
+                <a:effectLst/>
+                <a:latin typeface="Arial" panose="020B0604020202020204" pitchFamily="34" charset="0"/>
+              </a:rPr>
+              <a:t>Age risks:</a:t>
+            </a:r>
+            <a:endParaRPr lang="en-US" altLang="en-US" dirty="0">
+              <a:latin typeface="Arial" panose="020B0604020202020204" pitchFamily="34" charset="0"/>
+            </a:endParaRPr>
+          </a:p>
+          <a:p>
+            <a:pPr marL="742950" lvl="1" indent="-285750" defTabSz="914400" eaLnBrk="0" fontAlgn="base" hangingPunct="0">
+              <a:spcBef>
+                <a:spcPct val="0"/>
+              </a:spcBef>
+              <a:spcAft>
+                <a:spcPct val="0"/>
+              </a:spcAft>
+              <a:buFont typeface="Arial" panose="020B0604020202020204" pitchFamily="34" charset="0"/>
+              <a:buChar char="•"/>
+            </a:pPr>
+            <a:r>
+              <a:rPr kumimoji="0" lang="en-US" altLang="en-US" i="0" u="none" strike="noStrike" cap="none" normalizeH="0" baseline="0" dirty="0">
+                <a:ln>
+                  <a:noFill/>
+                </a:ln>
+                <a:solidFill>
+                  <a:schemeClr val="tx1"/>
+                </a:solidFill>
+                <a:effectLst/>
+                <a:latin typeface="Arial" panose="020B0604020202020204" pitchFamily="34" charset="0"/>
+              </a:rPr>
+              <a:t>26–40 year olds are most overrepresented in fatal crashes.</a:t>
+            </a:r>
+          </a:p>
+          <a:p>
+            <a:pPr marL="742950" lvl="1" indent="-285750" defTabSz="914400" eaLnBrk="0" fontAlgn="base" hangingPunct="0">
+              <a:spcBef>
+                <a:spcPct val="0"/>
+              </a:spcBef>
+              <a:spcAft>
+                <a:spcPct val="0"/>
+              </a:spcAft>
+              <a:buFont typeface="Arial" panose="020B0604020202020204" pitchFamily="34" charset="0"/>
+              <a:buChar char="•"/>
+            </a:pPr>
+            <a:r>
+              <a:rPr kumimoji="0" lang="en-US" altLang="en-US" i="0" u="none" strike="noStrike" cap="none" normalizeH="0" baseline="0" dirty="0">
+                <a:ln>
+                  <a:noFill/>
+                </a:ln>
+                <a:solidFill>
+                  <a:schemeClr val="tx1"/>
+                </a:solidFill>
+                <a:effectLst/>
+                <a:latin typeface="Arial" panose="020B0604020202020204" pitchFamily="34" charset="0"/>
+              </a:rPr>
+              <a:t>Young drivers (&lt;18) form a smaller share, while risk rises again for 60+.</a:t>
+            </a:r>
+          </a:p>
+          <a:p>
+            <a:pPr marL="285750" marR="0" lvl="0" indent="-285750" algn="l" defTabSz="914400" rtl="0" eaLnBrk="0" fontAlgn="base" latinLnBrk="0" hangingPunct="0">
+              <a:lnSpc>
+                <a:spcPct val="100000"/>
+              </a:lnSpc>
+              <a:spcBef>
+                <a:spcPct val="0"/>
+              </a:spcBef>
+              <a:spcAft>
+                <a:spcPct val="0"/>
+              </a:spcAft>
+              <a:buClrTx/>
+              <a:buSzTx/>
+              <a:buFont typeface="Arial" panose="020B0604020202020204" pitchFamily="34" charset="0"/>
+              <a:buChar char="•"/>
+              <a:tabLst/>
+            </a:pPr>
+            <a:r>
+              <a:rPr kumimoji="0" lang="en-US" altLang="en-US" sz="1800" i="0" u="none" strike="noStrike" cap="none" normalizeH="0" baseline="0" dirty="0">
+                <a:ln>
+                  <a:noFill/>
+                </a:ln>
+                <a:solidFill>
+                  <a:schemeClr val="tx1"/>
+                </a:solidFill>
+                <a:effectLst/>
+                <a:latin typeface="Arial" panose="020B0604020202020204" pitchFamily="34" charset="0"/>
+              </a:rPr>
+              <a:t>Speed environment:</a:t>
+            </a:r>
+          </a:p>
+          <a:p>
+            <a:pPr marL="742950" lvl="1" indent="-285750" defTabSz="914400" eaLnBrk="0" fontAlgn="base" hangingPunct="0">
+              <a:spcBef>
+                <a:spcPct val="0"/>
+              </a:spcBef>
+              <a:spcAft>
+                <a:spcPct val="0"/>
+              </a:spcAft>
+              <a:buFont typeface="Arial" panose="020B0604020202020204" pitchFamily="34" charset="0"/>
+              <a:buChar char="•"/>
+            </a:pPr>
+            <a:r>
+              <a:rPr kumimoji="0" lang="en-US" altLang="en-US" i="0" u="none" strike="noStrike" cap="none" normalizeH="0" baseline="0" dirty="0">
+                <a:ln>
+                  <a:noFill/>
+                </a:ln>
+                <a:solidFill>
+                  <a:schemeClr val="tx1"/>
+                </a:solidFill>
+                <a:effectLst/>
+                <a:latin typeface="Arial" panose="020B0604020202020204" pitchFamily="34" charset="0"/>
+              </a:rPr>
+              <a:t>Nearly half of fatal crashes occur in 100km/h+ zones.</a:t>
+            </a:r>
+          </a:p>
+          <a:p>
+            <a:pPr marL="742950" lvl="1" indent="-285750" defTabSz="914400" eaLnBrk="0" fontAlgn="base" hangingPunct="0">
+              <a:spcBef>
+                <a:spcPct val="0"/>
+              </a:spcBef>
+              <a:spcAft>
+                <a:spcPct val="0"/>
+              </a:spcAft>
+              <a:buFont typeface="Arial" panose="020B0604020202020204" pitchFamily="34" charset="0"/>
+              <a:buChar char="•"/>
+            </a:pPr>
+            <a:r>
+              <a:rPr kumimoji="0" lang="en-US" altLang="en-US" i="0" u="none" strike="noStrike" cap="none" normalizeH="0" baseline="0" dirty="0">
+                <a:ln>
+                  <a:noFill/>
+                </a:ln>
+                <a:solidFill>
+                  <a:schemeClr val="tx1"/>
+                </a:solidFill>
+                <a:effectLst/>
+                <a:latin typeface="Arial" panose="020B0604020202020204" pitchFamily="34" charset="0"/>
+              </a:rPr>
+              <a:t>Low-speed zones (≤60 km/h) still account for ~1/3, showing urban risk too.</a:t>
+            </a:r>
+          </a:p>
+          <a:p>
+            <a:pPr marL="285750" marR="0" lvl="0" indent="-285750" algn="l" defTabSz="914400" rtl="0" eaLnBrk="0" fontAlgn="base" latinLnBrk="0" hangingPunct="0">
+              <a:lnSpc>
+                <a:spcPct val="100000"/>
+              </a:lnSpc>
+              <a:spcBef>
+                <a:spcPct val="0"/>
+              </a:spcBef>
+              <a:spcAft>
+                <a:spcPct val="0"/>
+              </a:spcAft>
+              <a:buClrTx/>
+              <a:buSzTx/>
+              <a:buFont typeface="Arial" panose="020B0604020202020204" pitchFamily="34" charset="0"/>
+              <a:buChar char="•"/>
+              <a:tabLst/>
+            </a:pPr>
+            <a:r>
+              <a:rPr kumimoji="0" lang="en-US" altLang="en-US" sz="1800" i="0" u="none" strike="noStrike" cap="none" normalizeH="0" baseline="0" dirty="0">
+                <a:ln>
+                  <a:noFill/>
+                </a:ln>
+                <a:solidFill>
+                  <a:schemeClr val="tx1"/>
+                </a:solidFill>
+                <a:effectLst/>
+                <a:latin typeface="Arial" panose="020B0604020202020204" pitchFamily="34" charset="0"/>
+              </a:rPr>
+              <a:t>Crash type:</a:t>
+            </a:r>
+          </a:p>
+          <a:p>
+            <a:pPr marL="742950" lvl="1" indent="-285750" defTabSz="914400" eaLnBrk="0" fontAlgn="base" hangingPunct="0">
+              <a:spcBef>
+                <a:spcPct val="0"/>
+              </a:spcBef>
+              <a:spcAft>
+                <a:spcPct val="0"/>
+              </a:spcAft>
+              <a:buFont typeface="Arial" panose="020B0604020202020204" pitchFamily="34" charset="0"/>
+              <a:buChar char="•"/>
+            </a:pPr>
+            <a:r>
+              <a:rPr kumimoji="0" lang="en-US" altLang="en-US" i="0" u="none" strike="noStrike" cap="none" normalizeH="0" baseline="0" dirty="0">
+                <a:ln>
+                  <a:noFill/>
+                </a:ln>
+                <a:solidFill>
+                  <a:schemeClr val="tx1"/>
+                </a:solidFill>
+                <a:effectLst/>
+                <a:latin typeface="Arial" panose="020B0604020202020204" pitchFamily="34" charset="0"/>
+              </a:rPr>
+              <a:t>Single-vehicle crashes (55%) slightly outnumber multiple-vehicle ones, highlighting driver behaviour and loss of control as key issues.</a:t>
+            </a:r>
+          </a:p>
+          <a:p>
+            <a:pPr marL="285750" marR="0" lvl="0" indent="-285750" algn="l" defTabSz="914400" rtl="0" eaLnBrk="0" fontAlgn="base" latinLnBrk="0" hangingPunct="0">
+              <a:lnSpc>
+                <a:spcPct val="100000"/>
+              </a:lnSpc>
+              <a:spcBef>
+                <a:spcPct val="0"/>
+              </a:spcBef>
+              <a:spcAft>
+                <a:spcPct val="0"/>
+              </a:spcAft>
+              <a:buClrTx/>
+              <a:buSzTx/>
+              <a:buFont typeface="Arial" panose="020B0604020202020204" pitchFamily="34" charset="0"/>
+              <a:buChar char="•"/>
+              <a:tabLst/>
+            </a:pPr>
+            <a:r>
+              <a:rPr kumimoji="0" lang="en-US" altLang="en-US" sz="1800" i="0" u="none" strike="noStrike" cap="none" normalizeH="0" baseline="0" dirty="0">
+                <a:ln>
+                  <a:noFill/>
+                </a:ln>
+                <a:solidFill>
+                  <a:schemeClr val="tx1"/>
+                </a:solidFill>
+                <a:effectLst/>
+                <a:latin typeface="Arial" panose="020B0604020202020204" pitchFamily="34" charset="0"/>
+              </a:rPr>
+              <a:t>Time patterns:</a:t>
+            </a:r>
+          </a:p>
+          <a:p>
+            <a:pPr marL="742950" lvl="1" indent="-285750" defTabSz="914400" eaLnBrk="0" fontAlgn="base" hangingPunct="0">
+              <a:spcBef>
+                <a:spcPct val="0"/>
+              </a:spcBef>
+              <a:spcAft>
+                <a:spcPct val="0"/>
+              </a:spcAft>
+              <a:buFont typeface="Arial" panose="020B0604020202020204" pitchFamily="34" charset="0"/>
+              <a:buChar char="•"/>
+            </a:pPr>
+            <a:r>
+              <a:rPr kumimoji="0" lang="en-US" altLang="en-US" i="0" u="none" strike="noStrike" cap="none" normalizeH="0" baseline="0" dirty="0">
+                <a:ln>
+                  <a:noFill/>
+                </a:ln>
+                <a:solidFill>
+                  <a:schemeClr val="tx1"/>
+                </a:solidFill>
+                <a:effectLst/>
+                <a:latin typeface="Arial" panose="020B0604020202020204" pitchFamily="34" charset="0"/>
+              </a:rPr>
+              <a:t>Fatalities cluster heavily on weekends (Fri–Sun), especially at night and early morning.</a:t>
+            </a:r>
+          </a:p>
+          <a:p>
+            <a:pPr marL="742950" lvl="1" indent="-285750" defTabSz="914400" eaLnBrk="0" fontAlgn="base" hangingPunct="0">
+              <a:spcBef>
+                <a:spcPct val="0"/>
+              </a:spcBef>
+              <a:spcAft>
+                <a:spcPct val="0"/>
+              </a:spcAft>
+              <a:buFont typeface="Arial" panose="020B0604020202020204" pitchFamily="34" charset="0"/>
+              <a:buChar char="•"/>
+            </a:pPr>
+            <a:r>
+              <a:rPr kumimoji="0" lang="en-US" altLang="en-US" i="0" u="none" strike="noStrike" cap="none" normalizeH="0" baseline="0" dirty="0">
+                <a:ln>
+                  <a:noFill/>
+                </a:ln>
+                <a:solidFill>
+                  <a:schemeClr val="tx1"/>
+                </a:solidFill>
+                <a:effectLst/>
+                <a:latin typeface="Arial" panose="020B0604020202020204" pitchFamily="34" charset="0"/>
+              </a:rPr>
+              <a:t>Weekdays show flatter, steadier patterns.</a:t>
+            </a:r>
+          </a:p>
+          <a:p>
+            <a:pPr marL="285750" marR="0" lvl="0" indent="-285750" algn="l" defTabSz="914400" rtl="0" eaLnBrk="0" fontAlgn="base" latinLnBrk="0" hangingPunct="0">
+              <a:lnSpc>
+                <a:spcPct val="100000"/>
+              </a:lnSpc>
+              <a:spcBef>
+                <a:spcPct val="0"/>
+              </a:spcBef>
+              <a:spcAft>
+                <a:spcPct val="0"/>
+              </a:spcAft>
+              <a:buClrTx/>
+              <a:buSzTx/>
+              <a:buFont typeface="Arial" panose="020B0604020202020204" pitchFamily="34" charset="0"/>
+              <a:buChar char="•"/>
+              <a:tabLst/>
+            </a:pPr>
+            <a:r>
+              <a:rPr kumimoji="0" lang="en-US" altLang="en-US" sz="1800" i="0" u="none" strike="noStrike" cap="none" normalizeH="0" baseline="0" dirty="0">
+                <a:ln>
+                  <a:noFill/>
+                </a:ln>
+                <a:solidFill>
+                  <a:schemeClr val="tx1"/>
+                </a:solidFill>
+                <a:effectLst/>
+                <a:latin typeface="Arial" panose="020B0604020202020204" pitchFamily="34" charset="0"/>
+              </a:rPr>
+              <a:t>Model insights:</a:t>
+            </a:r>
+          </a:p>
+          <a:p>
+            <a:pPr marL="742950" lvl="1" indent="-285750" defTabSz="914400" eaLnBrk="0" fontAlgn="base" hangingPunct="0">
+              <a:spcBef>
+                <a:spcPct val="0"/>
+              </a:spcBef>
+              <a:spcAft>
+                <a:spcPct val="0"/>
+              </a:spcAft>
+              <a:buFont typeface="Arial" panose="020B0604020202020204" pitchFamily="34" charset="0"/>
+              <a:buChar char="•"/>
+            </a:pPr>
+            <a:r>
+              <a:rPr kumimoji="0" lang="en-US" altLang="en-US" i="0" u="none" strike="noStrike" cap="none" normalizeH="0" baseline="0" dirty="0">
+                <a:ln>
+                  <a:noFill/>
+                </a:ln>
+                <a:solidFill>
+                  <a:schemeClr val="tx1"/>
+                </a:solidFill>
+                <a:effectLst/>
+                <a:latin typeface="Arial" panose="020B0604020202020204" pitchFamily="34" charset="0"/>
+              </a:rPr>
+              <a:t>Hour of day and Speed band are the strongest predictors of crash type.</a:t>
+            </a:r>
+          </a:p>
+          <a:p>
+            <a:pPr marL="742950" lvl="1" indent="-285750" defTabSz="914400" eaLnBrk="0" fontAlgn="base" hangingPunct="0">
+              <a:spcBef>
+                <a:spcPct val="0"/>
+              </a:spcBef>
+              <a:spcAft>
+                <a:spcPct val="0"/>
+              </a:spcAft>
+              <a:buFont typeface="Arial" panose="020B0604020202020204" pitchFamily="34" charset="0"/>
+              <a:buChar char="•"/>
+            </a:pPr>
+            <a:r>
+              <a:rPr kumimoji="0" lang="en-US" altLang="en-US" i="0" u="none" strike="noStrike" cap="none" normalizeH="0" baseline="0" dirty="0">
+                <a:ln>
+                  <a:noFill/>
+                </a:ln>
+                <a:solidFill>
+                  <a:schemeClr val="tx1"/>
+                </a:solidFill>
+                <a:effectLst/>
+                <a:latin typeface="Arial" panose="020B0604020202020204" pitchFamily="34" charset="0"/>
+              </a:rPr>
+              <a:t>Age also contributes but less strongly.</a:t>
+            </a:r>
+          </a:p>
+        </p:txBody>
+      </p:sp>
+    </p:spTree>
+    <p:extLst>
+      <p:ext uri="{BB962C8B-B14F-4D97-AF65-F5344CB8AC3E}">
+        <p14:creationId xmlns:p14="http://schemas.microsoft.com/office/powerpoint/2010/main" val="3360748046"/>
+      </p:ext>
+    </p:extLst>
+  </p:cSld>
+  <p:clrMapOvr>
+    <a:masterClrMapping/>
+  </p:clrMapOvr>
+</p:sld>
+</file>
+
 <file path=ppt/slides/slide2.xml><?xml version="1.0" encoding="utf-8"?>
 <p:sld xmlns:a="http://schemas.openxmlformats.org/drawingml/2006/main" xmlns:r="http://schemas.openxmlformats.org/officeDocument/2006/relationships" xmlns:p="http://schemas.openxmlformats.org/presentationml/2006/main">
   <p:cSld>
@@ -12070,8 +12861,8 @@
         </p:nvSpPr>
         <p:spPr>
           <a:xfrm>
-            <a:off x="685801" y="1948618"/>
-            <a:ext cx="10411547" cy="2862322"/>
+            <a:off x="890225" y="1812170"/>
+            <a:ext cx="10411547" cy="4247317"/>
           </a:xfrm>
           <a:prstGeom prst="rect">
             <a:avLst/>
@@ -12098,7 +12889,7 @@
               <a:rPr lang="en-US" altLang="en-US" dirty="0">
                 <a:latin typeface="Amasis MT Pro" panose="02040504050005020304" pitchFamily="18" charset="0"/>
               </a:rPr>
-              <a:t>Fatal crashes have declined long-term but plateaued in recent years.</a:t>
+              <a:t>Long-term trends show a remarkable decline in fatal crashes since the late 1980s, even as vehicle ownership and road usage have expanded significantly. However, improvements have slowed since 2020, with fatalities showing signs of rising again.</a:t>
             </a:r>
           </a:p>
           <a:p>
@@ -12129,7 +12920,7 @@
               <a:rPr lang="en-US" altLang="en-US" dirty="0">
                 <a:latin typeface="Amasis MT Pro" panose="02040504050005020304" pitchFamily="18" charset="0"/>
               </a:rPr>
-              <a:t>Weekends and late-night hours remain the highest-risk windows.</a:t>
+              <a:t>Demographic patterns reveal that males account for the vast majority of fatal crashes (~72%), while the 26–40 age group is the most overrepresented.</a:t>
             </a:r>
           </a:p>
           <a:p>
@@ -12160,7 +12951,7 @@
               <a:rPr lang="en-US" altLang="en-US" dirty="0">
                 <a:latin typeface="Amasis MT Pro" panose="02040504050005020304" pitchFamily="18" charset="0"/>
               </a:rPr>
-              <a:t>Young male drivers are disproportionately involved in fatal crashes.</a:t>
+              <a:t>Environmental risk factors highlight that almost half of all fatal crashes occur on high-speed roads (100+ km/h), with urban low-speed zones (≤60 km/h) still contributing around one-third of fatalities.</a:t>
             </a:r>
           </a:p>
           <a:p>
@@ -12191,21 +12982,8 @@
               <a:rPr lang="en-US" altLang="en-US" dirty="0">
                 <a:latin typeface="Amasis MT Pro" panose="02040504050005020304" pitchFamily="18" charset="0"/>
               </a:rPr>
-              <a:t>Risks differ across environments: single-vehicle crashes dominate at high speed/night; multi-vehicle crashes peak in commuting hours.</a:t>
-            </a:r>
-          </a:p>
-          <a:p>
-            <a:pPr lvl="0" defTabSz="914400" eaLnBrk="0" fontAlgn="base" hangingPunct="0">
-              <a:spcBef>
-                <a:spcPct val="0"/>
-              </a:spcBef>
-              <a:spcAft>
-                <a:spcPct val="0"/>
-              </a:spcAft>
-            </a:pPr>
-            <a:endParaRPr lang="en-US" altLang="en-US" dirty="0">
-              <a:latin typeface="Amasis MT Pro" panose="02040504050005020304" pitchFamily="18" charset="0"/>
-            </a:endParaRPr>
+              <a:t>Time-based analysis indicates weekends (Friday–Sunday), particularly late nights and early mornings, are strongly associated with higher fatal crash risk.</a:t>
+            </a:r>
           </a:p>
           <a:p>
             <a:pPr marL="285750" lvl="0" indent="-285750" defTabSz="914400" eaLnBrk="0" fontAlgn="base" hangingPunct="0">
@@ -12218,11 +12996,26 @@
               <a:buFont typeface="Arial" panose="020B0604020202020204" pitchFamily="34" charset="0"/>
               <a:buChar char="•"/>
             </a:pPr>
+            <a:endParaRPr lang="en-US" altLang="en-US" dirty="0">
+              <a:latin typeface="Amasis MT Pro" panose="02040504050005020304" pitchFamily="18" charset="0"/>
+            </a:endParaRPr>
+          </a:p>
+          <a:p>
+            <a:pPr marL="285750" lvl="0" indent="-285750" defTabSz="914400" eaLnBrk="0" fontAlgn="base" hangingPunct="0">
+              <a:spcBef>
+                <a:spcPct val="0"/>
+              </a:spcBef>
+              <a:spcAft>
+                <a:spcPct val="0"/>
+              </a:spcAft>
+              <a:buFont typeface="Arial" panose="020B0604020202020204" pitchFamily="34" charset="0"/>
+              <a:buChar char="•"/>
+            </a:pPr>
             <a:r>
               <a:rPr lang="en-US" altLang="en-US" dirty="0">
                 <a:latin typeface="Amasis MT Pro" panose="02040504050005020304" pitchFamily="18" charset="0"/>
               </a:rPr>
-              <a:t>Holiday periods mirror these risks, especially late-night driving, without adding new patterns.</a:t>
+              <a:t>Machine learning insights confirm that hour of day, speed environment, and weekend driving are the most influential predictors of crash type, reinforcing the central role of behaviour and timing.</a:t>
             </a:r>
           </a:p>
         </p:txBody>
@@ -12644,7 +13437,7 @@
               <a:rPr lang="en-US" dirty="0">
                 <a:latin typeface="Amasis MT Pro" panose="02040504050005020304" pitchFamily="18" charset="0"/>
               </a:rPr>
-              <a:t>Holiday periods amplify existing late-night risks but do not introduce unique new patterns.</a:t>
+              <a:t>Weekend late-night + high-speed is the dominant recipe for single-vehicle fatalities across states.</a:t>
             </a:r>
             <a:endParaRPr lang="en-AU" dirty="0">
               <a:latin typeface="Amasis MT Pro" panose="02040504050005020304" pitchFamily="18" charset="0"/>
@@ -12716,7 +13509,7 @@
         </p:nvSpPr>
         <p:spPr>
           <a:xfrm>
-            <a:off x="0" y="0"/>
+            <a:off x="0" y="152400"/>
             <a:ext cx="12192000" cy="777766"/>
           </a:xfrm>
           <a:noFill/>
@@ -14803,6 +15596,26 @@
 </file>
 
 <file path=customXml/item1.xml><?xml version="1.0" encoding="utf-8"?>
+<p:properties xmlns:p="http://schemas.microsoft.com/office/2006/metadata/properties" xmlns:xsi="http://www.w3.org/2001/XMLSchema-instance" xmlns:pc="http://schemas.microsoft.com/office/infopath/2007/PartnerControls">
+  <documentManagement>
+    <MediaServiceKeyPoints xmlns="71af3243-3dd4-4a8d-8c0d-dd76da1f02a5" xsi:nil="true"/>
+    <_ip_UnifiedCompliancePolicyUIAction xmlns="http://schemas.microsoft.com/sharepoint/v3" xsi:nil="true"/>
+    <Image xmlns="71af3243-3dd4-4a8d-8c0d-dd76da1f02a5">
+      <Url xsi:nil="true"/>
+      <Description xsi:nil="true"/>
+    </Image>
+    <Status xmlns="71af3243-3dd4-4a8d-8c0d-dd76da1f02a5">Not started</Status>
+    <Background xmlns="71af3243-3dd4-4a8d-8c0d-dd76da1f02a5">false</Background>
+    <_ip_UnifiedCompliancePolicyProperties xmlns="http://schemas.microsoft.com/sharepoint/v3" xsi:nil="true"/>
+    <ImageTagsTaxHTField xmlns="71af3243-3dd4-4a8d-8c0d-dd76da1f02a5">
+      <Terms xmlns="http://schemas.microsoft.com/office/infopath/2007/PartnerControls"/>
+    </ImageTagsTaxHTField>
+    <TaxCatchAll xmlns="230e9df3-be65-4c73-a93b-d1236ebd677e" xsi:nil="true"/>
+  </documentManagement>
+</p:properties>
+</file>
+
+<file path=customXml/item2.xml><?xml version="1.0" encoding="utf-8"?>
 <ct:contentTypeSchema xmlns:ct="http://schemas.microsoft.com/office/2006/metadata/contentType" xmlns:ma="http://schemas.microsoft.com/office/2006/metadata/properties/metaAttributes" ct:_="" ma:_="" ma:contentTypeName="Document" ma:contentTypeID="0x01010079F111ED35F8CC479449609E8A0923A6" ma:contentTypeVersion="29" ma:contentTypeDescription="Create a new document." ma:contentTypeScope="" ma:versionID="6a914531ae0f23be31da2eba1f3b42a9">
   <xsd:schema xmlns:xsd="http://www.w3.org/2001/XMLSchema" xmlns:xs="http://www.w3.org/2001/XMLSchema" xmlns:p="http://schemas.microsoft.com/office/2006/metadata/properties" xmlns:ns1="http://schemas.microsoft.com/sharepoint/v3" xmlns:ns2="71af3243-3dd4-4a8d-8c0d-dd76da1f02a5" xmlns:ns3="16c05727-aa75-4e4a-9b5f-8a80a1165891" xmlns:ns4="230e9df3-be65-4c73-a93b-d1236ebd677e" targetNamespace="http://schemas.microsoft.com/office/2006/metadata/properties" ma:root="true" ma:fieldsID="ae00154c9e66547f022c4923f88826d6" ns1:_="" ns2:_="" ns3:_="" ns4:_="">
     <xsd:import namespace="http://schemas.microsoft.com/sharepoint/v3"/>
@@ -15114,26 +15927,6 @@
 </ct:contentTypeSchema>
 </file>
 
-<file path=customXml/item2.xml><?xml version="1.0" encoding="utf-8"?>
-<p:properties xmlns:p="http://schemas.microsoft.com/office/2006/metadata/properties" xmlns:xsi="http://www.w3.org/2001/XMLSchema-instance" xmlns:pc="http://schemas.microsoft.com/office/infopath/2007/PartnerControls">
-  <documentManagement>
-    <MediaServiceKeyPoints xmlns="71af3243-3dd4-4a8d-8c0d-dd76da1f02a5" xsi:nil="true"/>
-    <_ip_UnifiedCompliancePolicyUIAction xmlns="http://schemas.microsoft.com/sharepoint/v3" xsi:nil="true"/>
-    <Image xmlns="71af3243-3dd4-4a8d-8c0d-dd76da1f02a5">
-      <Url xsi:nil="true"/>
-      <Description xsi:nil="true"/>
-    </Image>
-    <Status xmlns="71af3243-3dd4-4a8d-8c0d-dd76da1f02a5">Not started</Status>
-    <Background xmlns="71af3243-3dd4-4a8d-8c0d-dd76da1f02a5">false</Background>
-    <_ip_UnifiedCompliancePolicyProperties xmlns="http://schemas.microsoft.com/sharepoint/v3" xsi:nil="true"/>
-    <ImageTagsTaxHTField xmlns="71af3243-3dd4-4a8d-8c0d-dd76da1f02a5">
-      <Terms xmlns="http://schemas.microsoft.com/office/infopath/2007/PartnerControls"/>
-    </ImageTagsTaxHTField>
-    <TaxCatchAll xmlns="230e9df3-be65-4c73-a93b-d1236ebd677e" xsi:nil="true"/>
-  </documentManagement>
-</p:properties>
-</file>
-
 <file path=customXml/item3.xml><?xml version="1.0" encoding="utf-8"?>
 <?mso-contentType ?>
 <FormTemplates xmlns="http://schemas.microsoft.com/sharepoint/v3/contenttype/forms">
@@ -15144,6 +15937,25 @@
 </file>
 
 <file path=customXml/itemProps1.xml><?xml version="1.0" encoding="utf-8"?>
+<ds:datastoreItem xmlns:ds="http://schemas.openxmlformats.org/officeDocument/2006/customXml" ds:itemID="{826A71AF-4CF2-4B95-BFB6-5C27500258C6}">
+  <ds:schemaRefs>
+    <ds:schemaRef ds:uri="http://schemas.openxmlformats.org/package/2006/metadata/core-properties"/>
+    <ds:schemaRef ds:uri="http://schemas.microsoft.com/office/infopath/2007/PartnerControls"/>
+    <ds:schemaRef ds:uri="http://schemas.microsoft.com/office/2006/metadata/properties"/>
+    <ds:schemaRef ds:uri="http://www.w3.org/XML/1998/namespace"/>
+    <ds:schemaRef ds:uri="http://purl.org/dc/elements/1.1/"/>
+    <ds:schemaRef ds:uri="http://schemas.microsoft.com/office/2006/documentManagement/types"/>
+    <ds:schemaRef ds:uri="230e9df3-be65-4c73-a93b-d1236ebd677e"/>
+    <ds:schemaRef ds:uri="71af3243-3dd4-4a8d-8c0d-dd76da1f02a5"/>
+    <ds:schemaRef ds:uri="16c05727-aa75-4e4a-9b5f-8a80a1165891"/>
+    <ds:schemaRef ds:uri="http://schemas.microsoft.com/sharepoint/v3"/>
+    <ds:schemaRef ds:uri="http://purl.org/dc/dcmitype/"/>
+    <ds:schemaRef ds:uri="http://purl.org/dc/terms/"/>
+  </ds:schemaRefs>
+</ds:datastoreItem>
+</file>
+
+<file path=customXml/itemProps2.xml><?xml version="1.0" encoding="utf-8"?>
 <ds:datastoreItem xmlns:ds="http://schemas.openxmlformats.org/officeDocument/2006/customXml" ds:itemID="{D22F18AB-4822-461F-89DD-ED433D7D595D}">
   <ds:schemaRefs>
     <ds:schemaRef ds:uri="http://schemas.microsoft.com/office/2006/metadata/contentType"/>
@@ -15164,25 +15976,6 @@
 </ds:datastoreItem>
 </file>
 
-<file path=customXml/itemProps2.xml><?xml version="1.0" encoding="utf-8"?>
-<ds:datastoreItem xmlns:ds="http://schemas.openxmlformats.org/officeDocument/2006/customXml" ds:itemID="{826A71AF-4CF2-4B95-BFB6-5C27500258C6}">
-  <ds:schemaRefs>
-    <ds:schemaRef ds:uri="http://schemas.openxmlformats.org/package/2006/metadata/core-properties"/>
-    <ds:schemaRef ds:uri="http://schemas.microsoft.com/office/infopath/2007/PartnerControls"/>
-    <ds:schemaRef ds:uri="http://schemas.microsoft.com/office/2006/metadata/properties"/>
-    <ds:schemaRef ds:uri="http://www.w3.org/XML/1998/namespace"/>
-    <ds:schemaRef ds:uri="http://purl.org/dc/elements/1.1/"/>
-    <ds:schemaRef ds:uri="http://schemas.microsoft.com/office/2006/documentManagement/types"/>
-    <ds:schemaRef ds:uri="230e9df3-be65-4c73-a93b-d1236ebd677e"/>
-    <ds:schemaRef ds:uri="71af3243-3dd4-4a8d-8c0d-dd76da1f02a5"/>
-    <ds:schemaRef ds:uri="16c05727-aa75-4e4a-9b5f-8a80a1165891"/>
-    <ds:schemaRef ds:uri="http://schemas.microsoft.com/sharepoint/v3"/>
-    <ds:schemaRef ds:uri="http://purl.org/dc/dcmitype/"/>
-    <ds:schemaRef ds:uri="http://purl.org/dc/terms/"/>
-  </ds:schemaRefs>
-</ds:datastoreItem>
-</file>
-
 <file path=customXml/itemProps3.xml><?xml version="1.0" encoding="utf-8"?>
 <ds:datastoreItem xmlns:ds="http://schemas.openxmlformats.org/officeDocument/2006/customXml" ds:itemID="{0F60B100-7079-4DE7-AF7C-20BFB1D62C46}">
   <ds:schemaRefs>

</xml_diff>